<commit_message>
finished my part of presentation
</commit_message>
<xml_diff>
--- a/reports/18_03_13 Presentation.pptx
+++ b/reports/18_03_13 Presentation.pptx
@@ -12,6 +12,7 @@
     <p:sldId id="260" r:id="rId6"/>
     <p:sldId id="261" r:id="rId7"/>
     <p:sldId id="262" r:id="rId8"/>
+    <p:sldId id="263" r:id="rId9"/>
   </p:sldIdLst>
   <p:sldSz cx="12192000" cy="6858000"/>
   <p:notesSz cx="6858000" cy="9144000"/>
@@ -249,7 +250,7 @@
           <a:p>
             <a:fld id="{8B887784-E512-F943-98E0-5497CC7B1195}" type="datetimeFigureOut">
               <a:rPr lang="en-US" smtClean="0"/>
-              <a:t>3/10/18</a:t>
+              <a:t>3/12/18</a:t>
             </a:fld>
             <a:endParaRPr lang="en-US"/>
           </a:p>
@@ -419,7 +420,7 @@
           <a:p>
             <a:fld id="{8B887784-E512-F943-98E0-5497CC7B1195}" type="datetimeFigureOut">
               <a:rPr lang="en-US" smtClean="0"/>
-              <a:t>3/10/18</a:t>
+              <a:t>3/12/18</a:t>
             </a:fld>
             <a:endParaRPr lang="en-US"/>
           </a:p>
@@ -599,7 +600,7 @@
           <a:p>
             <a:fld id="{8B887784-E512-F943-98E0-5497CC7B1195}" type="datetimeFigureOut">
               <a:rPr lang="en-US" smtClean="0"/>
-              <a:t>3/10/18</a:t>
+              <a:t>3/12/18</a:t>
             </a:fld>
             <a:endParaRPr lang="en-US"/>
           </a:p>
@@ -769,7 +770,7 @@
           <a:p>
             <a:fld id="{8B887784-E512-F943-98E0-5497CC7B1195}" type="datetimeFigureOut">
               <a:rPr lang="en-US" smtClean="0"/>
-              <a:t>3/10/18</a:t>
+              <a:t>3/12/18</a:t>
             </a:fld>
             <a:endParaRPr lang="en-US"/>
           </a:p>
@@ -1015,7 +1016,7 @@
           <a:p>
             <a:fld id="{8B887784-E512-F943-98E0-5497CC7B1195}" type="datetimeFigureOut">
               <a:rPr lang="en-US" smtClean="0"/>
-              <a:t>3/10/18</a:t>
+              <a:t>3/12/18</a:t>
             </a:fld>
             <a:endParaRPr lang="en-US"/>
           </a:p>
@@ -1247,7 +1248,7 @@
           <a:p>
             <a:fld id="{8B887784-E512-F943-98E0-5497CC7B1195}" type="datetimeFigureOut">
               <a:rPr lang="en-US" smtClean="0"/>
-              <a:t>3/10/18</a:t>
+              <a:t>3/12/18</a:t>
             </a:fld>
             <a:endParaRPr lang="en-US"/>
           </a:p>
@@ -1614,7 +1615,7 @@
           <a:p>
             <a:fld id="{8B887784-E512-F943-98E0-5497CC7B1195}" type="datetimeFigureOut">
               <a:rPr lang="en-US" smtClean="0"/>
-              <a:t>3/10/18</a:t>
+              <a:t>3/12/18</a:t>
             </a:fld>
             <a:endParaRPr lang="en-US"/>
           </a:p>
@@ -1732,7 +1733,7 @@
           <a:p>
             <a:fld id="{8B887784-E512-F943-98E0-5497CC7B1195}" type="datetimeFigureOut">
               <a:rPr lang="en-US" smtClean="0"/>
-              <a:t>3/10/18</a:t>
+              <a:t>3/12/18</a:t>
             </a:fld>
             <a:endParaRPr lang="en-US"/>
           </a:p>
@@ -1827,7 +1828,7 @@
           <a:p>
             <a:fld id="{8B887784-E512-F943-98E0-5497CC7B1195}" type="datetimeFigureOut">
               <a:rPr lang="en-US" smtClean="0"/>
-              <a:t>3/10/18</a:t>
+              <a:t>3/12/18</a:t>
             </a:fld>
             <a:endParaRPr lang="en-US"/>
           </a:p>
@@ -2104,7 +2105,7 @@
           <a:p>
             <a:fld id="{8B887784-E512-F943-98E0-5497CC7B1195}" type="datetimeFigureOut">
               <a:rPr lang="en-US" smtClean="0"/>
-              <a:t>3/10/18</a:t>
+              <a:t>3/12/18</a:t>
             </a:fld>
             <a:endParaRPr lang="en-US"/>
           </a:p>
@@ -2357,7 +2358,7 @@
           <a:p>
             <a:fld id="{8B887784-E512-F943-98E0-5497CC7B1195}" type="datetimeFigureOut">
               <a:rPr lang="en-US" smtClean="0"/>
-              <a:t>3/10/18</a:t>
+              <a:t>3/12/18</a:t>
             </a:fld>
             <a:endParaRPr lang="en-US"/>
           </a:p>
@@ -2570,7 +2571,7 @@
           <a:p>
             <a:fld id="{8B887784-E512-F943-98E0-5497CC7B1195}" type="datetimeFigureOut">
               <a:rPr lang="en-US" smtClean="0"/>
-              <a:t>3/10/18</a:t>
+              <a:t>3/12/18</a:t>
             </a:fld>
             <a:endParaRPr lang="en-US"/>
           </a:p>
@@ -7507,6 +7508,185 @@
   <p:clrMapOvr>
     <a:masterClrMapping/>
   </p:clrMapOvr>
+  <p:timing>
+    <p:tnLst>
+      <p:par>
+        <p:cTn id="1" dur="indefinite" restart="never" nodeType="tmRoot"/>
+      </p:par>
+    </p:tnLst>
+  </p:timing>
+</p:sld>
+</file>
+
+<file path=ppt/slides/slide8.xml><?xml version="1.0" encoding="utf-8"?>
+<p:sld xmlns:a="http://schemas.openxmlformats.org/drawingml/2006/main" xmlns:r="http://schemas.openxmlformats.org/officeDocument/2006/relationships" xmlns:p="http://schemas.openxmlformats.org/presentationml/2006/main">
+  <p:cSld>
+    <p:spTree>
+      <p:nvGrpSpPr>
+        <p:cNvPr id="1" name=""/>
+        <p:cNvGrpSpPr/>
+        <p:nvPr/>
+      </p:nvGrpSpPr>
+      <p:grpSpPr>
+        <a:xfrm>
+          <a:off x="0" y="0"/>
+          <a:ext cx="0" cy="0"/>
+          <a:chOff x="0" y="0"/>
+          <a:chExt cx="0" cy="0"/>
+        </a:xfrm>
+      </p:grpSpPr>
+      <p:sp>
+        <p:nvSpPr>
+          <p:cNvPr id="2" name="Title 1"/>
+          <p:cNvSpPr>
+            <a:spLocks noGrp="1"/>
+          </p:cNvSpPr>
+          <p:nvPr>
+            <p:ph type="title"/>
+          </p:nvPr>
+        </p:nvSpPr>
+        <p:spPr/>
+        <p:txBody>
+          <a:bodyPr/>
+          <a:lstStyle/>
+          <a:p>
+            <a:r>
+              <a:rPr lang="en-US" dirty="0" smtClean="0"/>
+              <a:t>Approach 1: First Differences</a:t>
+            </a:r>
+            <a:endParaRPr lang="en-US" dirty="0"/>
+          </a:p>
+        </p:txBody>
+      </p:sp>
+      <p:sp>
+        <p:nvSpPr>
+          <p:cNvPr id="3" name="Content Placeholder 2"/>
+          <p:cNvSpPr>
+            <a:spLocks noGrp="1"/>
+          </p:cNvSpPr>
+          <p:nvPr>
+            <p:ph idx="1"/>
+          </p:nvPr>
+        </p:nvSpPr>
+        <p:spPr>
+          <a:xfrm>
+            <a:off x="838201" y="1825625"/>
+            <a:ext cx="10120531" cy="1044184"/>
+          </a:xfrm>
+        </p:spPr>
+        <p:txBody>
+          <a:bodyPr>
+            <a:normAutofit fontScale="77500" lnSpcReduction="20000"/>
+          </a:bodyPr>
+          <a:lstStyle/>
+          <a:p>
+            <a:pPr>
+              <a:lnSpc>
+                <a:spcPct val="100000"/>
+              </a:lnSpc>
+              <a:spcBef>
+                <a:spcPts val="0"/>
+              </a:spcBef>
+            </a:pPr>
+            <a:r>
+              <a:rPr lang="en-US" dirty="0" smtClean="0"/>
+              <a:t>For both outcomes, we tried adding 100 to the variable with the highest average partial derivative and subtracting 100 from the variable with the lowest.</a:t>
+            </a:r>
+          </a:p>
+          <a:p>
+            <a:pPr>
+              <a:lnSpc>
+                <a:spcPct val="100000"/>
+              </a:lnSpc>
+              <a:spcBef>
+                <a:spcPts val="0"/>
+              </a:spcBef>
+            </a:pPr>
+            <a:r>
+              <a:rPr lang="en-US" dirty="0" smtClean="0"/>
+              <a:t>Cluster bootstrapped by school for distributions (N=50)</a:t>
+            </a:r>
+            <a:endParaRPr lang="en-US" dirty="0"/>
+          </a:p>
+        </p:txBody>
+      </p:sp>
+      <p:pic>
+        <p:nvPicPr>
+          <p:cNvPr id="6" name="Picture 5"/>
+          <p:cNvPicPr>
+            <a:picLocks noChangeAspect="1"/>
+          </p:cNvPicPr>
+          <p:nvPr/>
+        </p:nvPicPr>
+        <p:blipFill>
+          <a:blip r:embed="rId2">
+            <a:extLst>
+              <a:ext uri="{28A0092B-C50C-407E-A947-70E740481C1C}">
+                <a14:useLocalDpi xmlns:a14="http://schemas.microsoft.com/office/drawing/2010/main" val="0"/>
+              </a:ext>
+            </a:extLst>
+          </a:blip>
+          <a:stretch>
+            <a:fillRect/>
+          </a:stretch>
+        </p:blipFill>
+        <p:spPr>
+          <a:xfrm>
+            <a:off x="838200" y="3004746"/>
+            <a:ext cx="4577862" cy="3705543"/>
+          </a:xfrm>
+          <a:prstGeom prst="rect">
+            <a:avLst/>
+          </a:prstGeom>
+        </p:spPr>
+      </p:pic>
+      <p:pic>
+        <p:nvPicPr>
+          <p:cNvPr id="7" name="Picture 6"/>
+          <p:cNvPicPr>
+            <a:picLocks noChangeAspect="1"/>
+          </p:cNvPicPr>
+          <p:nvPr/>
+        </p:nvPicPr>
+        <p:blipFill>
+          <a:blip r:embed="rId3">
+            <a:extLst>
+              <a:ext uri="{28A0092B-C50C-407E-A947-70E740481C1C}">
+                <a14:useLocalDpi xmlns:a14="http://schemas.microsoft.com/office/drawing/2010/main" val="0"/>
+              </a:ext>
+            </a:extLst>
+          </a:blip>
+          <a:stretch>
+            <a:fillRect/>
+          </a:stretch>
+        </p:blipFill>
+        <p:spPr>
+          <a:xfrm>
+            <a:off x="6096000" y="3004746"/>
+            <a:ext cx="4567897" cy="3705543"/>
+          </a:xfrm>
+          <a:prstGeom prst="rect">
+            <a:avLst/>
+          </a:prstGeom>
+        </p:spPr>
+      </p:pic>
+    </p:spTree>
+    <p:extLst>
+      <p:ext uri="{BB962C8B-B14F-4D97-AF65-F5344CB8AC3E}">
+        <p14:creationId xmlns:p14="http://schemas.microsoft.com/office/powerpoint/2010/main" val="425241556"/>
+      </p:ext>
+    </p:extLst>
+  </p:cSld>
+  <p:clrMapOvr>
+    <a:masterClrMapping/>
+  </p:clrMapOvr>
+  <p:timing>
+    <p:tnLst>
+      <p:par>
+        <p:cTn id="1" dur="indefinite" restart="never" nodeType="tmRoot"/>
+      </p:par>
+    </p:tnLst>
+  </p:timing>
 </p:sld>
 </file>
 

</xml_diff>

<commit_message>
added ave partials to presentation
</commit_message>
<xml_diff>
--- a/reports/18_03_13 Presentation.pptx
+++ b/reports/18_03_13 Presentation.pptx
@@ -255,7 +255,7 @@
           <a:p>
             <a:fld id="{8B887784-E512-F943-98E0-5497CC7B1195}" type="datetimeFigureOut">
               <a:rPr lang="en-US" smtClean="0"/>
-              <a:t>3/12/18</a:t>
+              <a:t>3/12/2018</a:t>
             </a:fld>
             <a:endParaRPr lang="en-US"/>
           </a:p>
@@ -423,7 +423,7 @@
           <a:p>
             <a:fld id="{8B887784-E512-F943-98E0-5497CC7B1195}" type="datetimeFigureOut">
               <a:rPr lang="en-US" smtClean="0"/>
-              <a:t>3/12/18</a:t>
+              <a:t>3/12/2018</a:t>
             </a:fld>
             <a:endParaRPr lang="en-US"/>
           </a:p>
@@ -601,7 +601,7 @@
           <a:p>
             <a:fld id="{8B887784-E512-F943-98E0-5497CC7B1195}" type="datetimeFigureOut">
               <a:rPr lang="en-US" smtClean="0"/>
-              <a:t>3/12/18</a:t>
+              <a:t>3/12/2018</a:t>
             </a:fld>
             <a:endParaRPr lang="en-US"/>
           </a:p>
@@ -769,7 +769,7 @@
           <a:p>
             <a:fld id="{8B887784-E512-F943-98E0-5497CC7B1195}" type="datetimeFigureOut">
               <a:rPr lang="en-US" smtClean="0"/>
-              <a:t>3/12/18</a:t>
+              <a:t>3/12/2018</a:t>
             </a:fld>
             <a:endParaRPr lang="en-US"/>
           </a:p>
@@ -1014,7 +1014,7 @@
           <a:p>
             <a:fld id="{8B887784-E512-F943-98E0-5497CC7B1195}" type="datetimeFigureOut">
               <a:rPr lang="en-US" smtClean="0"/>
-              <a:t>3/12/18</a:t>
+              <a:t>3/12/2018</a:t>
             </a:fld>
             <a:endParaRPr lang="en-US"/>
           </a:p>
@@ -1243,7 +1243,7 @@
           <a:p>
             <a:fld id="{8B887784-E512-F943-98E0-5497CC7B1195}" type="datetimeFigureOut">
               <a:rPr lang="en-US" smtClean="0"/>
-              <a:t>3/12/18</a:t>
+              <a:t>3/12/2018</a:t>
             </a:fld>
             <a:endParaRPr lang="en-US"/>
           </a:p>
@@ -1607,7 +1607,7 @@
           <a:p>
             <a:fld id="{8B887784-E512-F943-98E0-5497CC7B1195}" type="datetimeFigureOut">
               <a:rPr lang="en-US" smtClean="0"/>
-              <a:t>3/12/18</a:t>
+              <a:t>3/12/2018</a:t>
             </a:fld>
             <a:endParaRPr lang="en-US"/>
           </a:p>
@@ -1724,7 +1724,7 @@
           <a:p>
             <a:fld id="{8B887784-E512-F943-98E0-5497CC7B1195}" type="datetimeFigureOut">
               <a:rPr lang="en-US" smtClean="0"/>
-              <a:t>3/12/18</a:t>
+              <a:t>3/12/2018</a:t>
             </a:fld>
             <a:endParaRPr lang="en-US"/>
           </a:p>
@@ -1819,7 +1819,7 @@
           <a:p>
             <a:fld id="{8B887784-E512-F943-98E0-5497CC7B1195}" type="datetimeFigureOut">
               <a:rPr lang="en-US" smtClean="0"/>
-              <a:t>3/12/18</a:t>
+              <a:t>3/12/2018</a:t>
             </a:fld>
             <a:endParaRPr lang="en-US"/>
           </a:p>
@@ -2094,7 +2094,7 @@
           <a:p>
             <a:fld id="{8B887784-E512-F943-98E0-5497CC7B1195}" type="datetimeFigureOut">
               <a:rPr lang="en-US" smtClean="0"/>
-              <a:t>3/12/18</a:t>
+              <a:t>3/12/2018</a:t>
             </a:fld>
             <a:endParaRPr lang="en-US"/>
           </a:p>
@@ -2346,7 +2346,7 @@
           <a:p>
             <a:fld id="{8B887784-E512-F943-98E0-5497CC7B1195}" type="datetimeFigureOut">
               <a:rPr lang="en-US" smtClean="0"/>
-              <a:t>3/12/18</a:t>
+              <a:t>3/12/2018</a:t>
             </a:fld>
             <a:endParaRPr lang="en-US"/>
           </a:p>
@@ -2557,7 +2557,7 @@
           <a:p>
             <a:fld id="{8B887784-E512-F943-98E0-5497CC7B1195}" type="datetimeFigureOut">
               <a:rPr lang="en-US" smtClean="0"/>
-              <a:t>3/12/18</a:t>
+              <a:t>3/12/2018</a:t>
             </a:fld>
             <a:endParaRPr lang="en-US"/>
           </a:p>
@@ -3056,7 +3056,7 @@
           <p:cNvPr id="2" name="Title 1">
             <a:extLst>
               <a:ext uri="{FF2B5EF4-FFF2-40B4-BE49-F238E27FC236}">
-                <a16:creationId xmlns:a16="http://schemas.microsoft.com/office/drawing/2014/main" xmlns="" id="{C1125D7B-F02A-445F-B8C7-34C547A14A7A}"/>
+                <a16:creationId xmlns:a16="http://schemas.microsoft.com/office/drawing/2014/main" id="{C1125D7B-F02A-445F-B8C7-34C547A14A7A}"/>
               </a:ext>
             </a:extLst>
           </p:cNvPr>
@@ -3085,7 +3085,7 @@
           <p:cNvPr id="4" name="Table 3">
             <a:extLst>
               <a:ext uri="{FF2B5EF4-FFF2-40B4-BE49-F238E27FC236}">
-                <a16:creationId xmlns:a16="http://schemas.microsoft.com/office/drawing/2014/main" xmlns="" id="{B971FF46-278A-4EFD-85A0-9E515C7A2BDC}"/>
+                <a16:creationId xmlns:a16="http://schemas.microsoft.com/office/drawing/2014/main" id="{B971FF46-278A-4EFD-85A0-9E515C7A2BDC}"/>
               </a:ext>
             </a:extLst>
           </p:cNvPr>
@@ -3114,14 +3114,14 @@
                 <a:gridCol w="3698301">
                   <a:extLst>
                     <a:ext uri="{9D8B030D-6E8A-4147-A177-3AD203B41FA5}">
-                      <a16:colId xmlns:a16="http://schemas.microsoft.com/office/drawing/2014/main" xmlns="" val="3828946005"/>
+                      <a16:colId xmlns:a16="http://schemas.microsoft.com/office/drawing/2014/main" val="3828946005"/>
                     </a:ext>
                   </a:extLst>
                 </a:gridCol>
                 <a:gridCol w="1338943">
                   <a:extLst>
                     <a:ext uri="{9D8B030D-6E8A-4147-A177-3AD203B41FA5}">
-                      <a16:colId xmlns:a16="http://schemas.microsoft.com/office/drawing/2014/main" xmlns="" val="3116620885"/>
+                      <a16:colId xmlns:a16="http://schemas.microsoft.com/office/drawing/2014/main" val="3116620885"/>
                     </a:ext>
                   </a:extLst>
                 </a:gridCol>
@@ -3169,7 +3169,7 @@
                 </a:tc>
                 <a:extLst>
                   <a:ext uri="{0D108BD9-81ED-4DB2-BD59-A6C34878D82A}">
-                    <a16:rowId xmlns:a16="http://schemas.microsoft.com/office/drawing/2014/main" xmlns="" val="2750690894"/>
+                    <a16:rowId xmlns:a16="http://schemas.microsoft.com/office/drawing/2014/main" val="2750690894"/>
                   </a:ext>
                 </a:extLst>
               </a:tr>
@@ -3222,7 +3222,7 @@
                 </a:tc>
                 <a:extLst>
                   <a:ext uri="{0D108BD9-81ED-4DB2-BD59-A6C34878D82A}">
-                    <a16:rowId xmlns:a16="http://schemas.microsoft.com/office/drawing/2014/main" xmlns="" val="621517536"/>
+                    <a16:rowId xmlns:a16="http://schemas.microsoft.com/office/drawing/2014/main" val="621517536"/>
                   </a:ext>
                 </a:extLst>
               </a:tr>
@@ -3233,7 +3233,7 @@
                     <a:lstStyle/>
                     <a:p>
                       <a:pPr algn="l" fontAlgn="ctr"/>
-                      <a:endParaRPr lang="en-GB" sz="1400" b="0" i="0" u="none" strike="noStrike">
+                      <a:endParaRPr lang="en-GB" sz="1400" b="0" i="0" u="none" strike="noStrike" dirty="0">
                         <a:solidFill>
                           <a:srgbClr val="000000"/>
                         </a:solidFill>
@@ -3244,7 +3244,7 @@
                     <a:p>
                       <a:pPr algn="l" fontAlgn="ctr"/>
                       <a:r>
-                        <a:rPr lang="en-GB" sz="1400" b="0" i="0" u="none" strike="noStrike">
+                        <a:rPr lang="en-GB" sz="1400" b="0" i="0" u="none" strike="noStrike" dirty="0" err="1">
                           <a:solidFill>
                             <a:srgbClr val="000000"/>
                           </a:solidFill>
@@ -3253,6 +3253,13 @@
                         </a:rPr>
                         <a:t>other_full_time</a:t>
                       </a:r>
+                      <a:endParaRPr lang="en-GB" sz="1400" b="0" i="0" u="none" strike="noStrike" dirty="0">
+                        <a:solidFill>
+                          <a:srgbClr val="000000"/>
+                        </a:solidFill>
+                        <a:effectLst/>
+                        <a:latin typeface="+mn-lt"/>
+                      </a:endParaRPr>
                     </a:p>
                   </a:txBody>
                   <a:tcPr marL="6350" marR="6350" marT="6350" marB="0" anchor="ctr"/>
@@ -3289,7 +3296,7 @@
                 </a:tc>
                 <a:extLst>
                   <a:ext uri="{0D108BD9-81ED-4DB2-BD59-A6C34878D82A}">
-                    <a16:rowId xmlns:a16="http://schemas.microsoft.com/office/drawing/2014/main" xmlns="" val="196882050"/>
+                    <a16:rowId xmlns:a16="http://schemas.microsoft.com/office/drawing/2014/main" val="196882050"/>
                   </a:ext>
                 </a:extLst>
               </a:tr>
@@ -3363,7 +3370,7 @@
                 </a:tc>
                 <a:extLst>
                   <a:ext uri="{0D108BD9-81ED-4DB2-BD59-A6C34878D82A}">
-                    <a16:rowId xmlns:a16="http://schemas.microsoft.com/office/drawing/2014/main" xmlns="" val="1570215453"/>
+                    <a16:rowId xmlns:a16="http://schemas.microsoft.com/office/drawing/2014/main" val="1570215453"/>
                   </a:ext>
                 </a:extLst>
               </a:tr>
@@ -3437,7 +3444,7 @@
                 </a:tc>
                 <a:extLst>
                   <a:ext uri="{0D108BD9-81ED-4DB2-BD59-A6C34878D82A}">
-                    <a16:rowId xmlns:a16="http://schemas.microsoft.com/office/drawing/2014/main" xmlns="" val="2067295398"/>
+                    <a16:rowId xmlns:a16="http://schemas.microsoft.com/office/drawing/2014/main" val="2067295398"/>
                   </a:ext>
                 </a:extLst>
               </a:tr>
@@ -3511,7 +3518,7 @@
                 </a:tc>
                 <a:extLst>
                   <a:ext uri="{0D108BD9-81ED-4DB2-BD59-A6C34878D82A}">
-                    <a16:rowId xmlns:a16="http://schemas.microsoft.com/office/drawing/2014/main" xmlns="" val="498738980"/>
+                    <a16:rowId xmlns:a16="http://schemas.microsoft.com/office/drawing/2014/main" val="498738980"/>
                   </a:ext>
                 </a:extLst>
               </a:tr>
@@ -3578,7 +3585,7 @@
                 </a:tc>
                 <a:extLst>
                   <a:ext uri="{0D108BD9-81ED-4DB2-BD59-A6C34878D82A}">
-                    <a16:rowId xmlns:a16="http://schemas.microsoft.com/office/drawing/2014/main" xmlns="" val="2702805797"/>
+                    <a16:rowId xmlns:a16="http://schemas.microsoft.com/office/drawing/2014/main" val="2702805797"/>
                   </a:ext>
                 </a:extLst>
               </a:tr>
@@ -3645,7 +3652,7 @@
                 </a:tc>
                 <a:extLst>
                   <a:ext uri="{0D108BD9-81ED-4DB2-BD59-A6C34878D82A}">
-                    <a16:rowId xmlns:a16="http://schemas.microsoft.com/office/drawing/2014/main" xmlns="" val="1306237140"/>
+                    <a16:rowId xmlns:a16="http://schemas.microsoft.com/office/drawing/2014/main" val="1306237140"/>
                   </a:ext>
                 </a:extLst>
               </a:tr>
@@ -3719,7 +3726,7 @@
                 </a:tc>
                 <a:extLst>
                   <a:ext uri="{0D108BD9-81ED-4DB2-BD59-A6C34878D82A}">
-                    <a16:rowId xmlns:a16="http://schemas.microsoft.com/office/drawing/2014/main" xmlns="" val="77369290"/>
+                    <a16:rowId xmlns:a16="http://schemas.microsoft.com/office/drawing/2014/main" val="77369290"/>
                   </a:ext>
                 </a:extLst>
               </a:tr>
@@ -3786,7 +3793,7 @@
                 </a:tc>
                 <a:extLst>
                   <a:ext uri="{0D108BD9-81ED-4DB2-BD59-A6C34878D82A}">
-                    <a16:rowId xmlns:a16="http://schemas.microsoft.com/office/drawing/2014/main" xmlns="" val="3496620231"/>
+                    <a16:rowId xmlns:a16="http://schemas.microsoft.com/office/drawing/2014/main" val="3496620231"/>
                   </a:ext>
                 </a:extLst>
               </a:tr>
@@ -3860,7 +3867,7 @@
                 </a:tc>
                 <a:extLst>
                   <a:ext uri="{0D108BD9-81ED-4DB2-BD59-A6C34878D82A}">
-                    <a16:rowId xmlns:a16="http://schemas.microsoft.com/office/drawing/2014/main" xmlns="" val="1593761885"/>
+                    <a16:rowId xmlns:a16="http://schemas.microsoft.com/office/drawing/2014/main" val="1593761885"/>
                   </a:ext>
                 </a:extLst>
               </a:tr>
@@ -3871,7 +3878,7 @@
                     <a:lstStyle/>
                     <a:p>
                       <a:pPr algn="l" fontAlgn="ctr"/>
-                      <a:endParaRPr lang="en-GB" sz="1400" b="0" i="0" u="none" strike="noStrike">
+                      <a:endParaRPr lang="en-GB" sz="1400" b="0" i="0" u="none" strike="noStrike" dirty="0">
                         <a:solidFill>
                           <a:srgbClr val="000000"/>
                         </a:solidFill>
@@ -3882,7 +3889,7 @@
                     <a:p>
                       <a:pPr algn="l" fontAlgn="ctr"/>
                       <a:r>
-                        <a:rPr lang="en-GB" sz="1400" b="0" i="0" u="none" strike="noStrike">
+                        <a:rPr lang="en-GB" sz="1400" b="0" i="0" u="none" strike="noStrike" dirty="0" err="1">
                           <a:solidFill>
                             <a:srgbClr val="000000"/>
                           </a:solidFill>
@@ -3891,6 +3898,13 @@
                         </a:rPr>
                         <a:t>fall_cohort_pct</a:t>
                       </a:r>
+                      <a:endParaRPr lang="en-GB" sz="1400" b="0" i="0" u="none" strike="noStrike" dirty="0">
+                        <a:solidFill>
+                          <a:srgbClr val="000000"/>
+                        </a:solidFill>
+                        <a:effectLst/>
+                        <a:latin typeface="+mn-lt"/>
+                      </a:endParaRPr>
                     </a:p>
                   </a:txBody>
                   <a:tcPr marL="6350" marR="6350" marT="6350" marB="0" anchor="ctr"/>
@@ -3927,7 +3941,7 @@
                 </a:tc>
                 <a:extLst>
                   <a:ext uri="{0D108BD9-81ED-4DB2-BD59-A6C34878D82A}">
-                    <a16:rowId xmlns:a16="http://schemas.microsoft.com/office/drawing/2014/main" xmlns="" val="3551024362"/>
+                    <a16:rowId xmlns:a16="http://schemas.microsoft.com/office/drawing/2014/main" val="3551024362"/>
                   </a:ext>
                 </a:extLst>
               </a:tr>
@@ -3940,7 +3954,7 @@
           <p:cNvPr id="6" name="Table 5">
             <a:extLst>
               <a:ext uri="{FF2B5EF4-FFF2-40B4-BE49-F238E27FC236}">
-                <a16:creationId xmlns:a16="http://schemas.microsoft.com/office/drawing/2014/main" xmlns="" id="{8ED281BD-3869-486F-B89B-6F378D7FF205}"/>
+                <a16:creationId xmlns:a16="http://schemas.microsoft.com/office/drawing/2014/main" id="{8ED281BD-3869-486F-B89B-6F378D7FF205}"/>
               </a:ext>
             </a:extLst>
           </p:cNvPr>
@@ -3969,14 +3983,14 @@
                 <a:gridCol w="3698301">
                   <a:extLst>
                     <a:ext uri="{9D8B030D-6E8A-4147-A177-3AD203B41FA5}">
-                      <a16:colId xmlns:a16="http://schemas.microsoft.com/office/drawing/2014/main" xmlns="" val="3828946005"/>
+                      <a16:colId xmlns:a16="http://schemas.microsoft.com/office/drawing/2014/main" val="3828946005"/>
                     </a:ext>
                   </a:extLst>
                 </a:gridCol>
                 <a:gridCol w="1338943">
                   <a:extLst>
                     <a:ext uri="{9D8B030D-6E8A-4147-A177-3AD203B41FA5}">
-                      <a16:colId xmlns:a16="http://schemas.microsoft.com/office/drawing/2014/main" xmlns="" val="3116620885"/>
+                      <a16:colId xmlns:a16="http://schemas.microsoft.com/office/drawing/2014/main" val="3116620885"/>
                     </a:ext>
                   </a:extLst>
                 </a:gridCol>
@@ -4021,7 +4035,7 @@
                 </a:tc>
                 <a:extLst>
                   <a:ext uri="{0D108BD9-81ED-4DB2-BD59-A6C34878D82A}">
-                    <a16:rowId xmlns:a16="http://schemas.microsoft.com/office/drawing/2014/main" xmlns="" val="2750690894"/>
+                    <a16:rowId xmlns:a16="http://schemas.microsoft.com/office/drawing/2014/main" val="2750690894"/>
                   </a:ext>
                 </a:extLst>
               </a:tr>
@@ -4074,7 +4088,7 @@
                 </a:tc>
                 <a:extLst>
                   <a:ext uri="{0D108BD9-81ED-4DB2-BD59-A6C34878D82A}">
-                    <a16:rowId xmlns:a16="http://schemas.microsoft.com/office/drawing/2014/main" xmlns="" val="621517536"/>
+                    <a16:rowId xmlns:a16="http://schemas.microsoft.com/office/drawing/2014/main" val="621517536"/>
                   </a:ext>
                 </a:extLst>
               </a:tr>
@@ -4141,7 +4155,7 @@
                 </a:tc>
                 <a:extLst>
                   <a:ext uri="{0D108BD9-81ED-4DB2-BD59-A6C34878D82A}">
-                    <a16:rowId xmlns:a16="http://schemas.microsoft.com/office/drawing/2014/main" xmlns="" val="196882050"/>
+                    <a16:rowId xmlns:a16="http://schemas.microsoft.com/office/drawing/2014/main" val="196882050"/>
                   </a:ext>
                 </a:extLst>
               </a:tr>
@@ -4208,7 +4222,7 @@
                 </a:tc>
                 <a:extLst>
                   <a:ext uri="{0D108BD9-81ED-4DB2-BD59-A6C34878D82A}">
-                    <a16:rowId xmlns:a16="http://schemas.microsoft.com/office/drawing/2014/main" xmlns="" val="1570215453"/>
+                    <a16:rowId xmlns:a16="http://schemas.microsoft.com/office/drawing/2014/main" val="1570215453"/>
                   </a:ext>
                 </a:extLst>
               </a:tr>
@@ -4282,7 +4296,7 @@
                 </a:tc>
                 <a:extLst>
                   <a:ext uri="{0D108BD9-81ED-4DB2-BD59-A6C34878D82A}">
-                    <a16:rowId xmlns:a16="http://schemas.microsoft.com/office/drawing/2014/main" xmlns="" val="2067295398"/>
+                    <a16:rowId xmlns:a16="http://schemas.microsoft.com/office/drawing/2014/main" val="2067295398"/>
                   </a:ext>
                 </a:extLst>
               </a:tr>
@@ -4330,7 +4344,7 @@
                     <a:lstStyle/>
                     <a:p>
                       <a:pPr algn="r" fontAlgn="ctr"/>
-                      <a:endParaRPr lang="en-GB" sz="1400" b="0" i="0" u="none" strike="noStrike">
+                      <a:endParaRPr lang="en-GB" sz="1400" b="0" i="0" u="none" strike="noStrike" dirty="0">
                         <a:solidFill>
                           <a:srgbClr val="000000"/>
                         </a:solidFill>
@@ -4341,7 +4355,7 @@
                     <a:p>
                       <a:pPr algn="r" fontAlgn="ctr"/>
                       <a:r>
-                        <a:rPr lang="en-GB" sz="1400" b="0" i="0" u="none" strike="noStrike">
+                        <a:rPr lang="en-GB" sz="1400" b="0" i="0" u="none" strike="noStrike" dirty="0">
                           <a:solidFill>
                             <a:srgbClr val="000000"/>
                           </a:solidFill>
@@ -4356,7 +4370,7 @@
                 </a:tc>
                 <a:extLst>
                   <a:ext uri="{0D108BD9-81ED-4DB2-BD59-A6C34878D82A}">
-                    <a16:rowId xmlns:a16="http://schemas.microsoft.com/office/drawing/2014/main" xmlns="" val="498738980"/>
+                    <a16:rowId xmlns:a16="http://schemas.microsoft.com/office/drawing/2014/main" val="498738980"/>
                   </a:ext>
                 </a:extLst>
               </a:tr>
@@ -4430,7 +4444,7 @@
                 </a:tc>
                 <a:extLst>
                   <a:ext uri="{0D108BD9-81ED-4DB2-BD59-A6C34878D82A}">
-                    <a16:rowId xmlns:a16="http://schemas.microsoft.com/office/drawing/2014/main" xmlns="" val="2702805797"/>
+                    <a16:rowId xmlns:a16="http://schemas.microsoft.com/office/drawing/2014/main" val="2702805797"/>
                   </a:ext>
                 </a:extLst>
               </a:tr>
@@ -4504,7 +4518,7 @@
                 </a:tc>
                 <a:extLst>
                   <a:ext uri="{0D108BD9-81ED-4DB2-BD59-A6C34878D82A}">
-                    <a16:rowId xmlns:a16="http://schemas.microsoft.com/office/drawing/2014/main" xmlns="" val="1306237140"/>
+                    <a16:rowId xmlns:a16="http://schemas.microsoft.com/office/drawing/2014/main" val="1306237140"/>
                   </a:ext>
                 </a:extLst>
               </a:tr>
@@ -4515,7 +4529,7 @@
                     <a:lstStyle/>
                     <a:p>
                       <a:pPr algn="l" fontAlgn="ctr"/>
-                      <a:endParaRPr lang="en-GB" sz="1400" b="0" i="0" u="none" strike="noStrike">
+                      <a:endParaRPr lang="en-GB" sz="1400" b="0" i="0" u="none" strike="noStrike" dirty="0">
                         <a:solidFill>
                           <a:srgbClr val="000000"/>
                         </a:solidFill>
@@ -4526,7 +4540,7 @@
                     <a:p>
                       <a:pPr algn="l" fontAlgn="ctr"/>
                       <a:r>
-                        <a:rPr lang="en-GB" sz="1400" b="0" i="0" u="none" strike="noStrike">
+                        <a:rPr lang="en-GB" sz="1400" b="0" i="0" u="none" strike="noStrike" dirty="0" err="1">
                           <a:solidFill>
                             <a:srgbClr val="000000"/>
                           </a:solidFill>
@@ -4535,6 +4549,13 @@
                         </a:rPr>
                         <a:t>total_enrollment_black_tot</a:t>
                       </a:r>
+                      <a:endParaRPr lang="en-GB" sz="1400" b="0" i="0" u="none" strike="noStrike" dirty="0">
+                        <a:solidFill>
+                          <a:srgbClr val="000000"/>
+                        </a:solidFill>
+                        <a:effectLst/>
+                        <a:latin typeface="+mn-lt"/>
+                      </a:endParaRPr>
                     </a:p>
                   </a:txBody>
                   <a:tcPr marL="6350" marR="6350" marT="6350" marB="0" anchor="ctr"/>
@@ -4571,7 +4592,7 @@
                 </a:tc>
                 <a:extLst>
                   <a:ext uri="{0D108BD9-81ED-4DB2-BD59-A6C34878D82A}">
-                    <a16:rowId xmlns:a16="http://schemas.microsoft.com/office/drawing/2014/main" xmlns="" val="77369290"/>
+                    <a16:rowId xmlns:a16="http://schemas.microsoft.com/office/drawing/2014/main" val="77369290"/>
                   </a:ext>
                 </a:extLst>
               </a:tr>
@@ -4645,7 +4666,7 @@
                 </a:tc>
                 <a:extLst>
                   <a:ext uri="{0D108BD9-81ED-4DB2-BD59-A6C34878D82A}">
-                    <a16:rowId xmlns:a16="http://schemas.microsoft.com/office/drawing/2014/main" xmlns="" val="3496620231"/>
+                    <a16:rowId xmlns:a16="http://schemas.microsoft.com/office/drawing/2014/main" val="3496620231"/>
                   </a:ext>
                 </a:extLst>
               </a:tr>
@@ -4719,7 +4740,7 @@
                 </a:tc>
                 <a:extLst>
                   <a:ext uri="{0D108BD9-81ED-4DB2-BD59-A6C34878D82A}">
-                    <a16:rowId xmlns:a16="http://schemas.microsoft.com/office/drawing/2014/main" xmlns="" val="1593761885"/>
+                    <a16:rowId xmlns:a16="http://schemas.microsoft.com/office/drawing/2014/main" val="1593761885"/>
                   </a:ext>
                 </a:extLst>
               </a:tr>
@@ -4786,7 +4807,7 @@
                 </a:tc>
                 <a:extLst>
                   <a:ext uri="{0D108BD9-81ED-4DB2-BD59-A6C34878D82A}">
-                    <a16:rowId xmlns:a16="http://schemas.microsoft.com/office/drawing/2014/main" xmlns="" val="3551024362"/>
+                    <a16:rowId xmlns:a16="http://schemas.microsoft.com/office/drawing/2014/main" val="3551024362"/>
                   </a:ext>
                 </a:extLst>
               </a:tr>
@@ -4829,7 +4850,7 @@
           <p:cNvPr id="2" name="Title 1">
             <a:extLst>
               <a:ext uri="{FF2B5EF4-FFF2-40B4-BE49-F238E27FC236}">
-                <a16:creationId xmlns:a16="http://schemas.microsoft.com/office/drawing/2014/main" xmlns="" id="{987F51D3-538B-4293-B504-421274B24C00}"/>
+                <a16:creationId xmlns:a16="http://schemas.microsoft.com/office/drawing/2014/main" id="{987F51D3-538B-4293-B504-421274B24C00}"/>
               </a:ext>
             </a:extLst>
           </p:cNvPr>
@@ -4858,7 +4879,7 @@
           <p:cNvPr id="9" name="TextBox 8">
             <a:extLst>
               <a:ext uri="{FF2B5EF4-FFF2-40B4-BE49-F238E27FC236}">
-                <a16:creationId xmlns:a16="http://schemas.microsoft.com/office/drawing/2014/main" xmlns="" id="{E17C9DD2-5731-48A3-ADE4-2D8C45483EC0}"/>
+                <a16:creationId xmlns:a16="http://schemas.microsoft.com/office/drawing/2014/main" id="{E17C9DD2-5731-48A3-ADE4-2D8C45483EC0}"/>
               </a:ext>
             </a:extLst>
           </p:cNvPr>
@@ -4913,7 +4934,7 @@
             </a:pPr>
             <a:r>
               <a:rPr lang="en-US" sz="2800" dirty="0"/>
-              <a:t>Auxillary03: </a:t>
+              <a:t>Auxillary03: revenue from </a:t>
             </a:r>
             <a:r>
               <a:rPr lang="en-GB" sz="2800" dirty="0"/>
@@ -4994,7 +5015,7 @@
           <p:cNvPr id="2" name="Title 1">
             <a:extLst>
               <a:ext uri="{FF2B5EF4-FFF2-40B4-BE49-F238E27FC236}">
-                <a16:creationId xmlns:a16="http://schemas.microsoft.com/office/drawing/2014/main" xmlns="" id="{987F51D3-538B-4293-B504-421274B24C00}"/>
+                <a16:creationId xmlns:a16="http://schemas.microsoft.com/office/drawing/2014/main" id="{987F51D3-538B-4293-B504-421274B24C00}"/>
               </a:ext>
             </a:extLst>
           </p:cNvPr>
@@ -5031,7 +5052,7 @@
           <p:cNvPr id="9" name="TextBox 8">
             <a:extLst>
               <a:ext uri="{FF2B5EF4-FFF2-40B4-BE49-F238E27FC236}">
-                <a16:creationId xmlns:a16="http://schemas.microsoft.com/office/drawing/2014/main" xmlns="" id="{E17C9DD2-5731-48A3-ADE4-2D8C45483EC0}"/>
+                <a16:creationId xmlns:a16="http://schemas.microsoft.com/office/drawing/2014/main" id="{E17C9DD2-5731-48A3-ADE4-2D8C45483EC0}"/>
               </a:ext>
             </a:extLst>
           </p:cNvPr>
@@ -5231,7 +5252,7 @@
           <p:cNvPr id="2" name="Title 1">
             <a:extLst>
               <a:ext uri="{FF2B5EF4-FFF2-40B4-BE49-F238E27FC236}">
-                <a16:creationId xmlns:a16="http://schemas.microsoft.com/office/drawing/2014/main" xmlns="" id="{9065F088-31B2-4143-A23D-141139DB3894}"/>
+                <a16:creationId xmlns:a16="http://schemas.microsoft.com/office/drawing/2014/main" id="{9065F088-31B2-4143-A23D-141139DB3894}"/>
               </a:ext>
             </a:extLst>
           </p:cNvPr>
@@ -5260,7 +5281,7 @@
           <p:cNvPr id="8" name="TextBox 7">
             <a:extLst>
               <a:ext uri="{FF2B5EF4-FFF2-40B4-BE49-F238E27FC236}">
-                <a16:creationId xmlns:a16="http://schemas.microsoft.com/office/drawing/2014/main" xmlns="" id="{C938AFA7-DA26-4CF7-9C37-DD86FFCEE2D9}"/>
+                <a16:creationId xmlns:a16="http://schemas.microsoft.com/office/drawing/2014/main" id="{C938AFA7-DA26-4CF7-9C37-DD86FFCEE2D9}"/>
               </a:ext>
             </a:extLst>
           </p:cNvPr>
@@ -5288,7 +5309,7 @@
               <a:buChar char="•"/>
             </a:pPr>
             <a:r>
-              <a:rPr lang="en-US" sz="3200" dirty="0" smtClean="0"/>
+              <a:rPr lang="en-US" sz="3200" dirty="0"/>
               <a:t>Lasso on all variables performs best</a:t>
             </a:r>
           </a:p>
@@ -5298,7 +5319,7 @@
               <a:buChar char="•"/>
             </a:pPr>
             <a:r>
-              <a:rPr lang="en-US" sz="3200" dirty="0" smtClean="0"/>
+              <a:rPr lang="en-US" sz="3200" dirty="0"/>
               <a:t>Lasso with interactions on selected variables performs similarly</a:t>
             </a:r>
           </a:p>
@@ -5308,12 +5329,8 @@
               <a:buChar char="•"/>
             </a:pPr>
             <a:r>
-              <a:rPr lang="en-US" sz="3200" dirty="0" smtClean="0"/>
-              <a:t>Relationship </a:t>
-            </a:r>
-            <a:r>
               <a:rPr lang="en-US" sz="3200" dirty="0"/>
-              <a:t>unlikely to be linear – use Gaussian Kernel</a:t>
+              <a:t>Relationship unlikely to be linear – use Gaussian Kernel</a:t>
             </a:r>
           </a:p>
           <a:p>
@@ -5330,7 +5347,7 @@
           <p:cNvPr id="5" name="Content Placeholder 4">
             <a:extLst>
               <a:ext uri="{FF2B5EF4-FFF2-40B4-BE49-F238E27FC236}">
-                <a16:creationId xmlns:a16="http://schemas.microsoft.com/office/drawing/2014/main" xmlns="" id="{73521416-4B4D-4742-BA86-1954AADB18EF}"/>
+                <a16:creationId xmlns:a16="http://schemas.microsoft.com/office/drawing/2014/main" id="{73521416-4B4D-4742-BA86-1954AADB18EF}"/>
               </a:ext>
             </a:extLst>
           </p:cNvPr>
@@ -5360,28 +5377,28 @@
                 <a:gridCol w="1555602">
                   <a:extLst>
                     <a:ext uri="{9D8B030D-6E8A-4147-A177-3AD203B41FA5}">
-                      <a16:colId xmlns:a16="http://schemas.microsoft.com/office/drawing/2014/main" xmlns="" val="3478917767"/>
+                      <a16:colId xmlns:a16="http://schemas.microsoft.com/office/drawing/2014/main" val="3478917767"/>
                     </a:ext>
                   </a:extLst>
                 </a:gridCol>
                 <a:gridCol w="1555602">
                   <a:extLst>
                     <a:ext uri="{9D8B030D-6E8A-4147-A177-3AD203B41FA5}">
-                      <a16:colId xmlns:a16="http://schemas.microsoft.com/office/drawing/2014/main" xmlns="" val="2939297383"/>
+                      <a16:colId xmlns:a16="http://schemas.microsoft.com/office/drawing/2014/main" val="2939297383"/>
                     </a:ext>
                   </a:extLst>
                 </a:gridCol>
                 <a:gridCol w="840605">
                   <a:extLst>
                     <a:ext uri="{9D8B030D-6E8A-4147-A177-3AD203B41FA5}">
-                      <a16:colId xmlns:a16="http://schemas.microsoft.com/office/drawing/2014/main" xmlns="" val="2486717004"/>
+                      <a16:colId xmlns:a16="http://schemas.microsoft.com/office/drawing/2014/main" val="2486717004"/>
                     </a:ext>
                   </a:extLst>
                 </a:gridCol>
                 <a:gridCol w="1033847">
                   <a:extLst>
                     <a:ext uri="{9D8B030D-6E8A-4147-A177-3AD203B41FA5}">
-                      <a16:colId xmlns:a16="http://schemas.microsoft.com/office/drawing/2014/main" xmlns="" val="706046472"/>
+                      <a16:colId xmlns:a16="http://schemas.microsoft.com/office/drawing/2014/main" val="706046472"/>
                     </a:ext>
                   </a:extLst>
                 </a:gridCol>
@@ -5464,7 +5481,7 @@
                 </a:tc>
                 <a:extLst>
                   <a:ext uri="{0D108BD9-81ED-4DB2-BD59-A6C34878D82A}">
-                    <a16:rowId xmlns:a16="http://schemas.microsoft.com/office/drawing/2014/main" xmlns="" val="1550085656"/>
+                    <a16:rowId xmlns:a16="http://schemas.microsoft.com/office/drawing/2014/main" val="1550085656"/>
                   </a:ext>
                 </a:extLst>
               </a:tr>
@@ -5546,7 +5563,7 @@
                 </a:tc>
                 <a:extLst>
                   <a:ext uri="{0D108BD9-81ED-4DB2-BD59-A6C34878D82A}">
-                    <a16:rowId xmlns:a16="http://schemas.microsoft.com/office/drawing/2014/main" xmlns="" val="3665824223"/>
+                    <a16:rowId xmlns:a16="http://schemas.microsoft.com/office/drawing/2014/main" val="3665824223"/>
                   </a:ext>
                 </a:extLst>
               </a:tr>
@@ -5657,7 +5674,7 @@
                 </a:tc>
                 <a:extLst>
                   <a:ext uri="{0D108BD9-81ED-4DB2-BD59-A6C34878D82A}">
-                    <a16:rowId xmlns:a16="http://schemas.microsoft.com/office/drawing/2014/main" xmlns="" val="4095835183"/>
+                    <a16:rowId xmlns:a16="http://schemas.microsoft.com/office/drawing/2014/main" val="4095835183"/>
                   </a:ext>
                 </a:extLst>
               </a:tr>
@@ -5754,7 +5771,7 @@
                 </a:tc>
                 <a:extLst>
                   <a:ext uri="{0D108BD9-81ED-4DB2-BD59-A6C34878D82A}">
-                    <a16:rowId xmlns:a16="http://schemas.microsoft.com/office/drawing/2014/main" xmlns="" val="2388995701"/>
+                    <a16:rowId xmlns:a16="http://schemas.microsoft.com/office/drawing/2014/main" val="2388995701"/>
                   </a:ext>
                 </a:extLst>
               </a:tr>
@@ -5851,7 +5868,7 @@
                 </a:tc>
                 <a:extLst>
                   <a:ext uri="{0D108BD9-81ED-4DB2-BD59-A6C34878D82A}">
-                    <a16:rowId xmlns:a16="http://schemas.microsoft.com/office/drawing/2014/main" xmlns="" val="1549553246"/>
+                    <a16:rowId xmlns:a16="http://schemas.microsoft.com/office/drawing/2014/main" val="1549553246"/>
                   </a:ext>
                 </a:extLst>
               </a:tr>
@@ -5958,7 +5975,7 @@
                 </a:tc>
                 <a:extLst>
                   <a:ext uri="{0D108BD9-81ED-4DB2-BD59-A6C34878D82A}">
-                    <a16:rowId xmlns:a16="http://schemas.microsoft.com/office/drawing/2014/main" xmlns="" val="2325486976"/>
+                    <a16:rowId xmlns:a16="http://schemas.microsoft.com/office/drawing/2014/main" val="2325486976"/>
                   </a:ext>
                 </a:extLst>
               </a:tr>
@@ -6071,7 +6088,7 @@
                 </a:tc>
                 <a:extLst>
                   <a:ext uri="{0D108BD9-81ED-4DB2-BD59-A6C34878D82A}">
-                    <a16:rowId xmlns:a16="http://schemas.microsoft.com/office/drawing/2014/main" xmlns="" val="108756169"/>
+                    <a16:rowId xmlns:a16="http://schemas.microsoft.com/office/drawing/2014/main" val="108756169"/>
                   </a:ext>
                 </a:extLst>
               </a:tr>
@@ -6208,7 +6225,7 @@
                 </a:tc>
                 <a:extLst>
                   <a:ext uri="{0D108BD9-81ED-4DB2-BD59-A6C34878D82A}">
-                    <a16:rowId xmlns:a16="http://schemas.microsoft.com/office/drawing/2014/main" xmlns="" val="868174123"/>
+                    <a16:rowId xmlns:a16="http://schemas.microsoft.com/office/drawing/2014/main" val="868174123"/>
                   </a:ext>
                 </a:extLst>
               </a:tr>
@@ -6305,7 +6322,7 @@
                 </a:tc>
                 <a:extLst>
                   <a:ext uri="{0D108BD9-81ED-4DB2-BD59-A6C34878D82A}">
-                    <a16:rowId xmlns:a16="http://schemas.microsoft.com/office/drawing/2014/main" xmlns="" val="1773180674"/>
+                    <a16:rowId xmlns:a16="http://schemas.microsoft.com/office/drawing/2014/main" val="1773180674"/>
                   </a:ext>
                 </a:extLst>
               </a:tr>
@@ -6402,7 +6419,7 @@
                 </a:tc>
                 <a:extLst>
                   <a:ext uri="{0D108BD9-81ED-4DB2-BD59-A6C34878D82A}">
-                    <a16:rowId xmlns:a16="http://schemas.microsoft.com/office/drawing/2014/main" xmlns="" val="324761190"/>
+                    <a16:rowId xmlns:a16="http://schemas.microsoft.com/office/drawing/2014/main" val="324761190"/>
                   </a:ext>
                 </a:extLst>
               </a:tr>
@@ -6509,7 +6526,7 @@
                 </a:tc>
                 <a:extLst>
                   <a:ext uri="{0D108BD9-81ED-4DB2-BD59-A6C34878D82A}">
-                    <a16:rowId xmlns:a16="http://schemas.microsoft.com/office/drawing/2014/main" xmlns="" val="1775108306"/>
+                    <a16:rowId xmlns:a16="http://schemas.microsoft.com/office/drawing/2014/main" val="1775108306"/>
                   </a:ext>
                 </a:extLst>
               </a:tr>
@@ -6622,7 +6639,7 @@
                 </a:tc>
                 <a:extLst>
                   <a:ext uri="{0D108BD9-81ED-4DB2-BD59-A6C34878D82A}">
-                    <a16:rowId xmlns:a16="http://schemas.microsoft.com/office/drawing/2014/main" xmlns="" val="2613320283"/>
+                    <a16:rowId xmlns:a16="http://schemas.microsoft.com/office/drawing/2014/main" val="2613320283"/>
                   </a:ext>
                 </a:extLst>
               </a:tr>
@@ -6665,7 +6682,7 @@
           <p:cNvPr id="2" name="Title 1">
             <a:extLst>
               <a:ext uri="{FF2B5EF4-FFF2-40B4-BE49-F238E27FC236}">
-                <a16:creationId xmlns:a16="http://schemas.microsoft.com/office/drawing/2014/main" xmlns="" id="{6DB497BC-6377-4BD4-A8A6-D232ABBA0506}"/>
+                <a16:creationId xmlns:a16="http://schemas.microsoft.com/office/drawing/2014/main" id="{6DB497BC-6377-4BD4-A8A6-D232ABBA0506}"/>
               </a:ext>
             </a:extLst>
           </p:cNvPr>
@@ -6694,7 +6711,7 @@
           <p:cNvPr id="5" name="Content Placeholder 6">
             <a:extLst>
               <a:ext uri="{FF2B5EF4-FFF2-40B4-BE49-F238E27FC236}">
-                <a16:creationId xmlns:a16="http://schemas.microsoft.com/office/drawing/2014/main" xmlns="" id="{DC4197B8-28FC-42A2-AD89-532EB3608797}"/>
+                <a16:creationId xmlns:a16="http://schemas.microsoft.com/office/drawing/2014/main" id="{DC4197B8-28FC-42A2-AD89-532EB3608797}"/>
               </a:ext>
             </a:extLst>
           </p:cNvPr>
@@ -6705,7 +6722,7 @@
             <p:ph idx="1"/>
             <p:extLst>
               <p:ext uri="{D42A27DB-BD31-4B8C-83A1-F6EECF244321}">
-                <p14:modId xmlns:p14="http://schemas.microsoft.com/office/powerpoint/2010/main" val="2323612580"/>
+                <p14:modId xmlns:p14="http://schemas.microsoft.com/office/powerpoint/2010/main" val="2319884376"/>
               </p:ext>
             </p:extLst>
           </p:nvPr>
@@ -6724,35 +6741,35 @@
                 <a:gridCol w="1878430">
                   <a:extLst>
                     <a:ext uri="{9D8B030D-6E8A-4147-A177-3AD203B41FA5}">
-                      <a16:colId xmlns:a16="http://schemas.microsoft.com/office/drawing/2014/main" xmlns="" val="20000"/>
+                      <a16:colId xmlns:a16="http://schemas.microsoft.com/office/drawing/2014/main" val="20000"/>
                     </a:ext>
                   </a:extLst>
                 </a:gridCol>
                 <a:gridCol w="4212205">
                   <a:extLst>
                     <a:ext uri="{9D8B030D-6E8A-4147-A177-3AD203B41FA5}">
-                      <a16:colId xmlns:a16="http://schemas.microsoft.com/office/drawing/2014/main" xmlns="" val="20001"/>
+                      <a16:colId xmlns:a16="http://schemas.microsoft.com/office/drawing/2014/main" val="20001"/>
                     </a:ext>
                   </a:extLst>
                 </a:gridCol>
                 <a:gridCol w="1165829">
                   <a:extLst>
                     <a:ext uri="{9D8B030D-6E8A-4147-A177-3AD203B41FA5}">
-                      <a16:colId xmlns:a16="http://schemas.microsoft.com/office/drawing/2014/main" xmlns="" val="20002"/>
+                      <a16:colId xmlns:a16="http://schemas.microsoft.com/office/drawing/2014/main" val="20002"/>
                     </a:ext>
                   </a:extLst>
                 </a:gridCol>
                 <a:gridCol w="1252326">
                   <a:extLst>
                     <a:ext uri="{9D8B030D-6E8A-4147-A177-3AD203B41FA5}">
-                      <a16:colId xmlns:a16="http://schemas.microsoft.com/office/drawing/2014/main" xmlns="" val="20003"/>
+                      <a16:colId xmlns:a16="http://schemas.microsoft.com/office/drawing/2014/main" val="20003"/>
                     </a:ext>
                   </a:extLst>
                 </a:gridCol>
                 <a:gridCol w="1252326">
                   <a:extLst>
                     <a:ext uri="{9D8B030D-6E8A-4147-A177-3AD203B41FA5}">
-                      <a16:colId xmlns:a16="http://schemas.microsoft.com/office/drawing/2014/main" xmlns="" val="20004"/>
+                      <a16:colId xmlns:a16="http://schemas.microsoft.com/office/drawing/2014/main" val="20004"/>
                     </a:ext>
                   </a:extLst>
                 </a:gridCol>
@@ -6869,7 +6886,7 @@
                 </a:tc>
                 <a:extLst>
                   <a:ext uri="{0D108BD9-81ED-4DB2-BD59-A6C34878D82A}">
-                    <a16:rowId xmlns:a16="http://schemas.microsoft.com/office/drawing/2014/main" xmlns="" val="10000"/>
+                    <a16:rowId xmlns:a16="http://schemas.microsoft.com/office/drawing/2014/main" val="10000"/>
                   </a:ext>
                 </a:extLst>
               </a:tr>
@@ -6934,7 +6951,7 @@
                     <a:p>
                       <a:pPr algn="r" fontAlgn="b"/>
                       <a:r>
-                        <a:rPr lang="en-GB" sz="1600" b="0" i="0" u="none" strike="noStrike">
+                        <a:rPr lang="en-GB" sz="1600" b="0" i="0" u="none" strike="noStrike" dirty="0">
                           <a:solidFill>
                             <a:srgbClr val="000000"/>
                           </a:solidFill>
@@ -6989,7 +7006,7 @@
                 </a:tc>
                 <a:extLst>
                   <a:ext uri="{0D108BD9-81ED-4DB2-BD59-A6C34878D82A}">
-                    <a16:rowId xmlns:a16="http://schemas.microsoft.com/office/drawing/2014/main" xmlns="" val="10001"/>
+                    <a16:rowId xmlns:a16="http://schemas.microsoft.com/office/drawing/2014/main" val="10001"/>
                   </a:ext>
                 </a:extLst>
               </a:tr>
@@ -7041,7 +7058,7 @@
                     <a:p>
                       <a:pPr algn="r" fontAlgn="b"/>
                       <a:r>
-                        <a:rPr lang="en-GB" sz="1600" b="0" i="0" u="none" strike="noStrike">
+                        <a:rPr lang="en-GB" sz="1600" b="0" i="0" u="none" strike="noStrike" dirty="0">
                           <a:solidFill>
                             <a:srgbClr val="000000"/>
                           </a:solidFill>
@@ -7096,7 +7113,7 @@
                 </a:tc>
                 <a:extLst>
                   <a:ext uri="{0D108BD9-81ED-4DB2-BD59-A6C34878D82A}">
-                    <a16:rowId xmlns:a16="http://schemas.microsoft.com/office/drawing/2014/main" xmlns="" val="10002"/>
+                    <a16:rowId xmlns:a16="http://schemas.microsoft.com/office/drawing/2014/main" val="10002"/>
                   </a:ext>
                 </a:extLst>
               </a:tr>
@@ -7138,7 +7155,7 @@
                     <a:p>
                       <a:pPr algn="r" fontAlgn="b"/>
                       <a:r>
-                        <a:rPr lang="en-GB" sz="1600" b="0" i="0" u="none" strike="noStrike">
+                        <a:rPr lang="en-GB" sz="1600" b="0" i="0" u="none" strike="noStrike" dirty="0">
                           <a:solidFill>
                             <a:srgbClr val="000000"/>
                           </a:solidFill>
@@ -7193,7 +7210,7 @@
                 </a:tc>
                 <a:extLst>
                   <a:ext uri="{0D108BD9-81ED-4DB2-BD59-A6C34878D82A}">
-                    <a16:rowId xmlns:a16="http://schemas.microsoft.com/office/drawing/2014/main" xmlns="" val="10003"/>
+                    <a16:rowId xmlns:a16="http://schemas.microsoft.com/office/drawing/2014/main" val="10003"/>
                   </a:ext>
                 </a:extLst>
               </a:tr>
@@ -7290,7 +7307,7 @@
                 </a:tc>
                 <a:extLst>
                   <a:ext uri="{0D108BD9-81ED-4DB2-BD59-A6C34878D82A}">
-                    <a16:rowId xmlns:a16="http://schemas.microsoft.com/office/drawing/2014/main" xmlns="" val="10004"/>
+                    <a16:rowId xmlns:a16="http://schemas.microsoft.com/office/drawing/2014/main" val="10004"/>
                   </a:ext>
                 </a:extLst>
               </a:tr>
@@ -7387,7 +7404,7 @@
                 </a:tc>
                 <a:extLst>
                   <a:ext uri="{0D108BD9-81ED-4DB2-BD59-A6C34878D82A}">
-                    <a16:rowId xmlns:a16="http://schemas.microsoft.com/office/drawing/2014/main" xmlns="" val="10005"/>
+                    <a16:rowId xmlns:a16="http://schemas.microsoft.com/office/drawing/2014/main" val="10005"/>
                   </a:ext>
                 </a:extLst>
               </a:tr>
@@ -7421,16 +7438,19 @@
                     <a:lstStyle/>
                     <a:p>
                       <a:pPr algn="l" fontAlgn="b"/>
-                      <a:endParaRPr lang="en-US" sz="1600" b="0" i="0" u="none" strike="noStrike" dirty="0">
-                        <a:solidFill>
-                          <a:srgbClr val="000000"/>
-                        </a:solidFill>
-                        <a:effectLst/>
-                        <a:latin typeface="Calibri" charset="0"/>
-                      </a:endParaRPr>
-                    </a:p>
-                  </a:txBody>
-                  <a:tcPr marL="2812" marR="2812" marT="2812" marB="0" anchor="b"/>
+                      <a:r>
+                        <a:rPr lang="en-GB" sz="1600" b="0" i="0" u="none" strike="noStrike" dirty="0">
+                          <a:solidFill>
+                            <a:srgbClr val="000000"/>
+                          </a:solidFill>
+                          <a:effectLst/>
+                          <a:latin typeface="Calibri" panose="020F0502020204030204" pitchFamily="34" charset="0"/>
+                        </a:rPr>
+                        <a:t>hbcu2* </a:t>
+                      </a:r>
+                    </a:p>
+                  </a:txBody>
+                  <a:tcPr marL="6350" marR="6350" marT="6350" marB="0" anchor="b"/>
                 </a:tc>
                 <a:tc>
                   <a:txBody>
@@ -7438,16 +7458,19 @@
                     <a:lstStyle/>
                     <a:p>
                       <a:pPr algn="r" fontAlgn="b"/>
-                      <a:endParaRPr lang="mr-IN" sz="1600" b="0" i="0" u="none" strike="noStrike" dirty="0">
-                        <a:solidFill>
-                          <a:srgbClr val="000000"/>
-                        </a:solidFill>
-                        <a:effectLst/>
-                        <a:latin typeface="Lucida Grande" charset="0"/>
-                      </a:endParaRPr>
-                    </a:p>
-                  </a:txBody>
-                  <a:tcPr marL="2812" marR="2812" marT="2812" marB="0" anchor="b"/>
+                      <a:r>
+                        <a:rPr lang="en-GB" sz="1600" b="0" i="0" u="none" strike="noStrike" dirty="0">
+                          <a:solidFill>
+                            <a:srgbClr val="000000"/>
+                          </a:solidFill>
+                          <a:effectLst/>
+                          <a:latin typeface="Calibri" panose="020F0502020204030204" pitchFamily="34" charset="0"/>
+                        </a:rPr>
+                        <a:t>0.2078</a:t>
+                      </a:r>
+                    </a:p>
+                  </a:txBody>
+                  <a:tcPr marL="6350" marR="6350" marT="6350" marB="0" anchor="b"/>
                 </a:tc>
                 <a:tc>
                   <a:txBody>
@@ -7455,16 +7478,19 @@
                     <a:lstStyle/>
                     <a:p>
                       <a:pPr algn="r" fontAlgn="b"/>
-                      <a:endParaRPr lang="mr-IN" sz="1600" b="0" i="0" u="none" strike="noStrike">
-                        <a:solidFill>
-                          <a:srgbClr val="000000"/>
-                        </a:solidFill>
-                        <a:effectLst/>
-                        <a:latin typeface="Lucida Grande" charset="0"/>
-                      </a:endParaRPr>
-                    </a:p>
-                  </a:txBody>
-                  <a:tcPr marL="2812" marR="2812" marT="2812" marB="0" anchor="b"/>
+                      <a:r>
+                        <a:rPr lang="en-GB" sz="1600" b="0" i="0" u="none" strike="noStrike">
+                          <a:solidFill>
+                            <a:srgbClr val="000000"/>
+                          </a:solidFill>
+                          <a:effectLst/>
+                          <a:latin typeface="Calibri" panose="020F0502020204030204" pitchFamily="34" charset="0"/>
+                        </a:rPr>
+                        <a:t>0.04</a:t>
+                      </a:r>
+                    </a:p>
+                  </a:txBody>
+                  <a:tcPr marL="6350" marR="6350" marT="6350" marB="0" anchor="b"/>
                 </a:tc>
                 <a:tc>
                   <a:txBody>
@@ -7472,20 +7498,23 @@
                     <a:lstStyle/>
                     <a:p>
                       <a:pPr algn="r" fontAlgn="b"/>
-                      <a:endParaRPr lang="is-IS" sz="1600" b="0" i="0" u="none" strike="noStrike">
-                        <a:solidFill>
-                          <a:srgbClr val="000000"/>
-                        </a:solidFill>
-                        <a:effectLst/>
-                        <a:latin typeface="Lucida Grande" charset="0"/>
-                      </a:endParaRPr>
-                    </a:p>
-                  </a:txBody>
-                  <a:tcPr marL="2812" marR="2812" marT="2812" marB="0" anchor="b"/>
+                      <a:r>
+                        <a:rPr lang="en-GB" sz="1600" b="0" i="0" u="none" strike="noStrike">
+                          <a:solidFill>
+                            <a:srgbClr val="000000"/>
+                          </a:solidFill>
+                          <a:effectLst/>
+                          <a:latin typeface="Calibri" panose="020F0502020204030204" pitchFamily="34" charset="0"/>
+                        </a:rPr>
+                        <a:t>0.0000</a:t>
+                      </a:r>
+                    </a:p>
+                  </a:txBody>
+                  <a:tcPr marL="6350" marR="6350" marT="6350" marB="0" anchor="b"/>
                 </a:tc>
                 <a:extLst>
                   <a:ext uri="{0D108BD9-81ED-4DB2-BD59-A6C34878D82A}">
-                    <a16:rowId xmlns:a16="http://schemas.microsoft.com/office/drawing/2014/main" xmlns="" val="10006"/>
+                    <a16:rowId xmlns:a16="http://schemas.microsoft.com/office/drawing/2014/main" val="10006"/>
                   </a:ext>
                 </a:extLst>
               </a:tr>
@@ -7513,18 +7542,29 @@
                     <a:lstStyle/>
                     <a:p>
                       <a:pPr algn="l" fontAlgn="b"/>
-                      <a:endParaRPr lang="en-US" sz="1600" b="0" i="0" u="none" strike="noStrike" dirty="0">
-                        <a:solidFill>
-                          <a:schemeClr val="accent6">
-                            <a:lumMod val="75000"/>
-                          </a:schemeClr>
-                        </a:solidFill>
-                        <a:effectLst/>
-                        <a:latin typeface="Calibri" charset="0"/>
-                      </a:endParaRPr>
-                    </a:p>
-                  </a:txBody>
-                  <a:tcPr marL="2812" marR="2812" marT="2812" marB="0" anchor="b"/>
+                      <a:r>
+                        <a:rPr lang="en-GB" sz="1600" b="0" i="0" u="none" strike="noStrike" dirty="0" err="1">
+                          <a:solidFill>
+                            <a:srgbClr val="000000"/>
+                          </a:solidFill>
+                          <a:effectLst/>
+                          <a:latin typeface="Calibri" panose="020F0502020204030204" pitchFamily="34" charset="0"/>
+                        </a:rPr>
+                        <a:t>fed_grant_num</a:t>
+                      </a:r>
+                      <a:r>
+                        <a:rPr lang="en-GB" sz="1600" b="0" i="0" u="none" strike="noStrike" dirty="0">
+                          <a:solidFill>
+                            <a:srgbClr val="000000"/>
+                          </a:solidFill>
+                          <a:effectLst/>
+                          <a:latin typeface="Calibri" panose="020F0502020204030204" pitchFamily="34" charset="0"/>
+                        </a:rPr>
+                        <a:t>  </a:t>
+                      </a:r>
+                    </a:p>
+                  </a:txBody>
+                  <a:tcPr marL="6350" marR="6350" marT="6350" marB="0" anchor="b"/>
                 </a:tc>
                 <a:tc>
                   <a:txBody>
@@ -7532,18 +7572,19 @@
                     <a:lstStyle/>
                     <a:p>
                       <a:pPr algn="r" fontAlgn="b"/>
-                      <a:endParaRPr lang="mr-IN" sz="1600" b="0" i="0" u="none" strike="noStrike" dirty="0">
-                        <a:solidFill>
-                          <a:schemeClr val="accent6">
-                            <a:lumMod val="75000"/>
-                          </a:schemeClr>
-                        </a:solidFill>
-                        <a:effectLst/>
-                        <a:latin typeface="Lucida Grande" charset="0"/>
-                      </a:endParaRPr>
-                    </a:p>
-                  </a:txBody>
-                  <a:tcPr marL="2812" marR="2812" marT="2812" marB="0" anchor="b"/>
+                      <a:r>
+                        <a:rPr lang="en-GB" sz="1600" b="0" i="0" u="none" strike="noStrike" dirty="0">
+                          <a:solidFill>
+                            <a:srgbClr val="000000"/>
+                          </a:solidFill>
+                          <a:effectLst/>
+                          <a:latin typeface="Calibri" panose="020F0502020204030204" pitchFamily="34" charset="0"/>
+                        </a:rPr>
+                        <a:t>0.0836</a:t>
+                      </a:r>
+                    </a:p>
+                  </a:txBody>
+                  <a:tcPr marL="6350" marR="6350" marT="6350" marB="0" anchor="b"/>
                 </a:tc>
                 <a:tc>
                   <a:txBody>
@@ -7551,18 +7592,19 @@
                     <a:lstStyle/>
                     <a:p>
                       <a:pPr algn="r" fontAlgn="b"/>
-                      <a:endParaRPr lang="mr-IN" sz="1600" b="0" i="0" u="none" strike="noStrike" dirty="0">
-                        <a:solidFill>
-                          <a:schemeClr val="accent6">
-                            <a:lumMod val="75000"/>
-                          </a:schemeClr>
-                        </a:solidFill>
-                        <a:effectLst/>
-                        <a:latin typeface="Lucida Grande" charset="0"/>
-                      </a:endParaRPr>
-                    </a:p>
-                  </a:txBody>
-                  <a:tcPr marL="2812" marR="2812" marT="2812" marB="0" anchor="b"/>
+                      <a:r>
+                        <a:rPr lang="en-GB" sz="1600" b="0" i="0" u="none" strike="noStrike" dirty="0">
+                          <a:solidFill>
+                            <a:srgbClr val="000000"/>
+                          </a:solidFill>
+                          <a:effectLst/>
+                          <a:latin typeface="Calibri" panose="020F0502020204030204" pitchFamily="34" charset="0"/>
+                        </a:rPr>
+                        <a:t>0.0029</a:t>
+                      </a:r>
+                    </a:p>
+                  </a:txBody>
+                  <a:tcPr marL="6350" marR="6350" marT="6350" marB="0" anchor="b"/>
                 </a:tc>
                 <a:tc>
                   <a:txBody>
@@ -7570,22 +7612,23 @@
                     <a:lstStyle/>
                     <a:p>
                       <a:pPr algn="r" fontAlgn="b"/>
-                      <a:endParaRPr lang="en-US" sz="1600" b="0" i="0" u="none" strike="noStrike" dirty="0">
-                        <a:solidFill>
-                          <a:schemeClr val="accent6">
-                            <a:lumMod val="75000"/>
-                          </a:schemeClr>
-                        </a:solidFill>
-                        <a:effectLst/>
-                        <a:latin typeface="Lucida Grande" charset="0"/>
-                      </a:endParaRPr>
-                    </a:p>
-                  </a:txBody>
-                  <a:tcPr marL="2812" marR="2812" marT="2812" marB="0" anchor="b"/>
+                      <a:r>
+                        <a:rPr lang="en-GB" sz="1600" b="0" i="0" u="none" strike="noStrike">
+                          <a:solidFill>
+                            <a:srgbClr val="000000"/>
+                          </a:solidFill>
+                          <a:effectLst/>
+                          <a:latin typeface="Calibri" panose="020F0502020204030204" pitchFamily="34" charset="0"/>
+                        </a:rPr>
+                        <a:t>0.0000</a:t>
+                      </a:r>
+                    </a:p>
+                  </a:txBody>
+                  <a:tcPr marL="6350" marR="6350" marT="6350" marB="0" anchor="b"/>
                 </a:tc>
                 <a:extLst>
                   <a:ext uri="{0D108BD9-81ED-4DB2-BD59-A6C34878D82A}">
-                    <a16:rowId xmlns:a16="http://schemas.microsoft.com/office/drawing/2014/main" xmlns="" val="10007"/>
+                    <a16:rowId xmlns:a16="http://schemas.microsoft.com/office/drawing/2014/main" val="10007"/>
                   </a:ext>
                 </a:extLst>
               </a:tr>
@@ -7613,16 +7656,29 @@
                     <a:lstStyle/>
                     <a:p>
                       <a:pPr algn="l" fontAlgn="b"/>
-                      <a:endParaRPr lang="en-US" sz="1600" b="0" i="0" u="none" strike="noStrike" dirty="0">
-                        <a:solidFill>
-                          <a:srgbClr val="FF0000"/>
-                        </a:solidFill>
-                        <a:effectLst/>
-                        <a:latin typeface="Calibri" charset="0"/>
-                      </a:endParaRPr>
-                    </a:p>
-                  </a:txBody>
-                  <a:tcPr marL="2812" marR="2812" marT="2812" marB="0" anchor="b"/>
+                      <a:r>
+                        <a:rPr lang="en-GB" sz="1600" b="0" i="0" u="none" strike="noStrike" dirty="0" err="1">
+                          <a:solidFill>
+                            <a:srgbClr val="000000"/>
+                          </a:solidFill>
+                          <a:effectLst/>
+                          <a:latin typeface="Calibri" panose="020F0502020204030204" pitchFamily="34" charset="0"/>
+                        </a:rPr>
+                        <a:t>other_ed_related_cost</a:t>
+                      </a:r>
+                      <a:r>
+                        <a:rPr lang="en-GB" sz="1600" b="0" i="0" u="none" strike="noStrike" dirty="0">
+                          <a:solidFill>
+                            <a:srgbClr val="000000"/>
+                          </a:solidFill>
+                          <a:effectLst/>
+                          <a:latin typeface="Calibri" panose="020F0502020204030204" pitchFamily="34" charset="0"/>
+                        </a:rPr>
+                        <a:t> </a:t>
+                      </a:r>
+                    </a:p>
+                  </a:txBody>
+                  <a:tcPr marL="6350" marR="6350" marT="6350" marB="0" anchor="b"/>
                 </a:tc>
                 <a:tc>
                   <a:txBody>
@@ -7630,16 +7686,19 @@
                     <a:lstStyle/>
                     <a:p>
                       <a:pPr algn="r" fontAlgn="b"/>
-                      <a:endParaRPr lang="mr-IN" sz="1600" b="0" i="0" u="none" strike="noStrike" dirty="0">
-                        <a:solidFill>
-                          <a:srgbClr val="FF0000"/>
-                        </a:solidFill>
-                        <a:effectLst/>
-                        <a:latin typeface="Lucida Grande" charset="0"/>
-                      </a:endParaRPr>
-                    </a:p>
-                  </a:txBody>
-                  <a:tcPr marL="2812" marR="2812" marT="2812" marB="0" anchor="b"/>
+                      <a:r>
+                        <a:rPr lang="en-GB" sz="1600" b="0" i="0" u="none" strike="noStrike" dirty="0">
+                          <a:solidFill>
+                            <a:srgbClr val="000000"/>
+                          </a:solidFill>
+                          <a:effectLst/>
+                          <a:latin typeface="Calibri" panose="020F0502020204030204" pitchFamily="34" charset="0"/>
+                        </a:rPr>
+                        <a:t>0.0971</a:t>
+                      </a:r>
+                    </a:p>
+                  </a:txBody>
+                  <a:tcPr marL="6350" marR="6350" marT="6350" marB="0" anchor="b"/>
                 </a:tc>
                 <a:tc>
                   <a:txBody>
@@ -7647,16 +7706,19 @@
                     <a:lstStyle/>
                     <a:p>
                       <a:pPr algn="r" fontAlgn="b"/>
-                      <a:endParaRPr lang="mr-IN" sz="1600" b="0" i="0" u="none" strike="noStrike" dirty="0">
-                        <a:solidFill>
-                          <a:srgbClr val="FF0000"/>
-                        </a:solidFill>
-                        <a:effectLst/>
-                        <a:latin typeface="Lucida Grande" charset="0"/>
-                      </a:endParaRPr>
-                    </a:p>
-                  </a:txBody>
-                  <a:tcPr marL="2812" marR="2812" marT="2812" marB="0" anchor="b"/>
+                      <a:r>
+                        <a:rPr lang="en-GB" sz="1600" b="0" i="0" u="none" strike="noStrike" dirty="0">
+                          <a:solidFill>
+                            <a:srgbClr val="000000"/>
+                          </a:solidFill>
+                          <a:effectLst/>
+                          <a:latin typeface="Calibri" panose="020F0502020204030204" pitchFamily="34" charset="0"/>
+                        </a:rPr>
+                        <a:t>0.0027</a:t>
+                      </a:r>
+                    </a:p>
+                  </a:txBody>
+                  <a:tcPr marL="6350" marR="6350" marT="6350" marB="0" anchor="b"/>
                 </a:tc>
                 <a:tc>
                   <a:txBody>
@@ -7664,20 +7726,23 @@
                     <a:lstStyle/>
                     <a:p>
                       <a:pPr algn="r" fontAlgn="b"/>
-                      <a:endParaRPr lang="is-IS" sz="1600" b="0" i="0" u="none" strike="noStrike" dirty="0">
-                        <a:solidFill>
-                          <a:srgbClr val="FF0000"/>
-                        </a:solidFill>
-                        <a:effectLst/>
-                        <a:latin typeface="Lucida Grande" charset="0"/>
-                      </a:endParaRPr>
-                    </a:p>
-                  </a:txBody>
-                  <a:tcPr marL="2812" marR="2812" marT="2812" marB="0" anchor="b"/>
+                      <a:r>
+                        <a:rPr lang="en-GB" sz="1600" b="0" i="0" u="none" strike="noStrike">
+                          <a:solidFill>
+                            <a:srgbClr val="000000"/>
+                          </a:solidFill>
+                          <a:effectLst/>
+                          <a:latin typeface="Calibri" panose="020F0502020204030204" pitchFamily="34" charset="0"/>
+                        </a:rPr>
+                        <a:t>0.0000</a:t>
+                      </a:r>
+                    </a:p>
+                  </a:txBody>
+                  <a:tcPr marL="6350" marR="6350" marT="6350" marB="0" anchor="b"/>
                 </a:tc>
                 <a:extLst>
                   <a:ext uri="{0D108BD9-81ED-4DB2-BD59-A6C34878D82A}">
-                    <a16:rowId xmlns:a16="http://schemas.microsoft.com/office/drawing/2014/main" xmlns="" val="10008"/>
+                    <a16:rowId xmlns:a16="http://schemas.microsoft.com/office/drawing/2014/main" val="10008"/>
                   </a:ext>
                 </a:extLst>
               </a:tr>
@@ -7705,16 +7770,29 @@
                     <a:lstStyle/>
                     <a:p>
                       <a:pPr algn="l" fontAlgn="b"/>
-                      <a:endParaRPr lang="en-US" sz="1600" b="0" i="0" u="none" strike="noStrike" dirty="0">
-                        <a:solidFill>
-                          <a:srgbClr val="000000"/>
-                        </a:solidFill>
-                        <a:effectLst/>
-                        <a:latin typeface="Calibri" charset="0"/>
-                      </a:endParaRPr>
-                    </a:p>
-                  </a:txBody>
-                  <a:tcPr marL="2812" marR="2812" marT="2812" marB="0" anchor="b"/>
+                      <a:r>
+                        <a:rPr lang="en-GB" sz="1600" b="0" i="0" u="none" strike="noStrike" dirty="0" err="1">
+                          <a:solidFill>
+                            <a:srgbClr val="000000"/>
+                          </a:solidFill>
+                          <a:effectLst/>
+                          <a:latin typeface="Calibri" panose="020F0502020204030204" pitchFamily="34" charset="0"/>
+                        </a:rPr>
+                        <a:t>inst_grant_num</a:t>
+                      </a:r>
+                      <a:r>
+                        <a:rPr lang="en-GB" sz="1600" b="0" i="0" u="none" strike="noStrike" dirty="0">
+                          <a:solidFill>
+                            <a:srgbClr val="000000"/>
+                          </a:solidFill>
+                          <a:effectLst/>
+                          <a:latin typeface="Calibri" panose="020F0502020204030204" pitchFamily="34" charset="0"/>
+                        </a:rPr>
+                        <a:t> </a:t>
+                      </a:r>
+                    </a:p>
+                  </a:txBody>
+                  <a:tcPr marL="6350" marR="6350" marT="6350" marB="0" anchor="b"/>
                 </a:tc>
                 <a:tc>
                   <a:txBody>
@@ -7722,16 +7800,19 @@
                     <a:lstStyle/>
                     <a:p>
                       <a:pPr algn="r" fontAlgn="b"/>
-                      <a:endParaRPr lang="mr-IN" sz="1600" b="0" i="0" u="none" strike="noStrike" dirty="0">
-                        <a:solidFill>
-                          <a:srgbClr val="000000"/>
-                        </a:solidFill>
-                        <a:effectLst/>
-                        <a:latin typeface="Lucida Grande" charset="0"/>
-                      </a:endParaRPr>
-                    </a:p>
-                  </a:txBody>
-                  <a:tcPr marL="2812" marR="2812" marT="2812" marB="0" anchor="b"/>
+                      <a:r>
+                        <a:rPr lang="en-GB" sz="1600" b="0" i="0" u="none" strike="noStrike" dirty="0">
+                          <a:solidFill>
+                            <a:srgbClr val="000000"/>
+                          </a:solidFill>
+                          <a:effectLst/>
+                          <a:latin typeface="Calibri" panose="020F0502020204030204" pitchFamily="34" charset="0"/>
+                        </a:rPr>
+                        <a:t>0.0353</a:t>
+                      </a:r>
+                    </a:p>
+                  </a:txBody>
+                  <a:tcPr marL="6350" marR="6350" marT="6350" marB="0" anchor="b"/>
                 </a:tc>
                 <a:tc>
                   <a:txBody>
@@ -7739,16 +7820,19 @@
                     <a:lstStyle/>
                     <a:p>
                       <a:pPr algn="r" fontAlgn="b"/>
-                      <a:endParaRPr lang="mr-IN" sz="1600" b="0" i="0" u="none" strike="noStrike" dirty="0">
-                        <a:solidFill>
-                          <a:srgbClr val="000000"/>
-                        </a:solidFill>
-                        <a:effectLst/>
-                        <a:latin typeface="Lucida Grande" charset="0"/>
-                      </a:endParaRPr>
-                    </a:p>
-                  </a:txBody>
-                  <a:tcPr marL="2812" marR="2812" marT="2812" marB="0" anchor="b"/>
+                      <a:r>
+                        <a:rPr lang="en-GB" sz="1600" b="0" i="0" u="none" strike="noStrike" dirty="0">
+                          <a:solidFill>
+                            <a:srgbClr val="000000"/>
+                          </a:solidFill>
+                          <a:effectLst/>
+                          <a:latin typeface="Calibri" panose="020F0502020204030204" pitchFamily="34" charset="0"/>
+                        </a:rPr>
+                        <a:t>0.0023</a:t>
+                      </a:r>
+                    </a:p>
+                  </a:txBody>
+                  <a:tcPr marL="6350" marR="6350" marT="6350" marB="0" anchor="b"/>
                 </a:tc>
                 <a:tc>
                   <a:txBody>
@@ -7756,20 +7840,23 @@
                     <a:lstStyle/>
                     <a:p>
                       <a:pPr algn="r" fontAlgn="b"/>
-                      <a:endParaRPr lang="nb-NO" sz="1600" b="0" i="0" u="none" strike="noStrike" dirty="0">
-                        <a:solidFill>
-                          <a:srgbClr val="000000"/>
-                        </a:solidFill>
-                        <a:effectLst/>
-                        <a:latin typeface="Lucida Grande" charset="0"/>
-                      </a:endParaRPr>
-                    </a:p>
-                  </a:txBody>
-                  <a:tcPr marL="2812" marR="2812" marT="2812" marB="0" anchor="b"/>
+                      <a:r>
+                        <a:rPr lang="en-GB" sz="1600" b="0" i="0" u="none" strike="noStrike" dirty="0">
+                          <a:solidFill>
+                            <a:srgbClr val="000000"/>
+                          </a:solidFill>
+                          <a:effectLst/>
+                          <a:latin typeface="Calibri" panose="020F0502020204030204" pitchFamily="34" charset="0"/>
+                        </a:rPr>
+                        <a:t>0.0000</a:t>
+                      </a:r>
+                    </a:p>
+                  </a:txBody>
+                  <a:tcPr marL="6350" marR="6350" marT="6350" marB="0" anchor="b"/>
                 </a:tc>
                 <a:extLst>
                   <a:ext uri="{0D108BD9-81ED-4DB2-BD59-A6C34878D82A}">
-                    <a16:rowId xmlns:a16="http://schemas.microsoft.com/office/drawing/2014/main" xmlns="" val="10009"/>
+                    <a16:rowId xmlns:a16="http://schemas.microsoft.com/office/drawing/2014/main" val="10009"/>
                   </a:ext>
                 </a:extLst>
               </a:tr>
@@ -7797,16 +7884,29 @@
                     <a:lstStyle/>
                     <a:p>
                       <a:pPr algn="l" fontAlgn="b"/>
-                      <a:endParaRPr lang="en-US" sz="1600" b="0" i="0" u="none" strike="noStrike" dirty="0">
-                        <a:solidFill>
-                          <a:srgbClr val="000000"/>
-                        </a:solidFill>
-                        <a:effectLst/>
-                        <a:latin typeface="Calibri" charset="0"/>
-                      </a:endParaRPr>
-                    </a:p>
-                  </a:txBody>
-                  <a:tcPr marL="2812" marR="2812" marT="2812" marB="0" anchor="b"/>
+                      <a:r>
+                        <a:rPr lang="en-GB" sz="1600" b="0" i="0" u="none" strike="noStrike" dirty="0" err="1">
+                          <a:solidFill>
+                            <a:srgbClr val="000000"/>
+                          </a:solidFill>
+                          <a:effectLst/>
+                          <a:latin typeface="Calibri" panose="020F0502020204030204" pitchFamily="34" charset="0"/>
+                        </a:rPr>
+                        <a:t>credhoursug</a:t>
+                      </a:r>
+                      <a:r>
+                        <a:rPr lang="en-GB" sz="1600" b="0" i="0" u="none" strike="noStrike" dirty="0">
+                          <a:solidFill>
+                            <a:srgbClr val="000000"/>
+                          </a:solidFill>
+                          <a:effectLst/>
+                          <a:latin typeface="Calibri" panose="020F0502020204030204" pitchFamily="34" charset="0"/>
+                        </a:rPr>
+                        <a:t>  </a:t>
+                      </a:r>
+                    </a:p>
+                  </a:txBody>
+                  <a:tcPr marL="6350" marR="6350" marT="6350" marB="0" anchor="b"/>
                 </a:tc>
                 <a:tc>
                   <a:txBody>
@@ -7814,16 +7914,19 @@
                     <a:lstStyle/>
                     <a:p>
                       <a:pPr algn="r" fontAlgn="b"/>
-                      <a:endParaRPr lang="mr-IN" sz="1600" b="0" i="0" u="none" strike="noStrike" dirty="0">
-                        <a:solidFill>
-                          <a:srgbClr val="000000"/>
-                        </a:solidFill>
-                        <a:effectLst/>
-                        <a:latin typeface="Lucida Grande" charset="0"/>
-                      </a:endParaRPr>
-                    </a:p>
-                  </a:txBody>
-                  <a:tcPr marL="2812" marR="2812" marT="2812" marB="0" anchor="b"/>
+                      <a:r>
+                        <a:rPr lang="en-GB" sz="1600" b="0" i="0" u="none" strike="noStrike" dirty="0">
+                          <a:solidFill>
+                            <a:srgbClr val="000000"/>
+                          </a:solidFill>
+                          <a:effectLst/>
+                          <a:latin typeface="Calibri" panose="020F0502020204030204" pitchFamily="34" charset="0"/>
+                        </a:rPr>
+                        <a:t>0.0291</a:t>
+                      </a:r>
+                    </a:p>
+                  </a:txBody>
+                  <a:tcPr marL="6350" marR="6350" marT="6350" marB="0" anchor="b"/>
                 </a:tc>
                 <a:tc>
                   <a:txBody>
@@ -7831,16 +7934,19 @@
                     <a:lstStyle/>
                     <a:p>
                       <a:pPr algn="r" fontAlgn="b"/>
-                      <a:endParaRPr lang="mr-IN" sz="1600" b="0" i="0" u="none" strike="noStrike" dirty="0">
-                        <a:solidFill>
-                          <a:srgbClr val="000000"/>
-                        </a:solidFill>
-                        <a:effectLst/>
-                        <a:latin typeface="Lucida Grande" charset="0"/>
-                      </a:endParaRPr>
-                    </a:p>
-                  </a:txBody>
-                  <a:tcPr marL="2812" marR="2812" marT="2812" marB="0" anchor="b"/>
+                      <a:r>
+                        <a:rPr lang="en-GB" sz="1600" b="0" i="0" u="none" strike="noStrike" dirty="0">
+                          <a:solidFill>
+                            <a:srgbClr val="000000"/>
+                          </a:solidFill>
+                          <a:effectLst/>
+                          <a:latin typeface="Calibri" panose="020F0502020204030204" pitchFamily="34" charset="0"/>
+                        </a:rPr>
+                        <a:t>0.0028</a:t>
+                      </a:r>
+                    </a:p>
+                  </a:txBody>
+                  <a:tcPr marL="6350" marR="6350" marT="6350" marB="0" anchor="b"/>
                 </a:tc>
                 <a:tc>
                   <a:txBody>
@@ -7848,20 +7954,23 @@
                     <a:lstStyle/>
                     <a:p>
                       <a:pPr algn="r" fontAlgn="b"/>
-                      <a:endParaRPr lang="is-IS" sz="1600" b="0" i="0" u="none" strike="noStrike" dirty="0">
-                        <a:solidFill>
-                          <a:srgbClr val="000000"/>
-                        </a:solidFill>
-                        <a:effectLst/>
-                        <a:latin typeface="Lucida Grande" charset="0"/>
-                      </a:endParaRPr>
-                    </a:p>
-                  </a:txBody>
-                  <a:tcPr marL="2812" marR="2812" marT="2812" marB="0" anchor="b"/>
+                      <a:r>
+                        <a:rPr lang="en-GB" sz="1600" b="0" i="0" u="none" strike="noStrike" dirty="0">
+                          <a:solidFill>
+                            <a:srgbClr val="000000"/>
+                          </a:solidFill>
+                          <a:effectLst/>
+                          <a:latin typeface="Calibri" panose="020F0502020204030204" pitchFamily="34" charset="0"/>
+                        </a:rPr>
+                        <a:t>0.0000</a:t>
+                      </a:r>
+                    </a:p>
+                  </a:txBody>
+                  <a:tcPr marL="6350" marR="6350" marT="6350" marB="0" anchor="b"/>
                 </a:tc>
                 <a:extLst>
                   <a:ext uri="{0D108BD9-81ED-4DB2-BD59-A6C34878D82A}">
-                    <a16:rowId xmlns:a16="http://schemas.microsoft.com/office/drawing/2014/main" xmlns="" val="10010"/>
+                    <a16:rowId xmlns:a16="http://schemas.microsoft.com/office/drawing/2014/main" val="10010"/>
                   </a:ext>
                 </a:extLst>
               </a:tr>
@@ -7904,7 +8013,7 @@
           <p:cNvPr id="2" name="Title 1">
             <a:extLst>
               <a:ext uri="{FF2B5EF4-FFF2-40B4-BE49-F238E27FC236}">
-                <a16:creationId xmlns:a16="http://schemas.microsoft.com/office/drawing/2014/main" xmlns="" id="{7703A585-CB34-4847-AABD-D8BF1C39D16B}"/>
+                <a16:creationId xmlns:a16="http://schemas.microsoft.com/office/drawing/2014/main" id="{7703A585-CB34-4847-AABD-D8BF1C39D16B}"/>
               </a:ext>
             </a:extLst>
           </p:cNvPr>
@@ -7933,7 +8042,7 @@
           <p:cNvPr id="3" name="Content Placeholder 2">
             <a:extLst>
               <a:ext uri="{FF2B5EF4-FFF2-40B4-BE49-F238E27FC236}">
-                <a16:creationId xmlns:a16="http://schemas.microsoft.com/office/drawing/2014/main" xmlns="" id="{65C12D36-4D81-4990-B646-20709CA0D106}"/>
+                <a16:creationId xmlns:a16="http://schemas.microsoft.com/office/drawing/2014/main" id="{65C12D36-4D81-4990-B646-20709CA0D106}"/>
               </a:ext>
             </a:extLst>
           </p:cNvPr>
@@ -7951,7 +8060,13 @@
           <a:p>
             <a:r>
               <a:rPr lang="en-US" dirty="0"/>
-              <a:t>Approach 1 gives interpretation in variables we are most interested in i.e. spending policies of schools</a:t>
+              <a:t>Auxiliary Expenditure best predictor of grad rate.</a:t>
+            </a:r>
+          </a:p>
+          <a:p>
+            <a:r>
+              <a:rPr lang="en-US" dirty="0"/>
+              <a:t>Approach 1 gives interpretation in variables we are most interested in i.e. spending policies of schools.</a:t>
             </a:r>
           </a:p>
           <a:p>
@@ -7964,17 +8079,13 @@
           <a:p>
             <a:r>
               <a:rPr lang="en-US" dirty="0"/>
-              <a:t>Clear correspondence between automatically selected variables and variables selected to control for known effects in Approach1</a:t>
+              <a:t>Clear correspondence between automatically selected variables and variables selected to control for known effects in Approach 1</a:t>
             </a:r>
           </a:p>
           <a:p>
-            <a:r>
-              <a:rPr lang="en-US" dirty="0" err="1"/>
-              <a:t>Approah</a:t>
-            </a:r>
             <a:r>
               <a:rPr lang="en-US" dirty="0"/>
-              <a:t> 2 in some sense justifies Approach 1?</a:t>
+              <a:t>Approach 2 in some sense justifies Approach 1?</a:t>
             </a:r>
           </a:p>
         </p:txBody>
@@ -8133,21 +8244,21 @@
                 <a:gridCol w="1307104">
                   <a:extLst>
                     <a:ext uri="{9D8B030D-6E8A-4147-A177-3AD203B41FA5}">
-                      <a16:colId xmlns:a16="http://schemas.microsoft.com/office/drawing/2014/main" xmlns="" val="20000"/>
+                      <a16:colId xmlns:a16="http://schemas.microsoft.com/office/drawing/2014/main" val="20000"/>
                     </a:ext>
                   </a:extLst>
                 </a:gridCol>
                 <a:gridCol w="1622611">
                   <a:extLst>
                     <a:ext uri="{9D8B030D-6E8A-4147-A177-3AD203B41FA5}">
-                      <a16:colId xmlns:a16="http://schemas.microsoft.com/office/drawing/2014/main" xmlns="" val="20001"/>
+                      <a16:colId xmlns:a16="http://schemas.microsoft.com/office/drawing/2014/main" val="20001"/>
                     </a:ext>
                   </a:extLst>
                 </a:gridCol>
                 <a:gridCol w="1667684">
                   <a:extLst>
                     <a:ext uri="{9D8B030D-6E8A-4147-A177-3AD203B41FA5}">
-                      <a16:colId xmlns:a16="http://schemas.microsoft.com/office/drawing/2014/main" xmlns="" val="20002"/>
+                      <a16:colId xmlns:a16="http://schemas.microsoft.com/office/drawing/2014/main" val="20002"/>
                     </a:ext>
                   </a:extLst>
                 </a:gridCol>
@@ -8218,7 +8329,7 @@
                 </a:tc>
                 <a:extLst>
                   <a:ext uri="{0D108BD9-81ED-4DB2-BD59-A6C34878D82A}">
-                    <a16:rowId xmlns:a16="http://schemas.microsoft.com/office/drawing/2014/main" xmlns="" val="10000"/>
+                    <a16:rowId xmlns:a16="http://schemas.microsoft.com/office/drawing/2014/main" val="10000"/>
                   </a:ext>
                 </a:extLst>
               </a:tr>
@@ -8294,7 +8405,7 @@
                 </a:tc>
                 <a:extLst>
                   <a:ext uri="{0D108BD9-81ED-4DB2-BD59-A6C34878D82A}">
-                    <a16:rowId xmlns:a16="http://schemas.microsoft.com/office/drawing/2014/main" xmlns="" val="10001"/>
+                    <a16:rowId xmlns:a16="http://schemas.microsoft.com/office/drawing/2014/main" val="10001"/>
                   </a:ext>
                 </a:extLst>
               </a:tr>
@@ -8370,7 +8481,7 @@
                 </a:tc>
                 <a:extLst>
                   <a:ext uri="{0D108BD9-81ED-4DB2-BD59-A6C34878D82A}">
-                    <a16:rowId xmlns:a16="http://schemas.microsoft.com/office/drawing/2014/main" xmlns="" val="10002"/>
+                    <a16:rowId xmlns:a16="http://schemas.microsoft.com/office/drawing/2014/main" val="10002"/>
                   </a:ext>
                 </a:extLst>
               </a:tr>
@@ -8446,7 +8557,7 @@
                 </a:tc>
                 <a:extLst>
                   <a:ext uri="{0D108BD9-81ED-4DB2-BD59-A6C34878D82A}">
-                    <a16:rowId xmlns:a16="http://schemas.microsoft.com/office/drawing/2014/main" xmlns="" val="10003"/>
+                    <a16:rowId xmlns:a16="http://schemas.microsoft.com/office/drawing/2014/main" val="10003"/>
                   </a:ext>
                 </a:extLst>
               </a:tr>
@@ -8774,14 +8885,14 @@
                 <a:gridCol w="1676870">
                   <a:extLst>
                     <a:ext uri="{9D8B030D-6E8A-4147-A177-3AD203B41FA5}">
-                      <a16:colId xmlns:a16="http://schemas.microsoft.com/office/drawing/2014/main" xmlns="" val="20000"/>
+                      <a16:colId xmlns:a16="http://schemas.microsoft.com/office/drawing/2014/main" val="20000"/>
                     </a:ext>
                   </a:extLst>
                 </a:gridCol>
                 <a:gridCol w="3663480">
                   <a:extLst>
                     <a:ext uri="{9D8B030D-6E8A-4147-A177-3AD203B41FA5}">
-                      <a16:colId xmlns:a16="http://schemas.microsoft.com/office/drawing/2014/main" xmlns="" val="20001"/>
+                      <a16:colId xmlns:a16="http://schemas.microsoft.com/office/drawing/2014/main" val="20001"/>
                     </a:ext>
                   </a:extLst>
                 </a:gridCol>
@@ -8835,7 +8946,7 @@
                 </a:tc>
                 <a:extLst>
                   <a:ext uri="{0D108BD9-81ED-4DB2-BD59-A6C34878D82A}">
-                    <a16:rowId xmlns:a16="http://schemas.microsoft.com/office/drawing/2014/main" xmlns="" val="10000"/>
+                    <a16:rowId xmlns:a16="http://schemas.microsoft.com/office/drawing/2014/main" val="10000"/>
                   </a:ext>
                 </a:extLst>
               </a:tr>
@@ -8875,7 +8986,7 @@
                 </a:tc>
                 <a:extLst>
                   <a:ext uri="{0D108BD9-81ED-4DB2-BD59-A6C34878D82A}">
-                    <a16:rowId xmlns:a16="http://schemas.microsoft.com/office/drawing/2014/main" xmlns="" val="10001"/>
+                    <a16:rowId xmlns:a16="http://schemas.microsoft.com/office/drawing/2014/main" val="10001"/>
                   </a:ext>
                 </a:extLst>
               </a:tr>
@@ -8928,7 +9039,7 @@
                 </a:tc>
                 <a:extLst>
                   <a:ext uri="{0D108BD9-81ED-4DB2-BD59-A6C34878D82A}">
-                    <a16:rowId xmlns:a16="http://schemas.microsoft.com/office/drawing/2014/main" xmlns="" val="10002"/>
+                    <a16:rowId xmlns:a16="http://schemas.microsoft.com/office/drawing/2014/main" val="10002"/>
                   </a:ext>
                 </a:extLst>
               </a:tr>
@@ -8968,7 +9079,7 @@
                 </a:tc>
                 <a:extLst>
                   <a:ext uri="{0D108BD9-81ED-4DB2-BD59-A6C34878D82A}">
-                    <a16:rowId xmlns:a16="http://schemas.microsoft.com/office/drawing/2014/main" xmlns="" val="10003"/>
+                    <a16:rowId xmlns:a16="http://schemas.microsoft.com/office/drawing/2014/main" val="10003"/>
                   </a:ext>
                 </a:extLst>
               </a:tr>
@@ -9008,7 +9119,7 @@
                 </a:tc>
                 <a:extLst>
                   <a:ext uri="{0D108BD9-81ED-4DB2-BD59-A6C34878D82A}">
-                    <a16:rowId xmlns:a16="http://schemas.microsoft.com/office/drawing/2014/main" xmlns="" val="10004"/>
+                    <a16:rowId xmlns:a16="http://schemas.microsoft.com/office/drawing/2014/main" val="10004"/>
                   </a:ext>
                 </a:extLst>
               </a:tr>
@@ -9048,7 +9159,7 @@
                 </a:tc>
                 <a:extLst>
                   <a:ext uri="{0D108BD9-81ED-4DB2-BD59-A6C34878D82A}">
-                    <a16:rowId xmlns:a16="http://schemas.microsoft.com/office/drawing/2014/main" xmlns="" val="10005"/>
+                    <a16:rowId xmlns:a16="http://schemas.microsoft.com/office/drawing/2014/main" val="10005"/>
                   </a:ext>
                 </a:extLst>
               </a:tr>
@@ -9088,7 +9199,7 @@
                 </a:tc>
                 <a:extLst>
                   <a:ext uri="{0D108BD9-81ED-4DB2-BD59-A6C34878D82A}">
-                    <a16:rowId xmlns:a16="http://schemas.microsoft.com/office/drawing/2014/main" xmlns="" val="10006"/>
+                    <a16:rowId xmlns:a16="http://schemas.microsoft.com/office/drawing/2014/main" val="10006"/>
                   </a:ext>
                 </a:extLst>
               </a:tr>
@@ -9128,7 +9239,7 @@
                 </a:tc>
                 <a:extLst>
                   <a:ext uri="{0D108BD9-81ED-4DB2-BD59-A6C34878D82A}">
-                    <a16:rowId xmlns:a16="http://schemas.microsoft.com/office/drawing/2014/main" xmlns="" val="10007"/>
+                    <a16:rowId xmlns:a16="http://schemas.microsoft.com/office/drawing/2014/main" val="10007"/>
                   </a:ext>
                 </a:extLst>
               </a:tr>
@@ -9187,7 +9298,7 @@
                 </a:tc>
                 <a:extLst>
                   <a:ext uri="{0D108BD9-81ED-4DB2-BD59-A6C34878D82A}">
-                    <a16:rowId xmlns:a16="http://schemas.microsoft.com/office/drawing/2014/main" xmlns="" val="10008"/>
+                    <a16:rowId xmlns:a16="http://schemas.microsoft.com/office/drawing/2014/main" val="10008"/>
                   </a:ext>
                 </a:extLst>
               </a:tr>
@@ -9230,7 +9341,7 @@
                 </a:tc>
                 <a:extLst>
                   <a:ext uri="{0D108BD9-81ED-4DB2-BD59-A6C34878D82A}">
-                    <a16:rowId xmlns:a16="http://schemas.microsoft.com/office/drawing/2014/main" xmlns="" val="10009"/>
+                    <a16:rowId xmlns:a16="http://schemas.microsoft.com/office/drawing/2014/main" val="10009"/>
                   </a:ext>
                 </a:extLst>
               </a:tr>
@@ -9273,7 +9384,7 @@
                 </a:tc>
                 <a:extLst>
                   <a:ext uri="{0D108BD9-81ED-4DB2-BD59-A6C34878D82A}">
-                    <a16:rowId xmlns:a16="http://schemas.microsoft.com/office/drawing/2014/main" xmlns="" val="10010"/>
+                    <a16:rowId xmlns:a16="http://schemas.microsoft.com/office/drawing/2014/main" val="10010"/>
                   </a:ext>
                 </a:extLst>
               </a:tr>
@@ -9316,7 +9427,7 @@
                 </a:tc>
                 <a:extLst>
                   <a:ext uri="{0D108BD9-81ED-4DB2-BD59-A6C34878D82A}">
-                    <a16:rowId xmlns:a16="http://schemas.microsoft.com/office/drawing/2014/main" xmlns="" val="10011"/>
+                    <a16:rowId xmlns:a16="http://schemas.microsoft.com/office/drawing/2014/main" val="10011"/>
                   </a:ext>
                 </a:extLst>
               </a:tr>
@@ -9359,7 +9470,7 @@
                 </a:tc>
                 <a:extLst>
                   <a:ext uri="{0D108BD9-81ED-4DB2-BD59-A6C34878D82A}">
-                    <a16:rowId xmlns:a16="http://schemas.microsoft.com/office/drawing/2014/main" xmlns="" val="10012"/>
+                    <a16:rowId xmlns:a16="http://schemas.microsoft.com/office/drawing/2014/main" val="10012"/>
                   </a:ext>
                 </a:extLst>
               </a:tr>
@@ -9402,7 +9513,7 @@
                 </a:tc>
                 <a:extLst>
                   <a:ext uri="{0D108BD9-81ED-4DB2-BD59-A6C34878D82A}">
-                    <a16:rowId xmlns:a16="http://schemas.microsoft.com/office/drawing/2014/main" xmlns="" val="10013"/>
+                    <a16:rowId xmlns:a16="http://schemas.microsoft.com/office/drawing/2014/main" val="10013"/>
                   </a:ext>
                 </a:extLst>
               </a:tr>
@@ -9445,7 +9556,7 @@
                 </a:tc>
                 <a:extLst>
                   <a:ext uri="{0D108BD9-81ED-4DB2-BD59-A6C34878D82A}">
-                    <a16:rowId xmlns:a16="http://schemas.microsoft.com/office/drawing/2014/main" xmlns="" val="10014"/>
+                    <a16:rowId xmlns:a16="http://schemas.microsoft.com/office/drawing/2014/main" val="10014"/>
                   </a:ext>
                 </a:extLst>
               </a:tr>
@@ -9488,7 +9599,7 @@
                 </a:tc>
                 <a:extLst>
                   <a:ext uri="{0D108BD9-81ED-4DB2-BD59-A6C34878D82A}">
-                    <a16:rowId xmlns:a16="http://schemas.microsoft.com/office/drawing/2014/main" xmlns="" val="10015"/>
+                    <a16:rowId xmlns:a16="http://schemas.microsoft.com/office/drawing/2014/main" val="10015"/>
                   </a:ext>
                 </a:extLst>
               </a:tr>
@@ -9531,7 +9642,7 @@
                 </a:tc>
                 <a:extLst>
                   <a:ext uri="{0D108BD9-81ED-4DB2-BD59-A6C34878D82A}">
-                    <a16:rowId xmlns:a16="http://schemas.microsoft.com/office/drawing/2014/main" xmlns="" val="10016"/>
+                    <a16:rowId xmlns:a16="http://schemas.microsoft.com/office/drawing/2014/main" val="10016"/>
                   </a:ext>
                 </a:extLst>
               </a:tr>
@@ -9584,7 +9695,7 @@
                 </a:tc>
                 <a:extLst>
                   <a:ext uri="{0D108BD9-81ED-4DB2-BD59-A6C34878D82A}">
-                    <a16:rowId xmlns:a16="http://schemas.microsoft.com/office/drawing/2014/main" xmlns="" val="10017"/>
+                    <a16:rowId xmlns:a16="http://schemas.microsoft.com/office/drawing/2014/main" val="10017"/>
                   </a:ext>
                 </a:extLst>
               </a:tr>
@@ -9624,7 +9735,7 @@
                 </a:tc>
                 <a:extLst>
                   <a:ext uri="{0D108BD9-81ED-4DB2-BD59-A6C34878D82A}">
-                    <a16:rowId xmlns:a16="http://schemas.microsoft.com/office/drawing/2014/main" xmlns="" val="10018"/>
+                    <a16:rowId xmlns:a16="http://schemas.microsoft.com/office/drawing/2014/main" val="10018"/>
                   </a:ext>
                 </a:extLst>
               </a:tr>
@@ -9854,28 +9965,28 @@
                 <a:gridCol w="1697973">
                   <a:extLst>
                     <a:ext uri="{9D8B030D-6E8A-4147-A177-3AD203B41FA5}">
-                      <a16:colId xmlns:a16="http://schemas.microsoft.com/office/drawing/2014/main" xmlns="" val="20000"/>
+                      <a16:colId xmlns:a16="http://schemas.microsoft.com/office/drawing/2014/main" val="20000"/>
                     </a:ext>
                   </a:extLst>
                 </a:gridCol>
                 <a:gridCol w="1697973">
                   <a:extLst>
                     <a:ext uri="{9D8B030D-6E8A-4147-A177-3AD203B41FA5}">
-                      <a16:colId xmlns:a16="http://schemas.microsoft.com/office/drawing/2014/main" xmlns="" val="20001"/>
+                      <a16:colId xmlns:a16="http://schemas.microsoft.com/office/drawing/2014/main" val="20001"/>
                     </a:ext>
                   </a:extLst>
                 </a:gridCol>
                 <a:gridCol w="917538">
                   <a:extLst>
                     <a:ext uri="{9D8B030D-6E8A-4147-A177-3AD203B41FA5}">
-                      <a16:colId xmlns:a16="http://schemas.microsoft.com/office/drawing/2014/main" xmlns="" val="20002"/>
+                      <a16:colId xmlns:a16="http://schemas.microsoft.com/office/drawing/2014/main" val="20002"/>
                     </a:ext>
                   </a:extLst>
                 </a:gridCol>
                 <a:gridCol w="1128466">
                   <a:extLst>
                     <a:ext uri="{9D8B030D-6E8A-4147-A177-3AD203B41FA5}">
-                      <a16:colId xmlns:a16="http://schemas.microsoft.com/office/drawing/2014/main" xmlns="" val="20003"/>
+                      <a16:colId xmlns:a16="http://schemas.microsoft.com/office/drawing/2014/main" val="20003"/>
                     </a:ext>
                   </a:extLst>
                 </a:gridCol>
@@ -9956,7 +10067,7 @@
                 </a:tc>
                 <a:extLst>
                   <a:ext uri="{0D108BD9-81ED-4DB2-BD59-A6C34878D82A}">
-                    <a16:rowId xmlns:a16="http://schemas.microsoft.com/office/drawing/2014/main" xmlns="" val="10000"/>
+                    <a16:rowId xmlns:a16="http://schemas.microsoft.com/office/drawing/2014/main" val="10000"/>
                   </a:ext>
                 </a:extLst>
               </a:tr>
@@ -10036,7 +10147,7 @@
                 </a:tc>
                 <a:extLst>
                   <a:ext uri="{0D108BD9-81ED-4DB2-BD59-A6C34878D82A}">
-                    <a16:rowId xmlns:a16="http://schemas.microsoft.com/office/drawing/2014/main" xmlns="" val="10001"/>
+                    <a16:rowId xmlns:a16="http://schemas.microsoft.com/office/drawing/2014/main" val="10001"/>
                   </a:ext>
                 </a:extLst>
               </a:tr>
@@ -10129,7 +10240,7 @@
                 </a:tc>
                 <a:extLst>
                   <a:ext uri="{0D108BD9-81ED-4DB2-BD59-A6C34878D82A}">
-                    <a16:rowId xmlns:a16="http://schemas.microsoft.com/office/drawing/2014/main" xmlns="" val="10002"/>
+                    <a16:rowId xmlns:a16="http://schemas.microsoft.com/office/drawing/2014/main" val="10002"/>
                   </a:ext>
                 </a:extLst>
               </a:tr>
@@ -10209,7 +10320,7 @@
                 </a:tc>
                 <a:extLst>
                   <a:ext uri="{0D108BD9-81ED-4DB2-BD59-A6C34878D82A}">
-                    <a16:rowId xmlns:a16="http://schemas.microsoft.com/office/drawing/2014/main" xmlns="" val="10003"/>
+                    <a16:rowId xmlns:a16="http://schemas.microsoft.com/office/drawing/2014/main" val="10003"/>
                   </a:ext>
                 </a:extLst>
               </a:tr>
@@ -10289,7 +10400,7 @@
                 </a:tc>
                 <a:extLst>
                   <a:ext uri="{0D108BD9-81ED-4DB2-BD59-A6C34878D82A}">
-                    <a16:rowId xmlns:a16="http://schemas.microsoft.com/office/drawing/2014/main" xmlns="" val="10004"/>
+                    <a16:rowId xmlns:a16="http://schemas.microsoft.com/office/drawing/2014/main" val="10004"/>
                   </a:ext>
                 </a:extLst>
               </a:tr>
@@ -10369,7 +10480,7 @@
                 </a:tc>
                 <a:extLst>
                   <a:ext uri="{0D108BD9-81ED-4DB2-BD59-A6C34878D82A}">
-                    <a16:rowId xmlns:a16="http://schemas.microsoft.com/office/drawing/2014/main" xmlns="" val="10005"/>
+                    <a16:rowId xmlns:a16="http://schemas.microsoft.com/office/drawing/2014/main" val="10005"/>
                   </a:ext>
                 </a:extLst>
               </a:tr>
@@ -10449,7 +10560,7 @@
                 </a:tc>
                 <a:extLst>
                   <a:ext uri="{0D108BD9-81ED-4DB2-BD59-A6C34878D82A}">
-                    <a16:rowId xmlns:a16="http://schemas.microsoft.com/office/drawing/2014/main" xmlns="" val="10006"/>
+                    <a16:rowId xmlns:a16="http://schemas.microsoft.com/office/drawing/2014/main" val="10006"/>
                   </a:ext>
                 </a:extLst>
               </a:tr>
@@ -10529,7 +10640,7 @@
                 </a:tc>
                 <a:extLst>
                   <a:ext uri="{0D108BD9-81ED-4DB2-BD59-A6C34878D82A}">
-                    <a16:rowId xmlns:a16="http://schemas.microsoft.com/office/drawing/2014/main" xmlns="" val="10007"/>
+                    <a16:rowId xmlns:a16="http://schemas.microsoft.com/office/drawing/2014/main" val="10007"/>
                   </a:ext>
                 </a:extLst>
               </a:tr>
@@ -10612,7 +10723,7 @@
                 </a:tc>
                 <a:extLst>
                   <a:ext uri="{0D108BD9-81ED-4DB2-BD59-A6C34878D82A}">
-                    <a16:rowId xmlns:a16="http://schemas.microsoft.com/office/drawing/2014/main" xmlns="" val="10008"/>
+                    <a16:rowId xmlns:a16="http://schemas.microsoft.com/office/drawing/2014/main" val="10008"/>
                   </a:ext>
                 </a:extLst>
               </a:tr>
@@ -10705,7 +10816,7 @@
                 </a:tc>
                 <a:extLst>
                   <a:ext uri="{0D108BD9-81ED-4DB2-BD59-A6C34878D82A}">
-                    <a16:rowId xmlns:a16="http://schemas.microsoft.com/office/drawing/2014/main" xmlns="" val="10009"/>
+                    <a16:rowId xmlns:a16="http://schemas.microsoft.com/office/drawing/2014/main" val="10009"/>
                   </a:ext>
                 </a:extLst>
               </a:tr>
@@ -10785,7 +10896,7 @@
                 </a:tc>
                 <a:extLst>
                   <a:ext uri="{0D108BD9-81ED-4DB2-BD59-A6C34878D82A}">
-                    <a16:rowId xmlns:a16="http://schemas.microsoft.com/office/drawing/2014/main" xmlns="" val="10010"/>
+                    <a16:rowId xmlns:a16="http://schemas.microsoft.com/office/drawing/2014/main" val="10010"/>
                   </a:ext>
                 </a:extLst>
               </a:tr>
@@ -10865,7 +10976,7 @@
                 </a:tc>
                 <a:extLst>
                   <a:ext uri="{0D108BD9-81ED-4DB2-BD59-A6C34878D82A}">
-                    <a16:rowId xmlns:a16="http://schemas.microsoft.com/office/drawing/2014/main" xmlns="" val="10011"/>
+                    <a16:rowId xmlns:a16="http://schemas.microsoft.com/office/drawing/2014/main" val="10011"/>
                   </a:ext>
                 </a:extLst>
               </a:tr>
@@ -10945,7 +11056,7 @@
                 </a:tc>
                 <a:extLst>
                   <a:ext uri="{0D108BD9-81ED-4DB2-BD59-A6C34878D82A}">
-                    <a16:rowId xmlns:a16="http://schemas.microsoft.com/office/drawing/2014/main" xmlns="" val="10012"/>
+                    <a16:rowId xmlns:a16="http://schemas.microsoft.com/office/drawing/2014/main" val="10012"/>
                   </a:ext>
                 </a:extLst>
               </a:tr>
@@ -11025,7 +11136,7 @@
                 </a:tc>
                 <a:extLst>
                   <a:ext uri="{0D108BD9-81ED-4DB2-BD59-A6C34878D82A}">
-                    <a16:rowId xmlns:a16="http://schemas.microsoft.com/office/drawing/2014/main" xmlns="" val="10013"/>
+                    <a16:rowId xmlns:a16="http://schemas.microsoft.com/office/drawing/2014/main" val="10013"/>
                   </a:ext>
                 </a:extLst>
               </a:tr>
@@ -11105,7 +11216,7 @@
                 </a:tc>
                 <a:extLst>
                   <a:ext uri="{0D108BD9-81ED-4DB2-BD59-A6C34878D82A}">
-                    <a16:rowId xmlns:a16="http://schemas.microsoft.com/office/drawing/2014/main" xmlns="" val="10014"/>
+                    <a16:rowId xmlns:a16="http://schemas.microsoft.com/office/drawing/2014/main" val="10014"/>
                   </a:ext>
                 </a:extLst>
               </a:tr>
@@ -11188,7 +11299,7 @@
                 </a:tc>
                 <a:extLst>
                   <a:ext uri="{0D108BD9-81ED-4DB2-BD59-A6C34878D82A}">
-                    <a16:rowId xmlns:a16="http://schemas.microsoft.com/office/drawing/2014/main" xmlns="" val="10015"/>
+                    <a16:rowId xmlns:a16="http://schemas.microsoft.com/office/drawing/2014/main" val="10015"/>
                   </a:ext>
                 </a:extLst>
               </a:tr>
@@ -11279,35 +11390,35 @@
                 <a:gridCol w="1884339">
                   <a:extLst>
                     <a:ext uri="{9D8B030D-6E8A-4147-A177-3AD203B41FA5}">
-                      <a16:colId xmlns:a16="http://schemas.microsoft.com/office/drawing/2014/main" xmlns="" val="20000"/>
+                      <a16:colId xmlns:a16="http://schemas.microsoft.com/office/drawing/2014/main" val="20000"/>
                     </a:ext>
                   </a:extLst>
                 </a:gridCol>
                 <a:gridCol w="4206296">
                   <a:extLst>
                     <a:ext uri="{9D8B030D-6E8A-4147-A177-3AD203B41FA5}">
-                      <a16:colId xmlns:a16="http://schemas.microsoft.com/office/drawing/2014/main" xmlns="" val="20001"/>
+                      <a16:colId xmlns:a16="http://schemas.microsoft.com/office/drawing/2014/main" val="20001"/>
                     </a:ext>
                   </a:extLst>
                 </a:gridCol>
                 <a:gridCol w="1165829">
                   <a:extLst>
                     <a:ext uri="{9D8B030D-6E8A-4147-A177-3AD203B41FA5}">
-                      <a16:colId xmlns:a16="http://schemas.microsoft.com/office/drawing/2014/main" xmlns="" val="20002"/>
+                      <a16:colId xmlns:a16="http://schemas.microsoft.com/office/drawing/2014/main" val="20002"/>
                     </a:ext>
                   </a:extLst>
                 </a:gridCol>
                 <a:gridCol w="1252326">
                   <a:extLst>
                     <a:ext uri="{9D8B030D-6E8A-4147-A177-3AD203B41FA5}">
-                      <a16:colId xmlns:a16="http://schemas.microsoft.com/office/drawing/2014/main" xmlns="" val="20003"/>
+                      <a16:colId xmlns:a16="http://schemas.microsoft.com/office/drawing/2014/main" val="20003"/>
                     </a:ext>
                   </a:extLst>
                 </a:gridCol>
                 <a:gridCol w="1252326">
                   <a:extLst>
                     <a:ext uri="{9D8B030D-6E8A-4147-A177-3AD203B41FA5}">
-                      <a16:colId xmlns:a16="http://schemas.microsoft.com/office/drawing/2014/main" xmlns="" val="20004"/>
+                      <a16:colId xmlns:a16="http://schemas.microsoft.com/office/drawing/2014/main" val="20004"/>
                     </a:ext>
                   </a:extLst>
                 </a:gridCol>
@@ -11424,7 +11535,7 @@
                 </a:tc>
                 <a:extLst>
                   <a:ext uri="{0D108BD9-81ED-4DB2-BD59-A6C34878D82A}">
-                    <a16:rowId xmlns:a16="http://schemas.microsoft.com/office/drawing/2014/main" xmlns="" val="10000"/>
+                    <a16:rowId xmlns:a16="http://schemas.microsoft.com/office/drawing/2014/main" val="10000"/>
                   </a:ext>
                 </a:extLst>
               </a:tr>
@@ -11482,12 +11593,12 @@
                     <a:p>
                       <a:pPr algn="r" fontAlgn="b"/>
                       <a:r>
-                        <a:rPr lang="mr-IN" sz="1600" u="none" strike="noStrike">
+                        <a:rPr lang="mr-IN" sz="1600" u="none" strike="noStrike" dirty="0">
                           <a:effectLst/>
                         </a:rPr>
                         <a:t>4.50E-06</a:t>
                       </a:r>
-                      <a:endParaRPr lang="mr-IN" sz="1600" b="0" i="0" u="none" strike="noStrike">
+                      <a:endParaRPr lang="mr-IN" sz="1600" b="0" i="0" u="none" strike="noStrike" dirty="0">
                         <a:solidFill>
                           <a:srgbClr val="000000"/>
                         </a:solidFill>
@@ -11546,7 +11657,7 @@
                 </a:tc>
                 <a:extLst>
                   <a:ext uri="{0D108BD9-81ED-4DB2-BD59-A6C34878D82A}">
-                    <a16:rowId xmlns:a16="http://schemas.microsoft.com/office/drawing/2014/main" xmlns="" val="10001"/>
+                    <a16:rowId xmlns:a16="http://schemas.microsoft.com/office/drawing/2014/main" val="10001"/>
                   </a:ext>
                 </a:extLst>
               </a:tr>
@@ -11655,7 +11766,7 @@
                 </a:tc>
                 <a:extLst>
                   <a:ext uri="{0D108BD9-81ED-4DB2-BD59-A6C34878D82A}">
-                    <a16:rowId xmlns:a16="http://schemas.microsoft.com/office/drawing/2014/main" xmlns="" val="10002"/>
+                    <a16:rowId xmlns:a16="http://schemas.microsoft.com/office/drawing/2014/main" val="10002"/>
                   </a:ext>
                 </a:extLst>
               </a:tr>
@@ -11776,7 +11887,7 @@
                 </a:tc>
                 <a:extLst>
                   <a:ext uri="{0D108BD9-81ED-4DB2-BD59-A6C34878D82A}">
-                    <a16:rowId xmlns:a16="http://schemas.microsoft.com/office/drawing/2014/main" xmlns="" val="10003"/>
+                    <a16:rowId xmlns:a16="http://schemas.microsoft.com/office/drawing/2014/main" val="10003"/>
                   </a:ext>
                 </a:extLst>
               </a:tr>
@@ -11821,12 +11932,12 @@
                     <a:p>
                       <a:pPr algn="r" fontAlgn="b"/>
                       <a:r>
-                        <a:rPr lang="mr-IN" sz="1600" u="none" strike="noStrike">
+                        <a:rPr lang="mr-IN" sz="1600" u="none" strike="noStrike" dirty="0">
                           <a:effectLst/>
                         </a:rPr>
                         <a:t>2.90E-06</a:t>
                       </a:r>
-                      <a:endParaRPr lang="mr-IN" sz="1600" b="0" i="0" u="none" strike="noStrike">
+                      <a:endParaRPr lang="mr-IN" sz="1600" b="0" i="0" u="none" strike="noStrike" dirty="0">
                         <a:solidFill>
                           <a:srgbClr val="000000"/>
                         </a:solidFill>
@@ -11885,7 +11996,7 @@
                 </a:tc>
                 <a:extLst>
                   <a:ext uri="{0D108BD9-81ED-4DB2-BD59-A6C34878D82A}">
-                    <a16:rowId xmlns:a16="http://schemas.microsoft.com/office/drawing/2014/main" xmlns="" val="10004"/>
+                    <a16:rowId xmlns:a16="http://schemas.microsoft.com/office/drawing/2014/main" val="10004"/>
                   </a:ext>
                 </a:extLst>
               </a:tr>
@@ -12022,7 +12133,7 @@
                 </a:tc>
                 <a:extLst>
                   <a:ext uri="{0D108BD9-81ED-4DB2-BD59-A6C34878D82A}">
-                    <a16:rowId xmlns:a16="http://schemas.microsoft.com/office/drawing/2014/main" xmlns="" val="10005"/>
+                    <a16:rowId xmlns:a16="http://schemas.microsoft.com/office/drawing/2014/main" val="10005"/>
                   </a:ext>
                 </a:extLst>
               </a:tr>
@@ -12144,7 +12255,7 @@
                 </a:tc>
                 <a:extLst>
                   <a:ext uri="{0D108BD9-81ED-4DB2-BD59-A6C34878D82A}">
-                    <a16:rowId xmlns:a16="http://schemas.microsoft.com/office/drawing/2014/main" xmlns="" val="10006"/>
+                    <a16:rowId xmlns:a16="http://schemas.microsoft.com/office/drawing/2014/main" val="10006"/>
                   </a:ext>
                 </a:extLst>
               </a:tr>
@@ -12281,7 +12392,7 @@
                 </a:tc>
                 <a:extLst>
                   <a:ext uri="{0D108BD9-81ED-4DB2-BD59-A6C34878D82A}">
-                    <a16:rowId xmlns:a16="http://schemas.microsoft.com/office/drawing/2014/main" xmlns="" val="10007"/>
+                    <a16:rowId xmlns:a16="http://schemas.microsoft.com/office/drawing/2014/main" val="10007"/>
                   </a:ext>
                 </a:extLst>
               </a:tr>
@@ -12393,7 +12504,7 @@
                 </a:tc>
                 <a:extLst>
                   <a:ext uri="{0D108BD9-81ED-4DB2-BD59-A6C34878D82A}">
-                    <a16:rowId xmlns:a16="http://schemas.microsoft.com/office/drawing/2014/main" xmlns="" val="10008"/>
+                    <a16:rowId xmlns:a16="http://schemas.microsoft.com/office/drawing/2014/main" val="10008"/>
                   </a:ext>
                 </a:extLst>
               </a:tr>
@@ -12502,7 +12613,7 @@
                 </a:tc>
                 <a:extLst>
                   <a:ext uri="{0D108BD9-81ED-4DB2-BD59-A6C34878D82A}">
-                    <a16:rowId xmlns:a16="http://schemas.microsoft.com/office/drawing/2014/main" xmlns="" val="10009"/>
+                    <a16:rowId xmlns:a16="http://schemas.microsoft.com/office/drawing/2014/main" val="10009"/>
                   </a:ext>
                 </a:extLst>
               </a:tr>
@@ -12611,7 +12722,7 @@
                 </a:tc>
                 <a:extLst>
                   <a:ext uri="{0D108BD9-81ED-4DB2-BD59-A6C34878D82A}">
-                    <a16:rowId xmlns:a16="http://schemas.microsoft.com/office/drawing/2014/main" xmlns="" val="10010"/>
+                    <a16:rowId xmlns:a16="http://schemas.microsoft.com/office/drawing/2014/main" val="10010"/>
                   </a:ext>
                 </a:extLst>
               </a:tr>
@@ -12720,7 +12831,7 @@
                 </a:tc>
                 <a:extLst>
                   <a:ext uri="{0D108BD9-81ED-4DB2-BD59-A6C34878D82A}">
-                    <a16:rowId xmlns:a16="http://schemas.microsoft.com/office/drawing/2014/main" xmlns="" val="10011"/>
+                    <a16:rowId xmlns:a16="http://schemas.microsoft.com/office/drawing/2014/main" val="10011"/>
                   </a:ext>
                 </a:extLst>
               </a:tr>
@@ -12767,13 +12878,6 @@
   <p:clrMapOvr>
     <a:masterClrMapping/>
   </p:clrMapOvr>
-  <p:timing>
-    <p:tnLst>
-      <p:par>
-        <p:cTn id="1" dur="indefinite" restart="never" nodeType="tmRoot"/>
-      </p:par>
-    </p:tnLst>
-  </p:timing>
 </p:sld>
 </file>
 
@@ -12811,13 +12915,8 @@
           <a:p>
             <a:r>
               <a:rPr lang="en-US" dirty="0"/>
-              <a:t>Approach 1: </a:t>
+              <a:t>Approach 1: First Differences</a:t>
             </a:r>
-            <a:r>
-              <a:rPr lang="en-US" dirty="0" smtClean="0"/>
-              <a:t>First Differences</a:t>
-            </a:r>
-            <a:endParaRPr lang="en-US" dirty="0"/>
           </a:p>
         </p:txBody>
       </p:sp>
@@ -12844,13 +12943,13 @@
           <a:lstStyle/>
           <a:p>
             <a:r>
-              <a:rPr lang="en-US" dirty="0" smtClean="0"/>
+              <a:rPr lang="en-US" dirty="0"/>
               <a:t>For each outcome, ran first differences of adding 100 to the expenditure variable with the largest average partial derivative and subtracting 100 to the expenditure variable with the lowest average partial derivative</a:t>
             </a:r>
           </a:p>
           <a:p>
             <a:r>
-              <a:rPr lang="en-US" dirty="0" smtClean="0"/>
+              <a:rPr lang="en-US" dirty="0"/>
               <a:t>Cluster bootstrapped by school for the distributions of the estimates</a:t>
             </a:r>
           </a:p>
@@ -12929,13 +13028,6 @@
   <p:clrMapOvr>
     <a:masterClrMapping/>
   </p:clrMapOvr>
-  <p:timing>
-    <p:tnLst>
-      <p:par>
-        <p:cTn id="1" dur="indefinite" restart="never" nodeType="tmRoot"/>
-      </p:par>
-    </p:tnLst>
-  </p:timing>
 </p:sld>
 </file>
 
@@ -12961,7 +13053,7 @@
           <p:cNvPr id="2" name="Title 1">
             <a:extLst>
               <a:ext uri="{FF2B5EF4-FFF2-40B4-BE49-F238E27FC236}">
-                <a16:creationId xmlns:a16="http://schemas.microsoft.com/office/drawing/2014/main" xmlns="" id="{F2BA0188-53B3-4D0B-BFA2-D97322C19DC2}"/>
+                <a16:creationId xmlns:a16="http://schemas.microsoft.com/office/drawing/2014/main" id="{F2BA0188-53B3-4D0B-BFA2-D97322C19DC2}"/>
               </a:ext>
             </a:extLst>
           </p:cNvPr>
@@ -12990,7 +13082,7 @@
           <p:cNvPr id="3" name="Content Placeholder 2">
             <a:extLst>
               <a:ext uri="{FF2B5EF4-FFF2-40B4-BE49-F238E27FC236}">
-                <a16:creationId xmlns:a16="http://schemas.microsoft.com/office/drawing/2014/main" xmlns="" id="{262D00B4-C15B-447A-9CEE-B8D24F15D579}"/>
+                <a16:creationId xmlns:a16="http://schemas.microsoft.com/office/drawing/2014/main" id="{262D00B4-C15B-447A-9CEE-B8D24F15D579}"/>
               </a:ext>
             </a:extLst>
           </p:cNvPr>
@@ -13060,13 +13152,6 @@
   <p:clrMapOvr>
     <a:masterClrMapping/>
   </p:clrMapOvr>
-  <p:timing>
-    <p:tnLst>
-      <p:par>
-        <p:cTn id="1" dur="indefinite" restart="never" nodeType="tmRoot"/>
-      </p:par>
-    </p:tnLst>
-  </p:timing>
 </p:sld>
 </file>
 

</xml_diff>

<commit_message>
edited report - made a second version
</commit_message>
<xml_diff>
--- a/reports/18_03_13 Presentation.pptx
+++ b/reports/18_03_13 Presentation.pptx
@@ -255,7 +255,7 @@
           <a:p>
             <a:fld id="{8B887784-E512-F943-98E0-5497CC7B1195}" type="datetimeFigureOut">
               <a:rPr lang="en-US" smtClean="0"/>
-              <a:t>3/13/18</a:t>
+              <a:t>3/21/18</a:t>
             </a:fld>
             <a:endParaRPr lang="en-US"/>
           </a:p>
@@ -423,7 +423,7 @@
           <a:p>
             <a:fld id="{8B887784-E512-F943-98E0-5497CC7B1195}" type="datetimeFigureOut">
               <a:rPr lang="en-US" smtClean="0"/>
-              <a:t>3/13/18</a:t>
+              <a:t>3/21/18</a:t>
             </a:fld>
             <a:endParaRPr lang="en-US"/>
           </a:p>
@@ -601,7 +601,7 @@
           <a:p>
             <a:fld id="{8B887784-E512-F943-98E0-5497CC7B1195}" type="datetimeFigureOut">
               <a:rPr lang="en-US" smtClean="0"/>
-              <a:t>3/13/18</a:t>
+              <a:t>3/21/18</a:t>
             </a:fld>
             <a:endParaRPr lang="en-US"/>
           </a:p>
@@ -769,7 +769,7 @@
           <a:p>
             <a:fld id="{8B887784-E512-F943-98E0-5497CC7B1195}" type="datetimeFigureOut">
               <a:rPr lang="en-US" smtClean="0"/>
-              <a:t>3/13/18</a:t>
+              <a:t>3/21/18</a:t>
             </a:fld>
             <a:endParaRPr lang="en-US"/>
           </a:p>
@@ -1014,7 +1014,7 @@
           <a:p>
             <a:fld id="{8B887784-E512-F943-98E0-5497CC7B1195}" type="datetimeFigureOut">
               <a:rPr lang="en-US" smtClean="0"/>
-              <a:t>3/13/18</a:t>
+              <a:t>3/21/18</a:t>
             </a:fld>
             <a:endParaRPr lang="en-US"/>
           </a:p>
@@ -1243,7 +1243,7 @@
           <a:p>
             <a:fld id="{8B887784-E512-F943-98E0-5497CC7B1195}" type="datetimeFigureOut">
               <a:rPr lang="en-US" smtClean="0"/>
-              <a:t>3/13/18</a:t>
+              <a:t>3/21/18</a:t>
             </a:fld>
             <a:endParaRPr lang="en-US"/>
           </a:p>
@@ -1607,7 +1607,7 @@
           <a:p>
             <a:fld id="{8B887784-E512-F943-98E0-5497CC7B1195}" type="datetimeFigureOut">
               <a:rPr lang="en-US" smtClean="0"/>
-              <a:t>3/13/18</a:t>
+              <a:t>3/21/18</a:t>
             </a:fld>
             <a:endParaRPr lang="en-US"/>
           </a:p>
@@ -1724,7 +1724,7 @@
           <a:p>
             <a:fld id="{8B887784-E512-F943-98E0-5497CC7B1195}" type="datetimeFigureOut">
               <a:rPr lang="en-US" smtClean="0"/>
-              <a:t>3/13/18</a:t>
+              <a:t>3/21/18</a:t>
             </a:fld>
             <a:endParaRPr lang="en-US"/>
           </a:p>
@@ -1819,7 +1819,7 @@
           <a:p>
             <a:fld id="{8B887784-E512-F943-98E0-5497CC7B1195}" type="datetimeFigureOut">
               <a:rPr lang="en-US" smtClean="0"/>
-              <a:t>3/13/18</a:t>
+              <a:t>3/21/18</a:t>
             </a:fld>
             <a:endParaRPr lang="en-US"/>
           </a:p>
@@ -2094,7 +2094,7 @@
           <a:p>
             <a:fld id="{8B887784-E512-F943-98E0-5497CC7B1195}" type="datetimeFigureOut">
               <a:rPr lang="en-US" smtClean="0"/>
-              <a:t>3/13/18</a:t>
+              <a:t>3/21/18</a:t>
             </a:fld>
             <a:endParaRPr lang="en-US"/>
           </a:p>
@@ -2346,7 +2346,7 @@
           <a:p>
             <a:fld id="{8B887784-E512-F943-98E0-5497CC7B1195}" type="datetimeFigureOut">
               <a:rPr lang="en-US" smtClean="0"/>
-              <a:t>3/13/18</a:t>
+              <a:t>3/21/18</a:t>
             </a:fld>
             <a:endParaRPr lang="en-US"/>
           </a:p>
@@ -2557,7 +2557,7 @@
           <a:p>
             <a:fld id="{8B887784-E512-F943-98E0-5497CC7B1195}" type="datetimeFigureOut">
               <a:rPr lang="en-US" smtClean="0"/>
-              <a:t>3/13/18</a:t>
+              <a:t>3/21/18</a:t>
             </a:fld>
             <a:endParaRPr lang="en-US"/>
           </a:p>
@@ -3056,7 +3056,7 @@
           <p:cNvPr id="2" name="Title 1">
             <a:extLst>
               <a:ext uri="{FF2B5EF4-FFF2-40B4-BE49-F238E27FC236}">
-                <a16:creationId xmlns:a16="http://schemas.microsoft.com/office/drawing/2014/main" xmlns="" id="{C1125D7B-F02A-445F-B8C7-34C547A14A7A}"/>
+                <a16:creationId xmlns="" xmlns:a16="http://schemas.microsoft.com/office/drawing/2014/main" id="{C1125D7B-F02A-445F-B8C7-34C547A14A7A}"/>
               </a:ext>
             </a:extLst>
           </p:cNvPr>
@@ -3085,7 +3085,7 @@
           <p:cNvPr id="4" name="Table 3">
             <a:extLst>
               <a:ext uri="{FF2B5EF4-FFF2-40B4-BE49-F238E27FC236}">
-                <a16:creationId xmlns:a16="http://schemas.microsoft.com/office/drawing/2014/main" xmlns="" id="{B971FF46-278A-4EFD-85A0-9E515C7A2BDC}"/>
+                <a16:creationId xmlns="" xmlns:a16="http://schemas.microsoft.com/office/drawing/2014/main" id="{B971FF46-278A-4EFD-85A0-9E515C7A2BDC}"/>
               </a:ext>
             </a:extLst>
           </p:cNvPr>
@@ -3114,14 +3114,14 @@
                 <a:gridCol w="3698301">
                   <a:extLst>
                     <a:ext uri="{9D8B030D-6E8A-4147-A177-3AD203B41FA5}">
-                      <a16:colId xmlns:a16="http://schemas.microsoft.com/office/drawing/2014/main" xmlns="" val="3828946005"/>
+                      <a16:colId xmlns="" xmlns:a16="http://schemas.microsoft.com/office/drawing/2014/main" val="3828946005"/>
                     </a:ext>
                   </a:extLst>
                 </a:gridCol>
                 <a:gridCol w="1338943">
                   <a:extLst>
                     <a:ext uri="{9D8B030D-6E8A-4147-A177-3AD203B41FA5}">
-                      <a16:colId xmlns:a16="http://schemas.microsoft.com/office/drawing/2014/main" xmlns="" val="3116620885"/>
+                      <a16:colId xmlns="" xmlns:a16="http://schemas.microsoft.com/office/drawing/2014/main" val="3116620885"/>
                     </a:ext>
                   </a:extLst>
                 </a:gridCol>
@@ -3169,7 +3169,7 @@
                 </a:tc>
                 <a:extLst>
                   <a:ext uri="{0D108BD9-81ED-4DB2-BD59-A6C34878D82A}">
-                    <a16:rowId xmlns:a16="http://schemas.microsoft.com/office/drawing/2014/main" xmlns="" val="2750690894"/>
+                    <a16:rowId xmlns="" xmlns:a16="http://schemas.microsoft.com/office/drawing/2014/main" val="2750690894"/>
                   </a:ext>
                 </a:extLst>
               </a:tr>
@@ -3222,7 +3222,7 @@
                 </a:tc>
                 <a:extLst>
                   <a:ext uri="{0D108BD9-81ED-4DB2-BD59-A6C34878D82A}">
-                    <a16:rowId xmlns:a16="http://schemas.microsoft.com/office/drawing/2014/main" xmlns="" val="621517536"/>
+                    <a16:rowId xmlns="" xmlns:a16="http://schemas.microsoft.com/office/drawing/2014/main" val="621517536"/>
                   </a:ext>
                 </a:extLst>
               </a:tr>
@@ -3296,7 +3296,7 @@
                 </a:tc>
                 <a:extLst>
                   <a:ext uri="{0D108BD9-81ED-4DB2-BD59-A6C34878D82A}">
-                    <a16:rowId xmlns:a16="http://schemas.microsoft.com/office/drawing/2014/main" xmlns="" val="196882050"/>
+                    <a16:rowId xmlns="" xmlns:a16="http://schemas.microsoft.com/office/drawing/2014/main" val="196882050"/>
                   </a:ext>
                 </a:extLst>
               </a:tr>
@@ -3370,7 +3370,7 @@
                 </a:tc>
                 <a:extLst>
                   <a:ext uri="{0D108BD9-81ED-4DB2-BD59-A6C34878D82A}">
-                    <a16:rowId xmlns:a16="http://schemas.microsoft.com/office/drawing/2014/main" xmlns="" val="1570215453"/>
+                    <a16:rowId xmlns="" xmlns:a16="http://schemas.microsoft.com/office/drawing/2014/main" val="1570215453"/>
                   </a:ext>
                 </a:extLst>
               </a:tr>
@@ -3444,7 +3444,7 @@
                 </a:tc>
                 <a:extLst>
                   <a:ext uri="{0D108BD9-81ED-4DB2-BD59-A6C34878D82A}">
-                    <a16:rowId xmlns:a16="http://schemas.microsoft.com/office/drawing/2014/main" xmlns="" val="2067295398"/>
+                    <a16:rowId xmlns="" xmlns:a16="http://schemas.microsoft.com/office/drawing/2014/main" val="2067295398"/>
                   </a:ext>
                 </a:extLst>
               </a:tr>
@@ -3518,7 +3518,7 @@
                 </a:tc>
                 <a:extLst>
                   <a:ext uri="{0D108BD9-81ED-4DB2-BD59-A6C34878D82A}">
-                    <a16:rowId xmlns:a16="http://schemas.microsoft.com/office/drawing/2014/main" xmlns="" val="498738980"/>
+                    <a16:rowId xmlns="" xmlns:a16="http://schemas.microsoft.com/office/drawing/2014/main" val="498738980"/>
                   </a:ext>
                 </a:extLst>
               </a:tr>
@@ -3585,7 +3585,7 @@
                 </a:tc>
                 <a:extLst>
                   <a:ext uri="{0D108BD9-81ED-4DB2-BD59-A6C34878D82A}">
-                    <a16:rowId xmlns:a16="http://schemas.microsoft.com/office/drawing/2014/main" xmlns="" val="2702805797"/>
+                    <a16:rowId xmlns="" xmlns:a16="http://schemas.microsoft.com/office/drawing/2014/main" val="2702805797"/>
                   </a:ext>
                 </a:extLst>
               </a:tr>
@@ -3652,7 +3652,7 @@
                 </a:tc>
                 <a:extLst>
                   <a:ext uri="{0D108BD9-81ED-4DB2-BD59-A6C34878D82A}">
-                    <a16:rowId xmlns:a16="http://schemas.microsoft.com/office/drawing/2014/main" xmlns="" val="1306237140"/>
+                    <a16:rowId xmlns="" xmlns:a16="http://schemas.microsoft.com/office/drawing/2014/main" val="1306237140"/>
                   </a:ext>
                 </a:extLst>
               </a:tr>
@@ -3726,7 +3726,7 @@
                 </a:tc>
                 <a:extLst>
                   <a:ext uri="{0D108BD9-81ED-4DB2-BD59-A6C34878D82A}">
-                    <a16:rowId xmlns:a16="http://schemas.microsoft.com/office/drawing/2014/main" xmlns="" val="77369290"/>
+                    <a16:rowId xmlns="" xmlns:a16="http://schemas.microsoft.com/office/drawing/2014/main" val="77369290"/>
                   </a:ext>
                 </a:extLst>
               </a:tr>
@@ -3793,7 +3793,7 @@
                 </a:tc>
                 <a:extLst>
                   <a:ext uri="{0D108BD9-81ED-4DB2-BD59-A6C34878D82A}">
-                    <a16:rowId xmlns:a16="http://schemas.microsoft.com/office/drawing/2014/main" xmlns="" val="3496620231"/>
+                    <a16:rowId xmlns="" xmlns:a16="http://schemas.microsoft.com/office/drawing/2014/main" val="3496620231"/>
                   </a:ext>
                 </a:extLst>
               </a:tr>
@@ -3867,7 +3867,7 @@
                 </a:tc>
                 <a:extLst>
                   <a:ext uri="{0D108BD9-81ED-4DB2-BD59-A6C34878D82A}">
-                    <a16:rowId xmlns:a16="http://schemas.microsoft.com/office/drawing/2014/main" xmlns="" val="1593761885"/>
+                    <a16:rowId xmlns="" xmlns:a16="http://schemas.microsoft.com/office/drawing/2014/main" val="1593761885"/>
                   </a:ext>
                 </a:extLst>
               </a:tr>
@@ -3941,7 +3941,7 @@
                 </a:tc>
                 <a:extLst>
                   <a:ext uri="{0D108BD9-81ED-4DB2-BD59-A6C34878D82A}">
-                    <a16:rowId xmlns:a16="http://schemas.microsoft.com/office/drawing/2014/main" xmlns="" val="3551024362"/>
+                    <a16:rowId xmlns="" xmlns:a16="http://schemas.microsoft.com/office/drawing/2014/main" val="3551024362"/>
                   </a:ext>
                 </a:extLst>
               </a:tr>
@@ -3954,7 +3954,7 @@
           <p:cNvPr id="6" name="Table 5">
             <a:extLst>
               <a:ext uri="{FF2B5EF4-FFF2-40B4-BE49-F238E27FC236}">
-                <a16:creationId xmlns:a16="http://schemas.microsoft.com/office/drawing/2014/main" xmlns="" id="{8ED281BD-3869-486F-B89B-6F378D7FF205}"/>
+                <a16:creationId xmlns="" xmlns:a16="http://schemas.microsoft.com/office/drawing/2014/main" id="{8ED281BD-3869-486F-B89B-6F378D7FF205}"/>
               </a:ext>
             </a:extLst>
           </p:cNvPr>
@@ -3983,14 +3983,14 @@
                 <a:gridCol w="3698301">
                   <a:extLst>
                     <a:ext uri="{9D8B030D-6E8A-4147-A177-3AD203B41FA5}">
-                      <a16:colId xmlns:a16="http://schemas.microsoft.com/office/drawing/2014/main" xmlns="" val="3828946005"/>
+                      <a16:colId xmlns="" xmlns:a16="http://schemas.microsoft.com/office/drawing/2014/main" val="3828946005"/>
                     </a:ext>
                   </a:extLst>
                 </a:gridCol>
                 <a:gridCol w="1338943">
                   <a:extLst>
                     <a:ext uri="{9D8B030D-6E8A-4147-A177-3AD203B41FA5}">
-                      <a16:colId xmlns:a16="http://schemas.microsoft.com/office/drawing/2014/main" xmlns="" val="3116620885"/>
+                      <a16:colId xmlns="" xmlns:a16="http://schemas.microsoft.com/office/drawing/2014/main" val="3116620885"/>
                     </a:ext>
                   </a:extLst>
                 </a:gridCol>
@@ -4035,7 +4035,7 @@
                 </a:tc>
                 <a:extLst>
                   <a:ext uri="{0D108BD9-81ED-4DB2-BD59-A6C34878D82A}">
-                    <a16:rowId xmlns:a16="http://schemas.microsoft.com/office/drawing/2014/main" xmlns="" val="2750690894"/>
+                    <a16:rowId xmlns="" xmlns:a16="http://schemas.microsoft.com/office/drawing/2014/main" val="2750690894"/>
                   </a:ext>
                 </a:extLst>
               </a:tr>
@@ -4088,7 +4088,7 @@
                 </a:tc>
                 <a:extLst>
                   <a:ext uri="{0D108BD9-81ED-4DB2-BD59-A6C34878D82A}">
-                    <a16:rowId xmlns:a16="http://schemas.microsoft.com/office/drawing/2014/main" xmlns="" val="621517536"/>
+                    <a16:rowId xmlns="" xmlns:a16="http://schemas.microsoft.com/office/drawing/2014/main" val="621517536"/>
                   </a:ext>
                 </a:extLst>
               </a:tr>
@@ -4155,7 +4155,7 @@
                 </a:tc>
                 <a:extLst>
                   <a:ext uri="{0D108BD9-81ED-4DB2-BD59-A6C34878D82A}">
-                    <a16:rowId xmlns:a16="http://schemas.microsoft.com/office/drawing/2014/main" xmlns="" val="196882050"/>
+                    <a16:rowId xmlns="" xmlns:a16="http://schemas.microsoft.com/office/drawing/2014/main" val="196882050"/>
                   </a:ext>
                 </a:extLst>
               </a:tr>
@@ -4222,7 +4222,7 @@
                 </a:tc>
                 <a:extLst>
                   <a:ext uri="{0D108BD9-81ED-4DB2-BD59-A6C34878D82A}">
-                    <a16:rowId xmlns:a16="http://schemas.microsoft.com/office/drawing/2014/main" xmlns="" val="1570215453"/>
+                    <a16:rowId xmlns="" xmlns:a16="http://schemas.microsoft.com/office/drawing/2014/main" val="1570215453"/>
                   </a:ext>
                 </a:extLst>
               </a:tr>
@@ -4296,7 +4296,7 @@
                 </a:tc>
                 <a:extLst>
                   <a:ext uri="{0D108BD9-81ED-4DB2-BD59-A6C34878D82A}">
-                    <a16:rowId xmlns:a16="http://schemas.microsoft.com/office/drawing/2014/main" xmlns="" val="2067295398"/>
+                    <a16:rowId xmlns="" xmlns:a16="http://schemas.microsoft.com/office/drawing/2014/main" val="2067295398"/>
                   </a:ext>
                 </a:extLst>
               </a:tr>
@@ -4370,7 +4370,7 @@
                 </a:tc>
                 <a:extLst>
                   <a:ext uri="{0D108BD9-81ED-4DB2-BD59-A6C34878D82A}">
-                    <a16:rowId xmlns:a16="http://schemas.microsoft.com/office/drawing/2014/main" xmlns="" val="498738980"/>
+                    <a16:rowId xmlns="" xmlns:a16="http://schemas.microsoft.com/office/drawing/2014/main" val="498738980"/>
                   </a:ext>
                 </a:extLst>
               </a:tr>
@@ -4444,7 +4444,7 @@
                 </a:tc>
                 <a:extLst>
                   <a:ext uri="{0D108BD9-81ED-4DB2-BD59-A6C34878D82A}">
-                    <a16:rowId xmlns:a16="http://schemas.microsoft.com/office/drawing/2014/main" xmlns="" val="2702805797"/>
+                    <a16:rowId xmlns="" xmlns:a16="http://schemas.microsoft.com/office/drawing/2014/main" val="2702805797"/>
                   </a:ext>
                 </a:extLst>
               </a:tr>
@@ -4518,7 +4518,7 @@
                 </a:tc>
                 <a:extLst>
                   <a:ext uri="{0D108BD9-81ED-4DB2-BD59-A6C34878D82A}">
-                    <a16:rowId xmlns:a16="http://schemas.microsoft.com/office/drawing/2014/main" xmlns="" val="1306237140"/>
+                    <a16:rowId xmlns="" xmlns:a16="http://schemas.microsoft.com/office/drawing/2014/main" val="1306237140"/>
                   </a:ext>
                 </a:extLst>
               </a:tr>
@@ -4592,7 +4592,7 @@
                 </a:tc>
                 <a:extLst>
                   <a:ext uri="{0D108BD9-81ED-4DB2-BD59-A6C34878D82A}">
-                    <a16:rowId xmlns:a16="http://schemas.microsoft.com/office/drawing/2014/main" xmlns="" val="77369290"/>
+                    <a16:rowId xmlns="" xmlns:a16="http://schemas.microsoft.com/office/drawing/2014/main" val="77369290"/>
                   </a:ext>
                 </a:extLst>
               </a:tr>
@@ -4666,7 +4666,7 @@
                 </a:tc>
                 <a:extLst>
                   <a:ext uri="{0D108BD9-81ED-4DB2-BD59-A6C34878D82A}">
-                    <a16:rowId xmlns:a16="http://schemas.microsoft.com/office/drawing/2014/main" xmlns="" val="3496620231"/>
+                    <a16:rowId xmlns="" xmlns:a16="http://schemas.microsoft.com/office/drawing/2014/main" val="3496620231"/>
                   </a:ext>
                 </a:extLst>
               </a:tr>
@@ -4740,7 +4740,7 @@
                 </a:tc>
                 <a:extLst>
                   <a:ext uri="{0D108BD9-81ED-4DB2-BD59-A6C34878D82A}">
-                    <a16:rowId xmlns:a16="http://schemas.microsoft.com/office/drawing/2014/main" xmlns="" val="1593761885"/>
+                    <a16:rowId xmlns="" xmlns:a16="http://schemas.microsoft.com/office/drawing/2014/main" val="1593761885"/>
                   </a:ext>
                 </a:extLst>
               </a:tr>
@@ -4807,7 +4807,7 @@
                 </a:tc>
                 <a:extLst>
                   <a:ext uri="{0D108BD9-81ED-4DB2-BD59-A6C34878D82A}">
-                    <a16:rowId xmlns:a16="http://schemas.microsoft.com/office/drawing/2014/main" xmlns="" val="3551024362"/>
+                    <a16:rowId xmlns="" xmlns:a16="http://schemas.microsoft.com/office/drawing/2014/main" val="3551024362"/>
                   </a:ext>
                 </a:extLst>
               </a:tr>
@@ -4850,7 +4850,7 @@
           <p:cNvPr id="2" name="Title 1">
             <a:extLst>
               <a:ext uri="{FF2B5EF4-FFF2-40B4-BE49-F238E27FC236}">
-                <a16:creationId xmlns:a16="http://schemas.microsoft.com/office/drawing/2014/main" xmlns="" id="{987F51D3-538B-4293-B504-421274B24C00}"/>
+                <a16:creationId xmlns="" xmlns:a16="http://schemas.microsoft.com/office/drawing/2014/main" id="{987F51D3-538B-4293-B504-421274B24C00}"/>
               </a:ext>
             </a:extLst>
           </p:cNvPr>
@@ -4879,7 +4879,7 @@
           <p:cNvPr id="9" name="TextBox 8">
             <a:extLst>
               <a:ext uri="{FF2B5EF4-FFF2-40B4-BE49-F238E27FC236}">
-                <a16:creationId xmlns:a16="http://schemas.microsoft.com/office/drawing/2014/main" xmlns="" id="{E17C9DD2-5731-48A3-ADE4-2D8C45483EC0}"/>
+                <a16:creationId xmlns="" xmlns:a16="http://schemas.microsoft.com/office/drawing/2014/main" id="{E17C9DD2-5731-48A3-ADE4-2D8C45483EC0}"/>
               </a:ext>
             </a:extLst>
           </p:cNvPr>
@@ -5015,7 +5015,7 @@
           <p:cNvPr id="2" name="Title 1">
             <a:extLst>
               <a:ext uri="{FF2B5EF4-FFF2-40B4-BE49-F238E27FC236}">
-                <a16:creationId xmlns:a16="http://schemas.microsoft.com/office/drawing/2014/main" xmlns="" id="{987F51D3-538B-4293-B504-421274B24C00}"/>
+                <a16:creationId xmlns="" xmlns:a16="http://schemas.microsoft.com/office/drawing/2014/main" id="{987F51D3-538B-4293-B504-421274B24C00}"/>
               </a:ext>
             </a:extLst>
           </p:cNvPr>
@@ -5052,7 +5052,7 @@
           <p:cNvPr id="9" name="TextBox 8">
             <a:extLst>
               <a:ext uri="{FF2B5EF4-FFF2-40B4-BE49-F238E27FC236}">
-                <a16:creationId xmlns:a16="http://schemas.microsoft.com/office/drawing/2014/main" xmlns="" id="{E17C9DD2-5731-48A3-ADE4-2D8C45483EC0}"/>
+                <a16:creationId xmlns="" xmlns:a16="http://schemas.microsoft.com/office/drawing/2014/main" id="{E17C9DD2-5731-48A3-ADE4-2D8C45483EC0}"/>
               </a:ext>
             </a:extLst>
           </p:cNvPr>
@@ -5252,7 +5252,7 @@
           <p:cNvPr id="2" name="Title 1">
             <a:extLst>
               <a:ext uri="{FF2B5EF4-FFF2-40B4-BE49-F238E27FC236}">
-                <a16:creationId xmlns:a16="http://schemas.microsoft.com/office/drawing/2014/main" xmlns="" id="{9065F088-31B2-4143-A23D-141139DB3894}"/>
+                <a16:creationId xmlns="" xmlns:a16="http://schemas.microsoft.com/office/drawing/2014/main" id="{9065F088-31B2-4143-A23D-141139DB3894}"/>
               </a:ext>
             </a:extLst>
           </p:cNvPr>
@@ -5281,7 +5281,7 @@
           <p:cNvPr id="8" name="TextBox 7">
             <a:extLst>
               <a:ext uri="{FF2B5EF4-FFF2-40B4-BE49-F238E27FC236}">
-                <a16:creationId xmlns:a16="http://schemas.microsoft.com/office/drawing/2014/main" xmlns="" id="{C938AFA7-DA26-4CF7-9C37-DD86FFCEE2D9}"/>
+                <a16:creationId xmlns="" xmlns:a16="http://schemas.microsoft.com/office/drawing/2014/main" id="{C938AFA7-DA26-4CF7-9C37-DD86FFCEE2D9}"/>
               </a:ext>
             </a:extLst>
           </p:cNvPr>
@@ -5347,7 +5347,7 @@
           <p:cNvPr id="5" name="Content Placeholder 4">
             <a:extLst>
               <a:ext uri="{FF2B5EF4-FFF2-40B4-BE49-F238E27FC236}">
-                <a16:creationId xmlns:a16="http://schemas.microsoft.com/office/drawing/2014/main" xmlns="" id="{73521416-4B4D-4742-BA86-1954AADB18EF}"/>
+                <a16:creationId xmlns="" xmlns:a16="http://schemas.microsoft.com/office/drawing/2014/main" id="{73521416-4B4D-4742-BA86-1954AADB18EF}"/>
               </a:ext>
             </a:extLst>
           </p:cNvPr>
@@ -5377,28 +5377,28 @@
                 <a:gridCol w="1555602">
                   <a:extLst>
                     <a:ext uri="{9D8B030D-6E8A-4147-A177-3AD203B41FA5}">
-                      <a16:colId xmlns:a16="http://schemas.microsoft.com/office/drawing/2014/main" xmlns="" val="3478917767"/>
+                      <a16:colId xmlns="" xmlns:a16="http://schemas.microsoft.com/office/drawing/2014/main" val="3478917767"/>
                     </a:ext>
                   </a:extLst>
                 </a:gridCol>
                 <a:gridCol w="1555602">
                   <a:extLst>
                     <a:ext uri="{9D8B030D-6E8A-4147-A177-3AD203B41FA5}">
-                      <a16:colId xmlns:a16="http://schemas.microsoft.com/office/drawing/2014/main" xmlns="" val="2939297383"/>
+                      <a16:colId xmlns="" xmlns:a16="http://schemas.microsoft.com/office/drawing/2014/main" val="2939297383"/>
                     </a:ext>
                   </a:extLst>
                 </a:gridCol>
                 <a:gridCol w="840605">
                   <a:extLst>
                     <a:ext uri="{9D8B030D-6E8A-4147-A177-3AD203B41FA5}">
-                      <a16:colId xmlns:a16="http://schemas.microsoft.com/office/drawing/2014/main" xmlns="" val="2486717004"/>
+                      <a16:colId xmlns="" xmlns:a16="http://schemas.microsoft.com/office/drawing/2014/main" val="2486717004"/>
                     </a:ext>
                   </a:extLst>
                 </a:gridCol>
                 <a:gridCol w="1033847">
                   <a:extLst>
                     <a:ext uri="{9D8B030D-6E8A-4147-A177-3AD203B41FA5}">
-                      <a16:colId xmlns:a16="http://schemas.microsoft.com/office/drawing/2014/main" xmlns="" val="706046472"/>
+                      <a16:colId xmlns="" xmlns:a16="http://schemas.microsoft.com/office/drawing/2014/main" val="706046472"/>
                     </a:ext>
                   </a:extLst>
                 </a:gridCol>
@@ -5481,7 +5481,7 @@
                 </a:tc>
                 <a:extLst>
                   <a:ext uri="{0D108BD9-81ED-4DB2-BD59-A6C34878D82A}">
-                    <a16:rowId xmlns:a16="http://schemas.microsoft.com/office/drawing/2014/main" xmlns="" val="1550085656"/>
+                    <a16:rowId xmlns="" xmlns:a16="http://schemas.microsoft.com/office/drawing/2014/main" val="1550085656"/>
                   </a:ext>
                 </a:extLst>
               </a:tr>
@@ -5563,7 +5563,7 @@
                 </a:tc>
                 <a:extLst>
                   <a:ext uri="{0D108BD9-81ED-4DB2-BD59-A6C34878D82A}">
-                    <a16:rowId xmlns:a16="http://schemas.microsoft.com/office/drawing/2014/main" xmlns="" val="3665824223"/>
+                    <a16:rowId xmlns="" xmlns:a16="http://schemas.microsoft.com/office/drawing/2014/main" val="3665824223"/>
                   </a:ext>
                 </a:extLst>
               </a:tr>
@@ -5674,7 +5674,7 @@
                 </a:tc>
                 <a:extLst>
                   <a:ext uri="{0D108BD9-81ED-4DB2-BD59-A6C34878D82A}">
-                    <a16:rowId xmlns:a16="http://schemas.microsoft.com/office/drawing/2014/main" xmlns="" val="4095835183"/>
+                    <a16:rowId xmlns="" xmlns:a16="http://schemas.microsoft.com/office/drawing/2014/main" val="4095835183"/>
                   </a:ext>
                 </a:extLst>
               </a:tr>
@@ -5771,7 +5771,7 @@
                 </a:tc>
                 <a:extLst>
                   <a:ext uri="{0D108BD9-81ED-4DB2-BD59-A6C34878D82A}">
-                    <a16:rowId xmlns:a16="http://schemas.microsoft.com/office/drawing/2014/main" xmlns="" val="2388995701"/>
+                    <a16:rowId xmlns="" xmlns:a16="http://schemas.microsoft.com/office/drawing/2014/main" val="2388995701"/>
                   </a:ext>
                 </a:extLst>
               </a:tr>
@@ -5868,7 +5868,7 @@
                 </a:tc>
                 <a:extLst>
                   <a:ext uri="{0D108BD9-81ED-4DB2-BD59-A6C34878D82A}">
-                    <a16:rowId xmlns:a16="http://schemas.microsoft.com/office/drawing/2014/main" xmlns="" val="1549553246"/>
+                    <a16:rowId xmlns="" xmlns:a16="http://schemas.microsoft.com/office/drawing/2014/main" val="1549553246"/>
                   </a:ext>
                 </a:extLst>
               </a:tr>
@@ -5975,7 +5975,7 @@
                 </a:tc>
                 <a:extLst>
                   <a:ext uri="{0D108BD9-81ED-4DB2-BD59-A6C34878D82A}">
-                    <a16:rowId xmlns:a16="http://schemas.microsoft.com/office/drawing/2014/main" xmlns="" val="2325486976"/>
+                    <a16:rowId xmlns="" xmlns:a16="http://schemas.microsoft.com/office/drawing/2014/main" val="2325486976"/>
                   </a:ext>
                 </a:extLst>
               </a:tr>
@@ -6088,7 +6088,7 @@
                 </a:tc>
                 <a:extLst>
                   <a:ext uri="{0D108BD9-81ED-4DB2-BD59-A6C34878D82A}">
-                    <a16:rowId xmlns:a16="http://schemas.microsoft.com/office/drawing/2014/main" xmlns="" val="108756169"/>
+                    <a16:rowId xmlns="" xmlns:a16="http://schemas.microsoft.com/office/drawing/2014/main" val="108756169"/>
                   </a:ext>
                 </a:extLst>
               </a:tr>
@@ -6225,7 +6225,7 @@
                 </a:tc>
                 <a:extLst>
                   <a:ext uri="{0D108BD9-81ED-4DB2-BD59-A6C34878D82A}">
-                    <a16:rowId xmlns:a16="http://schemas.microsoft.com/office/drawing/2014/main" xmlns="" val="868174123"/>
+                    <a16:rowId xmlns="" xmlns:a16="http://schemas.microsoft.com/office/drawing/2014/main" val="868174123"/>
                   </a:ext>
                 </a:extLst>
               </a:tr>
@@ -6322,7 +6322,7 @@
                 </a:tc>
                 <a:extLst>
                   <a:ext uri="{0D108BD9-81ED-4DB2-BD59-A6C34878D82A}">
-                    <a16:rowId xmlns:a16="http://schemas.microsoft.com/office/drawing/2014/main" xmlns="" val="1773180674"/>
+                    <a16:rowId xmlns="" xmlns:a16="http://schemas.microsoft.com/office/drawing/2014/main" val="1773180674"/>
                   </a:ext>
                 </a:extLst>
               </a:tr>
@@ -6419,7 +6419,7 @@
                 </a:tc>
                 <a:extLst>
                   <a:ext uri="{0D108BD9-81ED-4DB2-BD59-A6C34878D82A}">
-                    <a16:rowId xmlns:a16="http://schemas.microsoft.com/office/drawing/2014/main" xmlns="" val="324761190"/>
+                    <a16:rowId xmlns="" xmlns:a16="http://schemas.microsoft.com/office/drawing/2014/main" val="324761190"/>
                   </a:ext>
                 </a:extLst>
               </a:tr>
@@ -6526,7 +6526,7 @@
                 </a:tc>
                 <a:extLst>
                   <a:ext uri="{0D108BD9-81ED-4DB2-BD59-A6C34878D82A}">
-                    <a16:rowId xmlns:a16="http://schemas.microsoft.com/office/drawing/2014/main" xmlns="" val="1775108306"/>
+                    <a16:rowId xmlns="" xmlns:a16="http://schemas.microsoft.com/office/drawing/2014/main" val="1775108306"/>
                   </a:ext>
                 </a:extLst>
               </a:tr>
@@ -6639,7 +6639,7 @@
                 </a:tc>
                 <a:extLst>
                   <a:ext uri="{0D108BD9-81ED-4DB2-BD59-A6C34878D82A}">
-                    <a16:rowId xmlns:a16="http://schemas.microsoft.com/office/drawing/2014/main" xmlns="" val="2613320283"/>
+                    <a16:rowId xmlns="" xmlns:a16="http://schemas.microsoft.com/office/drawing/2014/main" val="2613320283"/>
                   </a:ext>
                 </a:extLst>
               </a:tr>
@@ -6682,7 +6682,7 @@
           <p:cNvPr id="2" name="Title 1">
             <a:extLst>
               <a:ext uri="{FF2B5EF4-FFF2-40B4-BE49-F238E27FC236}">
-                <a16:creationId xmlns:a16="http://schemas.microsoft.com/office/drawing/2014/main" xmlns="" id="{6DB497BC-6377-4BD4-A8A6-D232ABBA0506}"/>
+                <a16:creationId xmlns="" xmlns:a16="http://schemas.microsoft.com/office/drawing/2014/main" id="{6DB497BC-6377-4BD4-A8A6-D232ABBA0506}"/>
               </a:ext>
             </a:extLst>
           </p:cNvPr>
@@ -6711,7 +6711,7 @@
           <p:cNvPr id="5" name="Content Placeholder 6">
             <a:extLst>
               <a:ext uri="{FF2B5EF4-FFF2-40B4-BE49-F238E27FC236}">
-                <a16:creationId xmlns:a16="http://schemas.microsoft.com/office/drawing/2014/main" xmlns="" id="{DC4197B8-28FC-42A2-AD89-532EB3608797}"/>
+                <a16:creationId xmlns="" xmlns:a16="http://schemas.microsoft.com/office/drawing/2014/main" id="{DC4197B8-28FC-42A2-AD89-532EB3608797}"/>
               </a:ext>
             </a:extLst>
           </p:cNvPr>
@@ -6741,35 +6741,35 @@
                 <a:gridCol w="1878430">
                   <a:extLst>
                     <a:ext uri="{9D8B030D-6E8A-4147-A177-3AD203B41FA5}">
-                      <a16:colId xmlns:a16="http://schemas.microsoft.com/office/drawing/2014/main" xmlns="" val="20000"/>
+                      <a16:colId xmlns="" xmlns:a16="http://schemas.microsoft.com/office/drawing/2014/main" val="20000"/>
                     </a:ext>
                   </a:extLst>
                 </a:gridCol>
                 <a:gridCol w="4212205">
                   <a:extLst>
                     <a:ext uri="{9D8B030D-6E8A-4147-A177-3AD203B41FA5}">
-                      <a16:colId xmlns:a16="http://schemas.microsoft.com/office/drawing/2014/main" xmlns="" val="20001"/>
+                      <a16:colId xmlns="" xmlns:a16="http://schemas.microsoft.com/office/drawing/2014/main" val="20001"/>
                     </a:ext>
                   </a:extLst>
                 </a:gridCol>
                 <a:gridCol w="1165829">
                   <a:extLst>
                     <a:ext uri="{9D8B030D-6E8A-4147-A177-3AD203B41FA5}">
-                      <a16:colId xmlns:a16="http://schemas.microsoft.com/office/drawing/2014/main" xmlns="" val="20002"/>
+                      <a16:colId xmlns="" xmlns:a16="http://schemas.microsoft.com/office/drawing/2014/main" val="20002"/>
                     </a:ext>
                   </a:extLst>
                 </a:gridCol>
                 <a:gridCol w="1252326">
                   <a:extLst>
                     <a:ext uri="{9D8B030D-6E8A-4147-A177-3AD203B41FA5}">
-                      <a16:colId xmlns:a16="http://schemas.microsoft.com/office/drawing/2014/main" xmlns="" val="20003"/>
+                      <a16:colId xmlns="" xmlns:a16="http://schemas.microsoft.com/office/drawing/2014/main" val="20003"/>
                     </a:ext>
                   </a:extLst>
                 </a:gridCol>
                 <a:gridCol w="1252326">
                   <a:extLst>
                     <a:ext uri="{9D8B030D-6E8A-4147-A177-3AD203B41FA5}">
-                      <a16:colId xmlns:a16="http://schemas.microsoft.com/office/drawing/2014/main" xmlns="" val="20004"/>
+                      <a16:colId xmlns="" xmlns:a16="http://schemas.microsoft.com/office/drawing/2014/main" val="20004"/>
                     </a:ext>
                   </a:extLst>
                 </a:gridCol>
@@ -6886,7 +6886,7 @@
                 </a:tc>
                 <a:extLst>
                   <a:ext uri="{0D108BD9-81ED-4DB2-BD59-A6C34878D82A}">
-                    <a16:rowId xmlns:a16="http://schemas.microsoft.com/office/drawing/2014/main" xmlns="" val="10000"/>
+                    <a16:rowId xmlns="" xmlns:a16="http://schemas.microsoft.com/office/drawing/2014/main" val="10000"/>
                   </a:ext>
                 </a:extLst>
               </a:tr>
@@ -7006,7 +7006,7 @@
                 </a:tc>
                 <a:extLst>
                   <a:ext uri="{0D108BD9-81ED-4DB2-BD59-A6C34878D82A}">
-                    <a16:rowId xmlns:a16="http://schemas.microsoft.com/office/drawing/2014/main" xmlns="" val="10001"/>
+                    <a16:rowId xmlns="" xmlns:a16="http://schemas.microsoft.com/office/drawing/2014/main" val="10001"/>
                   </a:ext>
                 </a:extLst>
               </a:tr>
@@ -7113,7 +7113,7 @@
                 </a:tc>
                 <a:extLst>
                   <a:ext uri="{0D108BD9-81ED-4DB2-BD59-A6C34878D82A}">
-                    <a16:rowId xmlns:a16="http://schemas.microsoft.com/office/drawing/2014/main" xmlns="" val="10002"/>
+                    <a16:rowId xmlns="" xmlns:a16="http://schemas.microsoft.com/office/drawing/2014/main" val="10002"/>
                   </a:ext>
                 </a:extLst>
               </a:tr>
@@ -7210,7 +7210,7 @@
                 </a:tc>
                 <a:extLst>
                   <a:ext uri="{0D108BD9-81ED-4DB2-BD59-A6C34878D82A}">
-                    <a16:rowId xmlns:a16="http://schemas.microsoft.com/office/drawing/2014/main" xmlns="" val="10003"/>
+                    <a16:rowId xmlns="" xmlns:a16="http://schemas.microsoft.com/office/drawing/2014/main" val="10003"/>
                   </a:ext>
                 </a:extLst>
               </a:tr>
@@ -7307,7 +7307,7 @@
                 </a:tc>
                 <a:extLst>
                   <a:ext uri="{0D108BD9-81ED-4DB2-BD59-A6C34878D82A}">
-                    <a16:rowId xmlns:a16="http://schemas.microsoft.com/office/drawing/2014/main" xmlns="" val="10004"/>
+                    <a16:rowId xmlns="" xmlns:a16="http://schemas.microsoft.com/office/drawing/2014/main" val="10004"/>
                   </a:ext>
                 </a:extLst>
               </a:tr>
@@ -7404,7 +7404,7 @@
                 </a:tc>
                 <a:extLst>
                   <a:ext uri="{0D108BD9-81ED-4DB2-BD59-A6C34878D82A}">
-                    <a16:rowId xmlns:a16="http://schemas.microsoft.com/office/drawing/2014/main" xmlns="" val="10005"/>
+                    <a16:rowId xmlns="" xmlns:a16="http://schemas.microsoft.com/office/drawing/2014/main" val="10005"/>
                   </a:ext>
                 </a:extLst>
               </a:tr>
@@ -7514,7 +7514,7 @@
                 </a:tc>
                 <a:extLst>
                   <a:ext uri="{0D108BD9-81ED-4DB2-BD59-A6C34878D82A}">
-                    <a16:rowId xmlns:a16="http://schemas.microsoft.com/office/drawing/2014/main" xmlns="" val="10006"/>
+                    <a16:rowId xmlns="" xmlns:a16="http://schemas.microsoft.com/office/drawing/2014/main" val="10006"/>
                   </a:ext>
                 </a:extLst>
               </a:tr>
@@ -7628,7 +7628,7 @@
                 </a:tc>
                 <a:extLst>
                   <a:ext uri="{0D108BD9-81ED-4DB2-BD59-A6C34878D82A}">
-                    <a16:rowId xmlns:a16="http://schemas.microsoft.com/office/drawing/2014/main" xmlns="" val="10007"/>
+                    <a16:rowId xmlns="" xmlns:a16="http://schemas.microsoft.com/office/drawing/2014/main" val="10007"/>
                   </a:ext>
                 </a:extLst>
               </a:tr>
@@ -7742,7 +7742,7 @@
                 </a:tc>
                 <a:extLst>
                   <a:ext uri="{0D108BD9-81ED-4DB2-BD59-A6C34878D82A}">
-                    <a16:rowId xmlns:a16="http://schemas.microsoft.com/office/drawing/2014/main" xmlns="" val="10008"/>
+                    <a16:rowId xmlns="" xmlns:a16="http://schemas.microsoft.com/office/drawing/2014/main" val="10008"/>
                   </a:ext>
                 </a:extLst>
               </a:tr>
@@ -7856,7 +7856,7 @@
                 </a:tc>
                 <a:extLst>
                   <a:ext uri="{0D108BD9-81ED-4DB2-BD59-A6C34878D82A}">
-                    <a16:rowId xmlns:a16="http://schemas.microsoft.com/office/drawing/2014/main" xmlns="" val="10009"/>
+                    <a16:rowId xmlns="" xmlns:a16="http://schemas.microsoft.com/office/drawing/2014/main" val="10009"/>
                   </a:ext>
                 </a:extLst>
               </a:tr>
@@ -7970,7 +7970,7 @@
                 </a:tc>
                 <a:extLst>
                   <a:ext uri="{0D108BD9-81ED-4DB2-BD59-A6C34878D82A}">
-                    <a16:rowId xmlns:a16="http://schemas.microsoft.com/office/drawing/2014/main" xmlns="" val="10010"/>
+                    <a16:rowId xmlns="" xmlns:a16="http://schemas.microsoft.com/office/drawing/2014/main" val="10010"/>
                   </a:ext>
                 </a:extLst>
               </a:tr>
@@ -8013,7 +8013,7 @@
           <p:cNvPr id="2" name="Title 1">
             <a:extLst>
               <a:ext uri="{FF2B5EF4-FFF2-40B4-BE49-F238E27FC236}">
-                <a16:creationId xmlns:a16="http://schemas.microsoft.com/office/drawing/2014/main" xmlns="" id="{7703A585-CB34-4847-AABD-D8BF1C39D16B}"/>
+                <a16:creationId xmlns="" xmlns:a16="http://schemas.microsoft.com/office/drawing/2014/main" id="{7703A585-CB34-4847-AABD-D8BF1C39D16B}"/>
               </a:ext>
             </a:extLst>
           </p:cNvPr>
@@ -8042,7 +8042,7 @@
           <p:cNvPr id="3" name="Content Placeholder 2">
             <a:extLst>
               <a:ext uri="{FF2B5EF4-FFF2-40B4-BE49-F238E27FC236}">
-                <a16:creationId xmlns:a16="http://schemas.microsoft.com/office/drawing/2014/main" xmlns="" id="{65C12D36-4D81-4990-B646-20709CA0D106}"/>
+                <a16:creationId xmlns="" xmlns:a16="http://schemas.microsoft.com/office/drawing/2014/main" id="{65C12D36-4D81-4990-B646-20709CA0D106}"/>
               </a:ext>
             </a:extLst>
           </p:cNvPr>
@@ -8255,21 +8255,21 @@
                 <a:gridCol w="1307104">
                   <a:extLst>
                     <a:ext uri="{9D8B030D-6E8A-4147-A177-3AD203B41FA5}">
-                      <a16:colId xmlns:a16="http://schemas.microsoft.com/office/drawing/2014/main" xmlns="" val="20000"/>
+                      <a16:colId xmlns="" xmlns:a16="http://schemas.microsoft.com/office/drawing/2014/main" val="20000"/>
                     </a:ext>
                   </a:extLst>
                 </a:gridCol>
                 <a:gridCol w="1622611">
                   <a:extLst>
                     <a:ext uri="{9D8B030D-6E8A-4147-A177-3AD203B41FA5}">
-                      <a16:colId xmlns:a16="http://schemas.microsoft.com/office/drawing/2014/main" xmlns="" val="20001"/>
+                      <a16:colId xmlns="" xmlns:a16="http://schemas.microsoft.com/office/drawing/2014/main" val="20001"/>
                     </a:ext>
                   </a:extLst>
                 </a:gridCol>
                 <a:gridCol w="1667684">
                   <a:extLst>
                     <a:ext uri="{9D8B030D-6E8A-4147-A177-3AD203B41FA5}">
-                      <a16:colId xmlns:a16="http://schemas.microsoft.com/office/drawing/2014/main" xmlns="" val="20002"/>
+                      <a16:colId xmlns="" xmlns:a16="http://schemas.microsoft.com/office/drawing/2014/main" val="20002"/>
                     </a:ext>
                   </a:extLst>
                 </a:gridCol>
@@ -8340,7 +8340,7 @@
                 </a:tc>
                 <a:extLst>
                   <a:ext uri="{0D108BD9-81ED-4DB2-BD59-A6C34878D82A}">
-                    <a16:rowId xmlns:a16="http://schemas.microsoft.com/office/drawing/2014/main" xmlns="" val="10000"/>
+                    <a16:rowId xmlns="" xmlns:a16="http://schemas.microsoft.com/office/drawing/2014/main" val="10000"/>
                   </a:ext>
                 </a:extLst>
               </a:tr>
@@ -8416,7 +8416,7 @@
                 </a:tc>
                 <a:extLst>
                   <a:ext uri="{0D108BD9-81ED-4DB2-BD59-A6C34878D82A}">
-                    <a16:rowId xmlns:a16="http://schemas.microsoft.com/office/drawing/2014/main" xmlns="" val="10001"/>
+                    <a16:rowId xmlns="" xmlns:a16="http://schemas.microsoft.com/office/drawing/2014/main" val="10001"/>
                   </a:ext>
                 </a:extLst>
               </a:tr>
@@ -8492,7 +8492,7 @@
                 </a:tc>
                 <a:extLst>
                   <a:ext uri="{0D108BD9-81ED-4DB2-BD59-A6C34878D82A}">
-                    <a16:rowId xmlns:a16="http://schemas.microsoft.com/office/drawing/2014/main" xmlns="" val="10002"/>
+                    <a16:rowId xmlns="" xmlns:a16="http://schemas.microsoft.com/office/drawing/2014/main" val="10002"/>
                   </a:ext>
                 </a:extLst>
               </a:tr>
@@ -8568,7 +8568,7 @@
                 </a:tc>
                 <a:extLst>
                   <a:ext uri="{0D108BD9-81ED-4DB2-BD59-A6C34878D82A}">
-                    <a16:rowId xmlns:a16="http://schemas.microsoft.com/office/drawing/2014/main" xmlns="" val="10003"/>
+                    <a16:rowId xmlns="" xmlns:a16="http://schemas.microsoft.com/office/drawing/2014/main" val="10003"/>
                   </a:ext>
                 </a:extLst>
               </a:tr>
@@ -8901,14 +8901,14 @@
                 <a:gridCol w="1676870">
                   <a:extLst>
                     <a:ext uri="{9D8B030D-6E8A-4147-A177-3AD203B41FA5}">
-                      <a16:colId xmlns:a16="http://schemas.microsoft.com/office/drawing/2014/main" xmlns="" val="20000"/>
+                      <a16:colId xmlns="" xmlns:a16="http://schemas.microsoft.com/office/drawing/2014/main" val="20000"/>
                     </a:ext>
                   </a:extLst>
                 </a:gridCol>
                 <a:gridCol w="3663480">
                   <a:extLst>
                     <a:ext uri="{9D8B030D-6E8A-4147-A177-3AD203B41FA5}">
-                      <a16:colId xmlns:a16="http://schemas.microsoft.com/office/drawing/2014/main" xmlns="" val="20001"/>
+                      <a16:colId xmlns="" xmlns:a16="http://schemas.microsoft.com/office/drawing/2014/main" val="20001"/>
                     </a:ext>
                   </a:extLst>
                 </a:gridCol>
@@ -8962,7 +8962,7 @@
                 </a:tc>
                 <a:extLst>
                   <a:ext uri="{0D108BD9-81ED-4DB2-BD59-A6C34878D82A}">
-                    <a16:rowId xmlns:a16="http://schemas.microsoft.com/office/drawing/2014/main" xmlns="" val="10000"/>
+                    <a16:rowId xmlns="" xmlns:a16="http://schemas.microsoft.com/office/drawing/2014/main" val="10000"/>
                   </a:ext>
                 </a:extLst>
               </a:tr>
@@ -9002,7 +9002,7 @@
                 </a:tc>
                 <a:extLst>
                   <a:ext uri="{0D108BD9-81ED-4DB2-BD59-A6C34878D82A}">
-                    <a16:rowId xmlns:a16="http://schemas.microsoft.com/office/drawing/2014/main" xmlns="" val="10001"/>
+                    <a16:rowId xmlns="" xmlns:a16="http://schemas.microsoft.com/office/drawing/2014/main" val="10001"/>
                   </a:ext>
                 </a:extLst>
               </a:tr>
@@ -9055,7 +9055,7 @@
                 </a:tc>
                 <a:extLst>
                   <a:ext uri="{0D108BD9-81ED-4DB2-BD59-A6C34878D82A}">
-                    <a16:rowId xmlns:a16="http://schemas.microsoft.com/office/drawing/2014/main" xmlns="" val="10002"/>
+                    <a16:rowId xmlns="" xmlns:a16="http://schemas.microsoft.com/office/drawing/2014/main" val="10002"/>
                   </a:ext>
                 </a:extLst>
               </a:tr>
@@ -9095,7 +9095,7 @@
                 </a:tc>
                 <a:extLst>
                   <a:ext uri="{0D108BD9-81ED-4DB2-BD59-A6C34878D82A}">
-                    <a16:rowId xmlns:a16="http://schemas.microsoft.com/office/drawing/2014/main" xmlns="" val="10003"/>
+                    <a16:rowId xmlns="" xmlns:a16="http://schemas.microsoft.com/office/drawing/2014/main" val="10003"/>
                   </a:ext>
                 </a:extLst>
               </a:tr>
@@ -9135,7 +9135,7 @@
                 </a:tc>
                 <a:extLst>
                   <a:ext uri="{0D108BD9-81ED-4DB2-BD59-A6C34878D82A}">
-                    <a16:rowId xmlns:a16="http://schemas.microsoft.com/office/drawing/2014/main" xmlns="" val="10004"/>
+                    <a16:rowId xmlns="" xmlns:a16="http://schemas.microsoft.com/office/drawing/2014/main" val="10004"/>
                   </a:ext>
                 </a:extLst>
               </a:tr>
@@ -9175,7 +9175,7 @@
                 </a:tc>
                 <a:extLst>
                   <a:ext uri="{0D108BD9-81ED-4DB2-BD59-A6C34878D82A}">
-                    <a16:rowId xmlns:a16="http://schemas.microsoft.com/office/drawing/2014/main" xmlns="" val="10005"/>
+                    <a16:rowId xmlns="" xmlns:a16="http://schemas.microsoft.com/office/drawing/2014/main" val="10005"/>
                   </a:ext>
                 </a:extLst>
               </a:tr>
@@ -9215,7 +9215,7 @@
                 </a:tc>
                 <a:extLst>
                   <a:ext uri="{0D108BD9-81ED-4DB2-BD59-A6C34878D82A}">
-                    <a16:rowId xmlns:a16="http://schemas.microsoft.com/office/drawing/2014/main" xmlns="" val="10006"/>
+                    <a16:rowId xmlns="" xmlns:a16="http://schemas.microsoft.com/office/drawing/2014/main" val="10006"/>
                   </a:ext>
                 </a:extLst>
               </a:tr>
@@ -9255,7 +9255,7 @@
                 </a:tc>
                 <a:extLst>
                   <a:ext uri="{0D108BD9-81ED-4DB2-BD59-A6C34878D82A}">
-                    <a16:rowId xmlns:a16="http://schemas.microsoft.com/office/drawing/2014/main" xmlns="" val="10007"/>
+                    <a16:rowId xmlns="" xmlns:a16="http://schemas.microsoft.com/office/drawing/2014/main" val="10007"/>
                   </a:ext>
                 </a:extLst>
               </a:tr>
@@ -9314,7 +9314,7 @@
                 </a:tc>
                 <a:extLst>
                   <a:ext uri="{0D108BD9-81ED-4DB2-BD59-A6C34878D82A}">
-                    <a16:rowId xmlns:a16="http://schemas.microsoft.com/office/drawing/2014/main" xmlns="" val="10008"/>
+                    <a16:rowId xmlns="" xmlns:a16="http://schemas.microsoft.com/office/drawing/2014/main" val="10008"/>
                   </a:ext>
                 </a:extLst>
               </a:tr>
@@ -9357,7 +9357,7 @@
                 </a:tc>
                 <a:extLst>
                   <a:ext uri="{0D108BD9-81ED-4DB2-BD59-A6C34878D82A}">
-                    <a16:rowId xmlns:a16="http://schemas.microsoft.com/office/drawing/2014/main" xmlns="" val="10009"/>
+                    <a16:rowId xmlns="" xmlns:a16="http://schemas.microsoft.com/office/drawing/2014/main" val="10009"/>
                   </a:ext>
                 </a:extLst>
               </a:tr>
@@ -9400,7 +9400,7 @@
                 </a:tc>
                 <a:extLst>
                   <a:ext uri="{0D108BD9-81ED-4DB2-BD59-A6C34878D82A}">
-                    <a16:rowId xmlns:a16="http://schemas.microsoft.com/office/drawing/2014/main" xmlns="" val="10010"/>
+                    <a16:rowId xmlns="" xmlns:a16="http://schemas.microsoft.com/office/drawing/2014/main" val="10010"/>
                   </a:ext>
                 </a:extLst>
               </a:tr>
@@ -9443,7 +9443,7 @@
                 </a:tc>
                 <a:extLst>
                   <a:ext uri="{0D108BD9-81ED-4DB2-BD59-A6C34878D82A}">
-                    <a16:rowId xmlns:a16="http://schemas.microsoft.com/office/drawing/2014/main" xmlns="" val="10011"/>
+                    <a16:rowId xmlns="" xmlns:a16="http://schemas.microsoft.com/office/drawing/2014/main" val="10011"/>
                   </a:ext>
                 </a:extLst>
               </a:tr>
@@ -9486,7 +9486,7 @@
                 </a:tc>
                 <a:extLst>
                   <a:ext uri="{0D108BD9-81ED-4DB2-BD59-A6C34878D82A}">
-                    <a16:rowId xmlns:a16="http://schemas.microsoft.com/office/drawing/2014/main" xmlns="" val="10012"/>
+                    <a16:rowId xmlns="" xmlns:a16="http://schemas.microsoft.com/office/drawing/2014/main" val="10012"/>
                   </a:ext>
                 </a:extLst>
               </a:tr>
@@ -9529,7 +9529,7 @@
                 </a:tc>
                 <a:extLst>
                   <a:ext uri="{0D108BD9-81ED-4DB2-BD59-A6C34878D82A}">
-                    <a16:rowId xmlns:a16="http://schemas.microsoft.com/office/drawing/2014/main" xmlns="" val="10013"/>
+                    <a16:rowId xmlns="" xmlns:a16="http://schemas.microsoft.com/office/drawing/2014/main" val="10013"/>
                   </a:ext>
                 </a:extLst>
               </a:tr>
@@ -9572,7 +9572,7 @@
                 </a:tc>
                 <a:extLst>
                   <a:ext uri="{0D108BD9-81ED-4DB2-BD59-A6C34878D82A}">
-                    <a16:rowId xmlns:a16="http://schemas.microsoft.com/office/drawing/2014/main" xmlns="" val="10014"/>
+                    <a16:rowId xmlns="" xmlns:a16="http://schemas.microsoft.com/office/drawing/2014/main" val="10014"/>
                   </a:ext>
                 </a:extLst>
               </a:tr>
@@ -9615,7 +9615,7 @@
                 </a:tc>
                 <a:extLst>
                   <a:ext uri="{0D108BD9-81ED-4DB2-BD59-A6C34878D82A}">
-                    <a16:rowId xmlns:a16="http://schemas.microsoft.com/office/drawing/2014/main" xmlns="" val="10015"/>
+                    <a16:rowId xmlns="" xmlns:a16="http://schemas.microsoft.com/office/drawing/2014/main" val="10015"/>
                   </a:ext>
                 </a:extLst>
               </a:tr>
@@ -9658,7 +9658,7 @@
                 </a:tc>
                 <a:extLst>
                   <a:ext uri="{0D108BD9-81ED-4DB2-BD59-A6C34878D82A}">
-                    <a16:rowId xmlns:a16="http://schemas.microsoft.com/office/drawing/2014/main" xmlns="" val="10016"/>
+                    <a16:rowId xmlns="" xmlns:a16="http://schemas.microsoft.com/office/drawing/2014/main" val="10016"/>
                   </a:ext>
                 </a:extLst>
               </a:tr>
@@ -9711,7 +9711,7 @@
                 </a:tc>
                 <a:extLst>
                   <a:ext uri="{0D108BD9-81ED-4DB2-BD59-A6C34878D82A}">
-                    <a16:rowId xmlns:a16="http://schemas.microsoft.com/office/drawing/2014/main" xmlns="" val="10017"/>
+                    <a16:rowId xmlns="" xmlns:a16="http://schemas.microsoft.com/office/drawing/2014/main" val="10017"/>
                   </a:ext>
                 </a:extLst>
               </a:tr>
@@ -9751,7 +9751,7 @@
                 </a:tc>
                 <a:extLst>
                   <a:ext uri="{0D108BD9-81ED-4DB2-BD59-A6C34878D82A}">
-                    <a16:rowId xmlns:a16="http://schemas.microsoft.com/office/drawing/2014/main" xmlns="" val="10018"/>
+                    <a16:rowId xmlns="" xmlns:a16="http://schemas.microsoft.com/office/drawing/2014/main" val="10018"/>
                   </a:ext>
                 </a:extLst>
               </a:tr>
@@ -9981,28 +9981,28 @@
                 <a:gridCol w="1697973">
                   <a:extLst>
                     <a:ext uri="{9D8B030D-6E8A-4147-A177-3AD203B41FA5}">
-                      <a16:colId xmlns:a16="http://schemas.microsoft.com/office/drawing/2014/main" xmlns="" val="20000"/>
+                      <a16:colId xmlns="" xmlns:a16="http://schemas.microsoft.com/office/drawing/2014/main" val="20000"/>
                     </a:ext>
                   </a:extLst>
                 </a:gridCol>
                 <a:gridCol w="1697973">
                   <a:extLst>
                     <a:ext uri="{9D8B030D-6E8A-4147-A177-3AD203B41FA5}">
-                      <a16:colId xmlns:a16="http://schemas.microsoft.com/office/drawing/2014/main" xmlns="" val="20001"/>
+                      <a16:colId xmlns="" xmlns:a16="http://schemas.microsoft.com/office/drawing/2014/main" val="20001"/>
                     </a:ext>
                   </a:extLst>
                 </a:gridCol>
                 <a:gridCol w="917538">
                   <a:extLst>
                     <a:ext uri="{9D8B030D-6E8A-4147-A177-3AD203B41FA5}">
-                      <a16:colId xmlns:a16="http://schemas.microsoft.com/office/drawing/2014/main" xmlns="" val="20002"/>
+                      <a16:colId xmlns="" xmlns:a16="http://schemas.microsoft.com/office/drawing/2014/main" val="20002"/>
                     </a:ext>
                   </a:extLst>
                 </a:gridCol>
                 <a:gridCol w="1128466">
                   <a:extLst>
                     <a:ext uri="{9D8B030D-6E8A-4147-A177-3AD203B41FA5}">
-                      <a16:colId xmlns:a16="http://schemas.microsoft.com/office/drawing/2014/main" xmlns="" val="20003"/>
+                      <a16:colId xmlns="" xmlns:a16="http://schemas.microsoft.com/office/drawing/2014/main" val="20003"/>
                     </a:ext>
                   </a:extLst>
                 </a:gridCol>
@@ -10083,7 +10083,7 @@
                 </a:tc>
                 <a:extLst>
                   <a:ext uri="{0D108BD9-81ED-4DB2-BD59-A6C34878D82A}">
-                    <a16:rowId xmlns:a16="http://schemas.microsoft.com/office/drawing/2014/main" xmlns="" val="10000"/>
+                    <a16:rowId xmlns="" xmlns:a16="http://schemas.microsoft.com/office/drawing/2014/main" val="10000"/>
                   </a:ext>
                 </a:extLst>
               </a:tr>
@@ -10163,7 +10163,7 @@
                 </a:tc>
                 <a:extLst>
                   <a:ext uri="{0D108BD9-81ED-4DB2-BD59-A6C34878D82A}">
-                    <a16:rowId xmlns:a16="http://schemas.microsoft.com/office/drawing/2014/main" xmlns="" val="10001"/>
+                    <a16:rowId xmlns="" xmlns:a16="http://schemas.microsoft.com/office/drawing/2014/main" val="10001"/>
                   </a:ext>
                 </a:extLst>
               </a:tr>
@@ -10256,7 +10256,7 @@
                 </a:tc>
                 <a:extLst>
                   <a:ext uri="{0D108BD9-81ED-4DB2-BD59-A6C34878D82A}">
-                    <a16:rowId xmlns:a16="http://schemas.microsoft.com/office/drawing/2014/main" xmlns="" val="10002"/>
+                    <a16:rowId xmlns="" xmlns:a16="http://schemas.microsoft.com/office/drawing/2014/main" val="10002"/>
                   </a:ext>
                 </a:extLst>
               </a:tr>
@@ -10336,7 +10336,7 @@
                 </a:tc>
                 <a:extLst>
                   <a:ext uri="{0D108BD9-81ED-4DB2-BD59-A6C34878D82A}">
-                    <a16:rowId xmlns:a16="http://schemas.microsoft.com/office/drawing/2014/main" xmlns="" val="10003"/>
+                    <a16:rowId xmlns="" xmlns:a16="http://schemas.microsoft.com/office/drawing/2014/main" val="10003"/>
                   </a:ext>
                 </a:extLst>
               </a:tr>
@@ -10416,7 +10416,7 @@
                 </a:tc>
                 <a:extLst>
                   <a:ext uri="{0D108BD9-81ED-4DB2-BD59-A6C34878D82A}">
-                    <a16:rowId xmlns:a16="http://schemas.microsoft.com/office/drawing/2014/main" xmlns="" val="10004"/>
+                    <a16:rowId xmlns="" xmlns:a16="http://schemas.microsoft.com/office/drawing/2014/main" val="10004"/>
                   </a:ext>
                 </a:extLst>
               </a:tr>
@@ -10496,7 +10496,7 @@
                 </a:tc>
                 <a:extLst>
                   <a:ext uri="{0D108BD9-81ED-4DB2-BD59-A6C34878D82A}">
-                    <a16:rowId xmlns:a16="http://schemas.microsoft.com/office/drawing/2014/main" xmlns="" val="10005"/>
+                    <a16:rowId xmlns="" xmlns:a16="http://schemas.microsoft.com/office/drawing/2014/main" val="10005"/>
                   </a:ext>
                 </a:extLst>
               </a:tr>
@@ -10576,7 +10576,7 @@
                 </a:tc>
                 <a:extLst>
                   <a:ext uri="{0D108BD9-81ED-4DB2-BD59-A6C34878D82A}">
-                    <a16:rowId xmlns:a16="http://schemas.microsoft.com/office/drawing/2014/main" xmlns="" val="10006"/>
+                    <a16:rowId xmlns="" xmlns:a16="http://schemas.microsoft.com/office/drawing/2014/main" val="10006"/>
                   </a:ext>
                 </a:extLst>
               </a:tr>
@@ -10656,7 +10656,7 @@
                 </a:tc>
                 <a:extLst>
                   <a:ext uri="{0D108BD9-81ED-4DB2-BD59-A6C34878D82A}">
-                    <a16:rowId xmlns:a16="http://schemas.microsoft.com/office/drawing/2014/main" xmlns="" val="10007"/>
+                    <a16:rowId xmlns="" xmlns:a16="http://schemas.microsoft.com/office/drawing/2014/main" val="10007"/>
                   </a:ext>
                 </a:extLst>
               </a:tr>
@@ -10739,7 +10739,7 @@
                 </a:tc>
                 <a:extLst>
                   <a:ext uri="{0D108BD9-81ED-4DB2-BD59-A6C34878D82A}">
-                    <a16:rowId xmlns:a16="http://schemas.microsoft.com/office/drawing/2014/main" xmlns="" val="10008"/>
+                    <a16:rowId xmlns="" xmlns:a16="http://schemas.microsoft.com/office/drawing/2014/main" val="10008"/>
                   </a:ext>
                 </a:extLst>
               </a:tr>
@@ -10832,7 +10832,7 @@
                 </a:tc>
                 <a:extLst>
                   <a:ext uri="{0D108BD9-81ED-4DB2-BD59-A6C34878D82A}">
-                    <a16:rowId xmlns:a16="http://schemas.microsoft.com/office/drawing/2014/main" xmlns="" val="10009"/>
+                    <a16:rowId xmlns="" xmlns:a16="http://schemas.microsoft.com/office/drawing/2014/main" val="10009"/>
                   </a:ext>
                 </a:extLst>
               </a:tr>
@@ -10912,7 +10912,7 @@
                 </a:tc>
                 <a:extLst>
                   <a:ext uri="{0D108BD9-81ED-4DB2-BD59-A6C34878D82A}">
-                    <a16:rowId xmlns:a16="http://schemas.microsoft.com/office/drawing/2014/main" xmlns="" val="10010"/>
+                    <a16:rowId xmlns="" xmlns:a16="http://schemas.microsoft.com/office/drawing/2014/main" val="10010"/>
                   </a:ext>
                 </a:extLst>
               </a:tr>
@@ -10992,7 +10992,7 @@
                 </a:tc>
                 <a:extLst>
                   <a:ext uri="{0D108BD9-81ED-4DB2-BD59-A6C34878D82A}">
-                    <a16:rowId xmlns:a16="http://schemas.microsoft.com/office/drawing/2014/main" xmlns="" val="10011"/>
+                    <a16:rowId xmlns="" xmlns:a16="http://schemas.microsoft.com/office/drawing/2014/main" val="10011"/>
                   </a:ext>
                 </a:extLst>
               </a:tr>
@@ -11072,7 +11072,7 @@
                 </a:tc>
                 <a:extLst>
                   <a:ext uri="{0D108BD9-81ED-4DB2-BD59-A6C34878D82A}">
-                    <a16:rowId xmlns:a16="http://schemas.microsoft.com/office/drawing/2014/main" xmlns="" val="10012"/>
+                    <a16:rowId xmlns="" xmlns:a16="http://schemas.microsoft.com/office/drawing/2014/main" val="10012"/>
                   </a:ext>
                 </a:extLst>
               </a:tr>
@@ -11152,7 +11152,7 @@
                 </a:tc>
                 <a:extLst>
                   <a:ext uri="{0D108BD9-81ED-4DB2-BD59-A6C34878D82A}">
-                    <a16:rowId xmlns:a16="http://schemas.microsoft.com/office/drawing/2014/main" xmlns="" val="10013"/>
+                    <a16:rowId xmlns="" xmlns:a16="http://schemas.microsoft.com/office/drawing/2014/main" val="10013"/>
                   </a:ext>
                 </a:extLst>
               </a:tr>
@@ -11232,7 +11232,7 @@
                 </a:tc>
                 <a:extLst>
                   <a:ext uri="{0D108BD9-81ED-4DB2-BD59-A6C34878D82A}">
-                    <a16:rowId xmlns:a16="http://schemas.microsoft.com/office/drawing/2014/main" xmlns="" val="10014"/>
+                    <a16:rowId xmlns="" xmlns:a16="http://schemas.microsoft.com/office/drawing/2014/main" val="10014"/>
                   </a:ext>
                 </a:extLst>
               </a:tr>
@@ -11315,7 +11315,7 @@
                 </a:tc>
                 <a:extLst>
                   <a:ext uri="{0D108BD9-81ED-4DB2-BD59-A6C34878D82A}">
-                    <a16:rowId xmlns:a16="http://schemas.microsoft.com/office/drawing/2014/main" xmlns="" val="10015"/>
+                    <a16:rowId xmlns="" xmlns:a16="http://schemas.microsoft.com/office/drawing/2014/main" val="10015"/>
                   </a:ext>
                 </a:extLst>
               </a:tr>
@@ -11406,35 +11406,35 @@
                 <a:gridCol w="1884339">
                   <a:extLst>
                     <a:ext uri="{9D8B030D-6E8A-4147-A177-3AD203B41FA5}">
-                      <a16:colId xmlns:a16="http://schemas.microsoft.com/office/drawing/2014/main" xmlns="" val="20000"/>
+                      <a16:colId xmlns="" xmlns:a16="http://schemas.microsoft.com/office/drawing/2014/main" val="20000"/>
                     </a:ext>
                   </a:extLst>
                 </a:gridCol>
                 <a:gridCol w="4206296">
                   <a:extLst>
                     <a:ext uri="{9D8B030D-6E8A-4147-A177-3AD203B41FA5}">
-                      <a16:colId xmlns:a16="http://schemas.microsoft.com/office/drawing/2014/main" xmlns="" val="20001"/>
+                      <a16:colId xmlns="" xmlns:a16="http://schemas.microsoft.com/office/drawing/2014/main" val="20001"/>
                     </a:ext>
                   </a:extLst>
                 </a:gridCol>
                 <a:gridCol w="1165829">
                   <a:extLst>
                     <a:ext uri="{9D8B030D-6E8A-4147-A177-3AD203B41FA5}">
-                      <a16:colId xmlns:a16="http://schemas.microsoft.com/office/drawing/2014/main" xmlns="" val="20002"/>
+                      <a16:colId xmlns="" xmlns:a16="http://schemas.microsoft.com/office/drawing/2014/main" val="20002"/>
                     </a:ext>
                   </a:extLst>
                 </a:gridCol>
                 <a:gridCol w="1252326">
                   <a:extLst>
                     <a:ext uri="{9D8B030D-6E8A-4147-A177-3AD203B41FA5}">
-                      <a16:colId xmlns:a16="http://schemas.microsoft.com/office/drawing/2014/main" xmlns="" val="20003"/>
+                      <a16:colId xmlns="" xmlns:a16="http://schemas.microsoft.com/office/drawing/2014/main" val="20003"/>
                     </a:ext>
                   </a:extLst>
                 </a:gridCol>
                 <a:gridCol w="1252326">
                   <a:extLst>
                     <a:ext uri="{9D8B030D-6E8A-4147-A177-3AD203B41FA5}">
-                      <a16:colId xmlns:a16="http://schemas.microsoft.com/office/drawing/2014/main" xmlns="" val="20004"/>
+                      <a16:colId xmlns="" xmlns:a16="http://schemas.microsoft.com/office/drawing/2014/main" val="20004"/>
                     </a:ext>
                   </a:extLst>
                 </a:gridCol>
@@ -11551,7 +11551,7 @@
                 </a:tc>
                 <a:extLst>
                   <a:ext uri="{0D108BD9-81ED-4DB2-BD59-A6C34878D82A}">
-                    <a16:rowId xmlns:a16="http://schemas.microsoft.com/office/drawing/2014/main" xmlns="" val="10000"/>
+                    <a16:rowId xmlns="" xmlns:a16="http://schemas.microsoft.com/office/drawing/2014/main" val="10000"/>
                   </a:ext>
                 </a:extLst>
               </a:tr>
@@ -11673,7 +11673,7 @@
                 </a:tc>
                 <a:extLst>
                   <a:ext uri="{0D108BD9-81ED-4DB2-BD59-A6C34878D82A}">
-                    <a16:rowId xmlns:a16="http://schemas.microsoft.com/office/drawing/2014/main" xmlns="" val="10001"/>
+                    <a16:rowId xmlns="" xmlns:a16="http://schemas.microsoft.com/office/drawing/2014/main" val="10001"/>
                   </a:ext>
                 </a:extLst>
               </a:tr>
@@ -11782,7 +11782,7 @@
                 </a:tc>
                 <a:extLst>
                   <a:ext uri="{0D108BD9-81ED-4DB2-BD59-A6C34878D82A}">
-                    <a16:rowId xmlns:a16="http://schemas.microsoft.com/office/drawing/2014/main" xmlns="" val="10002"/>
+                    <a16:rowId xmlns="" xmlns:a16="http://schemas.microsoft.com/office/drawing/2014/main" val="10002"/>
                   </a:ext>
                 </a:extLst>
               </a:tr>
@@ -11903,7 +11903,7 @@
                 </a:tc>
                 <a:extLst>
                   <a:ext uri="{0D108BD9-81ED-4DB2-BD59-A6C34878D82A}">
-                    <a16:rowId xmlns:a16="http://schemas.microsoft.com/office/drawing/2014/main" xmlns="" val="10003"/>
+                    <a16:rowId xmlns="" xmlns:a16="http://schemas.microsoft.com/office/drawing/2014/main" val="10003"/>
                   </a:ext>
                 </a:extLst>
               </a:tr>
@@ -12012,7 +12012,7 @@
                 </a:tc>
                 <a:extLst>
                   <a:ext uri="{0D108BD9-81ED-4DB2-BD59-A6C34878D82A}">
-                    <a16:rowId xmlns:a16="http://schemas.microsoft.com/office/drawing/2014/main" xmlns="" val="10004"/>
+                    <a16:rowId xmlns="" xmlns:a16="http://schemas.microsoft.com/office/drawing/2014/main" val="10004"/>
                   </a:ext>
                 </a:extLst>
               </a:tr>
@@ -12149,7 +12149,7 @@
                 </a:tc>
                 <a:extLst>
                   <a:ext uri="{0D108BD9-81ED-4DB2-BD59-A6C34878D82A}">
-                    <a16:rowId xmlns:a16="http://schemas.microsoft.com/office/drawing/2014/main" xmlns="" val="10005"/>
+                    <a16:rowId xmlns="" xmlns:a16="http://schemas.microsoft.com/office/drawing/2014/main" val="10005"/>
                   </a:ext>
                 </a:extLst>
               </a:tr>
@@ -12271,7 +12271,7 @@
                 </a:tc>
                 <a:extLst>
                   <a:ext uri="{0D108BD9-81ED-4DB2-BD59-A6C34878D82A}">
-                    <a16:rowId xmlns:a16="http://schemas.microsoft.com/office/drawing/2014/main" xmlns="" val="10006"/>
+                    <a16:rowId xmlns="" xmlns:a16="http://schemas.microsoft.com/office/drawing/2014/main" val="10006"/>
                   </a:ext>
                 </a:extLst>
               </a:tr>
@@ -12408,7 +12408,7 @@
                 </a:tc>
                 <a:extLst>
                   <a:ext uri="{0D108BD9-81ED-4DB2-BD59-A6C34878D82A}">
-                    <a16:rowId xmlns:a16="http://schemas.microsoft.com/office/drawing/2014/main" xmlns="" val="10007"/>
+                    <a16:rowId xmlns="" xmlns:a16="http://schemas.microsoft.com/office/drawing/2014/main" val="10007"/>
                   </a:ext>
                 </a:extLst>
               </a:tr>
@@ -12529,7 +12529,7 @@
                 </a:tc>
                 <a:extLst>
                   <a:ext uri="{0D108BD9-81ED-4DB2-BD59-A6C34878D82A}">
-                    <a16:rowId xmlns:a16="http://schemas.microsoft.com/office/drawing/2014/main" xmlns="" val="10008"/>
+                    <a16:rowId xmlns="" xmlns:a16="http://schemas.microsoft.com/office/drawing/2014/main" val="10008"/>
                   </a:ext>
                 </a:extLst>
               </a:tr>
@@ -12638,7 +12638,7 @@
                 </a:tc>
                 <a:extLst>
                   <a:ext uri="{0D108BD9-81ED-4DB2-BD59-A6C34878D82A}">
-                    <a16:rowId xmlns:a16="http://schemas.microsoft.com/office/drawing/2014/main" xmlns="" val="10009"/>
+                    <a16:rowId xmlns="" xmlns:a16="http://schemas.microsoft.com/office/drawing/2014/main" val="10009"/>
                   </a:ext>
                 </a:extLst>
               </a:tr>
@@ -12747,7 +12747,7 @@
                 </a:tc>
                 <a:extLst>
                   <a:ext uri="{0D108BD9-81ED-4DB2-BD59-A6C34878D82A}">
-                    <a16:rowId xmlns:a16="http://schemas.microsoft.com/office/drawing/2014/main" xmlns="" val="10010"/>
+                    <a16:rowId xmlns="" xmlns:a16="http://schemas.microsoft.com/office/drawing/2014/main" val="10010"/>
                   </a:ext>
                 </a:extLst>
               </a:tr>
@@ -12856,7 +12856,7 @@
                 </a:tc>
                 <a:extLst>
                   <a:ext uri="{0D108BD9-81ED-4DB2-BD59-A6C34878D82A}">
-                    <a16:rowId xmlns:a16="http://schemas.microsoft.com/office/drawing/2014/main" xmlns="" val="10011"/>
+                    <a16:rowId xmlns="" xmlns:a16="http://schemas.microsoft.com/office/drawing/2014/main" val="10011"/>
                   </a:ext>
                 </a:extLst>
               </a:tr>
@@ -13033,7 +13033,7 @@
           <p:cNvPr id="2" name="Title 1">
             <a:extLst>
               <a:ext uri="{FF2B5EF4-FFF2-40B4-BE49-F238E27FC236}">
-                <a16:creationId xmlns:a16="http://schemas.microsoft.com/office/drawing/2014/main" xmlns="" id="{F2BA0188-53B3-4D0B-BFA2-D97322C19DC2}"/>
+                <a16:creationId xmlns="" xmlns:a16="http://schemas.microsoft.com/office/drawing/2014/main" id="{F2BA0188-53B3-4D0B-BFA2-D97322C19DC2}"/>
               </a:ext>
             </a:extLst>
           </p:cNvPr>
@@ -13062,7 +13062,7 @@
           <p:cNvPr id="3" name="Content Placeholder 2">
             <a:extLst>
               <a:ext uri="{FF2B5EF4-FFF2-40B4-BE49-F238E27FC236}">
-                <a16:creationId xmlns:a16="http://schemas.microsoft.com/office/drawing/2014/main" xmlns="" id="{262D00B4-C15B-447A-9CEE-B8D24F15D579}"/>
+                <a16:creationId xmlns="" xmlns:a16="http://schemas.microsoft.com/office/drawing/2014/main" id="{262D00B4-C15B-447A-9CEE-B8D24F15D579}"/>
               </a:ext>
             </a:extLst>
           </p:cNvPr>

</xml_diff>